<commit_message>
Encontrado eror 4 y 5 error de registro y mail
</commit_message>
<xml_diff>
--- a/alumnos/gabriel_gonzalez/errores_guru.pptx
+++ b/alumnos/gabriel_gonzalez/errores_guru.pptx
@@ -10,15 +10,35 @@
     <p:sldId id="258" r:id="rId4"/>
     <p:sldId id="259" r:id="rId5"/>
     <p:sldId id="260" r:id="rId6"/>
-    <p:sldId id="261" r:id="rId7"/>
-    <p:sldId id="262" r:id="rId8"/>
-    <p:sldId id="263" r:id="rId9"/>
-    <p:sldId id="264" r:id="rId10"/>
-    <p:sldId id="265" r:id="rId11"/>
-    <p:sldId id="266" r:id="rId12"/>
-    <p:sldId id="267" r:id="rId13"/>
-    <p:sldId id="268" r:id="rId14"/>
-    <p:sldId id="269" r:id="rId15"/>
+    <p:sldId id="270" r:id="rId7"/>
+    <p:sldId id="261" r:id="rId8"/>
+    <p:sldId id="262" r:id="rId9"/>
+    <p:sldId id="263" r:id="rId10"/>
+    <p:sldId id="264" r:id="rId11"/>
+    <p:sldId id="271" r:id="rId12"/>
+    <p:sldId id="265" r:id="rId13"/>
+    <p:sldId id="266" r:id="rId14"/>
+    <p:sldId id="267" r:id="rId15"/>
+    <p:sldId id="268" r:id="rId16"/>
+    <p:sldId id="269" r:id="rId17"/>
+    <p:sldId id="272" r:id="rId18"/>
+    <p:sldId id="273" r:id="rId19"/>
+    <p:sldId id="274" r:id="rId20"/>
+    <p:sldId id="275" r:id="rId21"/>
+    <p:sldId id="276" r:id="rId22"/>
+    <p:sldId id="277" r:id="rId23"/>
+    <p:sldId id="278" r:id="rId24"/>
+    <p:sldId id="279" r:id="rId25"/>
+    <p:sldId id="280" r:id="rId26"/>
+    <p:sldId id="281" r:id="rId27"/>
+    <p:sldId id="282" r:id="rId28"/>
+    <p:sldId id="283" r:id="rId29"/>
+    <p:sldId id="284" r:id="rId30"/>
+    <p:sldId id="285" r:id="rId31"/>
+    <p:sldId id="286" r:id="rId32"/>
+    <p:sldId id="287" r:id="rId33"/>
+    <p:sldId id="288" r:id="rId34"/>
+    <p:sldId id="289" r:id="rId35"/>
   </p:sldIdLst>
   <p:sldSz cx="12192000" cy="6858000"/>
   <p:notesSz cx="6858000" cy="9144000"/>
@@ -274,7 +294,7 @@
           <a:p>
             <a:fld id="{5F8819B3-F807-4F78-9ED5-58D6C3743EEB}" type="datetimeFigureOut">
               <a:rPr lang="es-MX" smtClean="0"/>
-              <a:t>05/06/2023</a:t>
+              <a:t>07/06/2023</a:t>
             </a:fld>
             <a:endParaRPr lang="es-MX"/>
           </a:p>
@@ -474,7 +494,7 @@
           <a:p>
             <a:fld id="{5F8819B3-F807-4F78-9ED5-58D6C3743EEB}" type="datetimeFigureOut">
               <a:rPr lang="es-MX" smtClean="0"/>
-              <a:t>05/06/2023</a:t>
+              <a:t>07/06/2023</a:t>
             </a:fld>
             <a:endParaRPr lang="es-MX"/>
           </a:p>
@@ -684,7 +704,7 @@
           <a:p>
             <a:fld id="{5F8819B3-F807-4F78-9ED5-58D6C3743EEB}" type="datetimeFigureOut">
               <a:rPr lang="es-MX" smtClean="0"/>
-              <a:t>05/06/2023</a:t>
+              <a:t>07/06/2023</a:t>
             </a:fld>
             <a:endParaRPr lang="es-MX"/>
           </a:p>
@@ -884,7 +904,7 @@
           <a:p>
             <a:fld id="{5F8819B3-F807-4F78-9ED5-58D6C3743EEB}" type="datetimeFigureOut">
               <a:rPr lang="es-MX" smtClean="0"/>
-              <a:t>05/06/2023</a:t>
+              <a:t>07/06/2023</a:t>
             </a:fld>
             <a:endParaRPr lang="es-MX"/>
           </a:p>
@@ -1160,7 +1180,7 @@
           <a:p>
             <a:fld id="{5F8819B3-F807-4F78-9ED5-58D6C3743EEB}" type="datetimeFigureOut">
               <a:rPr lang="es-MX" smtClean="0"/>
-              <a:t>05/06/2023</a:t>
+              <a:t>07/06/2023</a:t>
             </a:fld>
             <a:endParaRPr lang="es-MX"/>
           </a:p>
@@ -1428,7 +1448,7 @@
           <a:p>
             <a:fld id="{5F8819B3-F807-4F78-9ED5-58D6C3743EEB}" type="datetimeFigureOut">
               <a:rPr lang="es-MX" smtClean="0"/>
-              <a:t>05/06/2023</a:t>
+              <a:t>07/06/2023</a:t>
             </a:fld>
             <a:endParaRPr lang="es-MX"/>
           </a:p>
@@ -1843,7 +1863,7 @@
           <a:p>
             <a:fld id="{5F8819B3-F807-4F78-9ED5-58D6C3743EEB}" type="datetimeFigureOut">
               <a:rPr lang="es-MX" smtClean="0"/>
-              <a:t>05/06/2023</a:t>
+              <a:t>07/06/2023</a:t>
             </a:fld>
             <a:endParaRPr lang="es-MX"/>
           </a:p>
@@ -1985,7 +2005,7 @@
           <a:p>
             <a:fld id="{5F8819B3-F807-4F78-9ED5-58D6C3743EEB}" type="datetimeFigureOut">
               <a:rPr lang="es-MX" smtClean="0"/>
-              <a:t>05/06/2023</a:t>
+              <a:t>07/06/2023</a:t>
             </a:fld>
             <a:endParaRPr lang="es-MX"/>
           </a:p>
@@ -2098,7 +2118,7 @@
           <a:p>
             <a:fld id="{5F8819B3-F807-4F78-9ED5-58D6C3743EEB}" type="datetimeFigureOut">
               <a:rPr lang="es-MX" smtClean="0"/>
-              <a:t>05/06/2023</a:t>
+              <a:t>07/06/2023</a:t>
             </a:fld>
             <a:endParaRPr lang="es-MX"/>
           </a:p>
@@ -2411,7 +2431,7 @@
           <a:p>
             <a:fld id="{5F8819B3-F807-4F78-9ED5-58D6C3743EEB}" type="datetimeFigureOut">
               <a:rPr lang="es-MX" smtClean="0"/>
-              <a:t>05/06/2023</a:t>
+              <a:t>07/06/2023</a:t>
             </a:fld>
             <a:endParaRPr lang="es-MX"/>
           </a:p>
@@ -2700,7 +2720,7 @@
           <a:p>
             <a:fld id="{5F8819B3-F807-4F78-9ED5-58D6C3743EEB}" type="datetimeFigureOut">
               <a:rPr lang="es-MX" smtClean="0"/>
-              <a:t>05/06/2023</a:t>
+              <a:t>07/06/2023</a:t>
             </a:fld>
             <a:endParaRPr lang="es-MX"/>
           </a:p>
@@ -2943,7 +2963,7 @@
           <a:p>
             <a:fld id="{5F8819B3-F807-4F78-9ED5-58D6C3743EEB}" type="datetimeFigureOut">
               <a:rPr lang="es-MX" smtClean="0"/>
-              <a:t>05/06/2023</a:t>
+              <a:t>07/06/2023</a:t>
             </a:fld>
             <a:endParaRPr lang="es-MX"/>
           </a:p>
@@ -3478,6 +3498,142 @@
           <a:chExt cx="0" cy="0"/>
         </a:xfrm>
       </p:grpSpPr>
+      <p:pic>
+        <p:nvPicPr>
+          <p:cNvPr id="9" name="Imagen 8">
+            <a:extLst>
+              <a:ext uri="{FF2B5EF4-FFF2-40B4-BE49-F238E27FC236}">
+                <a16:creationId xmlns:a16="http://schemas.microsoft.com/office/drawing/2014/main" id="{D29C3316-EF32-4977-A755-B876C23C7DD9}"/>
+              </a:ext>
+            </a:extLst>
+          </p:cNvPr>
+          <p:cNvPicPr>
+            <a:picLocks noChangeAspect="1"/>
+          </p:cNvPicPr>
+          <p:nvPr/>
+        </p:nvPicPr>
+        <p:blipFill>
+          <a:blip r:embed="rId2">
+            <a:extLst>
+              <a:ext uri="{28A0092B-C50C-407E-A947-70E740481C1C}">
+                <a14:useLocalDpi xmlns:a14="http://schemas.microsoft.com/office/drawing/2010/main" val="0"/>
+              </a:ext>
+            </a:extLst>
+          </a:blip>
+          <a:stretch>
+            <a:fillRect/>
+          </a:stretch>
+        </p:blipFill>
+        <p:spPr>
+          <a:xfrm>
+            <a:off x="705665" y="0"/>
+            <a:ext cx="10780669" cy="6858000"/>
+          </a:xfrm>
+          <a:prstGeom prst="rect">
+            <a:avLst/>
+          </a:prstGeom>
+        </p:spPr>
+      </p:pic>
+    </p:spTree>
+    <p:extLst>
+      <p:ext uri="{BB962C8B-B14F-4D97-AF65-F5344CB8AC3E}">
+        <p14:creationId xmlns:p14="http://schemas.microsoft.com/office/powerpoint/2010/main" val="1159073202"/>
+      </p:ext>
+    </p:extLst>
+  </p:cSld>
+  <p:clrMapOvr>
+    <a:masterClrMapping/>
+  </p:clrMapOvr>
+</p:sld>
+</file>
+
+<file path=ppt/slides/slide11.xml><?xml version="1.0" encoding="utf-8"?>
+<p:sld xmlns:a="http://schemas.openxmlformats.org/drawingml/2006/main" xmlns:r="http://schemas.openxmlformats.org/officeDocument/2006/relationships" xmlns:p="http://schemas.openxmlformats.org/presentationml/2006/main">
+  <p:cSld>
+    <p:spTree>
+      <p:nvGrpSpPr>
+        <p:cNvPr id="1" name=""/>
+        <p:cNvGrpSpPr/>
+        <p:nvPr/>
+      </p:nvGrpSpPr>
+      <p:grpSpPr>
+        <a:xfrm>
+          <a:off x="0" y="0"/>
+          <a:ext cx="0" cy="0"/>
+          <a:chOff x="0" y="0"/>
+          <a:chExt cx="0" cy="0"/>
+        </a:xfrm>
+      </p:grpSpPr>
+      <p:sp>
+        <p:nvSpPr>
+          <p:cNvPr id="3" name="Marcador de contenido 2">
+            <a:extLst>
+              <a:ext uri="{FF2B5EF4-FFF2-40B4-BE49-F238E27FC236}">
+                <a16:creationId xmlns:a16="http://schemas.microsoft.com/office/drawing/2014/main" id="{B0CAFBDA-A30E-40FF-8A11-80970746258A}"/>
+              </a:ext>
+            </a:extLst>
+          </p:cNvPr>
+          <p:cNvSpPr>
+            <a:spLocks noGrp="1"/>
+          </p:cNvSpPr>
+          <p:nvPr>
+            <p:ph idx="1"/>
+          </p:nvPr>
+        </p:nvSpPr>
+        <p:spPr/>
+        <p:txBody>
+          <a:bodyPr>
+            <a:normAutofit/>
+          </a:bodyPr>
+          <a:lstStyle/>
+          <a:p>
+            <a:pPr algn="ctr"/>
+            <a:r>
+              <a:rPr lang="es-ES" sz="8800" dirty="0">
+                <a:solidFill>
+                  <a:srgbClr val="FF0000"/>
+                </a:solidFill>
+              </a:rPr>
+              <a:t>TERCER BUG</a:t>
+            </a:r>
+            <a:endParaRPr lang="es-MX" sz="8800" dirty="0">
+              <a:solidFill>
+                <a:srgbClr val="FF0000"/>
+              </a:solidFill>
+            </a:endParaRPr>
+          </a:p>
+        </p:txBody>
+      </p:sp>
+    </p:spTree>
+    <p:extLst>
+      <p:ext uri="{BB962C8B-B14F-4D97-AF65-F5344CB8AC3E}">
+        <p14:creationId xmlns:p14="http://schemas.microsoft.com/office/powerpoint/2010/main" val="3718315860"/>
+      </p:ext>
+    </p:extLst>
+  </p:cSld>
+  <p:clrMapOvr>
+    <a:masterClrMapping/>
+  </p:clrMapOvr>
+</p:sld>
+</file>
+
+<file path=ppt/slides/slide12.xml><?xml version="1.0" encoding="utf-8"?>
+<p:sld xmlns:a="http://schemas.openxmlformats.org/drawingml/2006/main" xmlns:r="http://schemas.openxmlformats.org/officeDocument/2006/relationships" xmlns:p="http://schemas.openxmlformats.org/presentationml/2006/main">
+  <p:cSld>
+    <p:spTree>
+      <p:nvGrpSpPr>
+        <p:cNvPr id="1" name=""/>
+        <p:cNvGrpSpPr/>
+        <p:nvPr/>
+      </p:nvGrpSpPr>
+      <p:grpSpPr>
+        <a:xfrm>
+          <a:off x="0" y="0"/>
+          <a:ext cx="0" cy="0"/>
+          <a:chOff x="0" y="0"/>
+          <a:chExt cx="0" cy="0"/>
+        </a:xfrm>
+      </p:grpSpPr>
       <p:sp>
         <p:nvSpPr>
           <p:cNvPr id="5" name="CuadroTexto 4">
@@ -3612,7 +3768,7 @@
 </p:sld>
 </file>
 
-<file path=ppt/slides/slide11.xml><?xml version="1.0" encoding="utf-8"?>
+<file path=ppt/slides/slide13.xml><?xml version="1.0" encoding="utf-8"?>
 <p:sld xmlns:a="http://schemas.openxmlformats.org/drawingml/2006/main" xmlns:r="http://schemas.openxmlformats.org/officeDocument/2006/relationships" xmlns:p="http://schemas.openxmlformats.org/presentationml/2006/main">
   <p:cSld>
     <p:spTree>
@@ -3678,7 +3834,7 @@
 </p:sld>
 </file>
 
-<file path=ppt/slides/slide12.xml><?xml version="1.0" encoding="utf-8"?>
+<file path=ppt/slides/slide14.xml><?xml version="1.0" encoding="utf-8"?>
 <p:sld xmlns:a="http://schemas.openxmlformats.org/drawingml/2006/main" xmlns:r="http://schemas.openxmlformats.org/officeDocument/2006/relationships" xmlns:p="http://schemas.openxmlformats.org/presentationml/2006/main">
   <p:cSld>
     <p:spTree>
@@ -4069,7 +4225,7 @@
 </p:sld>
 </file>
 
-<file path=ppt/slides/slide13.xml><?xml version="1.0" encoding="utf-8"?>
+<file path=ppt/slides/slide15.xml><?xml version="1.0" encoding="utf-8"?>
 <p:sld xmlns:a="http://schemas.openxmlformats.org/drawingml/2006/main" xmlns:r="http://schemas.openxmlformats.org/officeDocument/2006/relationships" xmlns:p="http://schemas.openxmlformats.org/presentationml/2006/main">
   <p:cSld>
     <p:spTree>
@@ -4135,7 +4291,7 @@
 </p:sld>
 </file>
 
-<file path=ppt/slides/slide14.xml><?xml version="1.0" encoding="utf-8"?>
+<file path=ppt/slides/slide16.xml><?xml version="1.0" encoding="utf-8"?>
 <p:sld xmlns:a="http://schemas.openxmlformats.org/drawingml/2006/main" xmlns:r="http://schemas.openxmlformats.org/officeDocument/2006/relationships" xmlns:p="http://schemas.openxmlformats.org/presentationml/2006/main">
   <p:cSld>
     <p:spTree>
@@ -4192,6 +4348,278 @@
     <p:extLst>
       <p:ext uri="{BB962C8B-B14F-4D97-AF65-F5344CB8AC3E}">
         <p14:creationId xmlns:p14="http://schemas.microsoft.com/office/powerpoint/2010/main" val="2294022973"/>
+      </p:ext>
+    </p:extLst>
+  </p:cSld>
+  <p:clrMapOvr>
+    <a:masterClrMapping/>
+  </p:clrMapOvr>
+</p:sld>
+</file>
+
+<file path=ppt/slides/slide17.xml><?xml version="1.0" encoding="utf-8"?>
+<p:sld xmlns:a="http://schemas.openxmlformats.org/drawingml/2006/main" xmlns:r="http://schemas.openxmlformats.org/officeDocument/2006/relationships" xmlns:p="http://schemas.openxmlformats.org/presentationml/2006/main">
+  <p:cSld>
+    <p:spTree>
+      <p:nvGrpSpPr>
+        <p:cNvPr id="1" name=""/>
+        <p:cNvGrpSpPr/>
+        <p:nvPr/>
+      </p:nvGrpSpPr>
+      <p:grpSpPr>
+        <a:xfrm>
+          <a:off x="0" y="0"/>
+          <a:ext cx="0" cy="0"/>
+          <a:chOff x="0" y="0"/>
+          <a:chExt cx="0" cy="0"/>
+        </a:xfrm>
+      </p:grpSpPr>
+      <p:sp>
+        <p:nvSpPr>
+          <p:cNvPr id="3" name="Marcador de contenido 2">
+            <a:extLst>
+              <a:ext uri="{FF2B5EF4-FFF2-40B4-BE49-F238E27FC236}">
+                <a16:creationId xmlns:a16="http://schemas.microsoft.com/office/drawing/2014/main" id="{1B849EC0-1245-448B-891C-39C9FE6894AE}"/>
+              </a:ext>
+            </a:extLst>
+          </p:cNvPr>
+          <p:cNvSpPr>
+            <a:spLocks noGrp="1"/>
+          </p:cNvSpPr>
+          <p:nvPr>
+            <p:ph idx="1"/>
+          </p:nvPr>
+        </p:nvSpPr>
+        <p:spPr>
+          <a:xfrm>
+            <a:off x="511029" y="1607511"/>
+            <a:ext cx="10515600" cy="4351338"/>
+          </a:xfrm>
+        </p:spPr>
+        <p:txBody>
+          <a:bodyPr>
+            <a:normAutofit/>
+          </a:bodyPr>
+          <a:lstStyle/>
+          <a:p>
+            <a:pPr algn="ctr"/>
+            <a:r>
+              <a:rPr lang="es-ES" sz="8800" dirty="0">
+                <a:solidFill>
+                  <a:srgbClr val="FF0000"/>
+                </a:solidFill>
+              </a:rPr>
+              <a:t>CUARTO BUG</a:t>
+            </a:r>
+            <a:endParaRPr lang="es-MX" sz="8800" dirty="0">
+              <a:solidFill>
+                <a:srgbClr val="FF0000"/>
+              </a:solidFill>
+            </a:endParaRPr>
+          </a:p>
+        </p:txBody>
+      </p:sp>
+    </p:spTree>
+    <p:extLst>
+      <p:ext uri="{BB962C8B-B14F-4D97-AF65-F5344CB8AC3E}">
+        <p14:creationId xmlns:p14="http://schemas.microsoft.com/office/powerpoint/2010/main" val="3172972419"/>
+      </p:ext>
+    </p:extLst>
+  </p:cSld>
+  <p:clrMapOvr>
+    <a:masterClrMapping/>
+  </p:clrMapOvr>
+</p:sld>
+</file>
+
+<file path=ppt/slides/slide18.xml><?xml version="1.0" encoding="utf-8"?>
+<p:sld xmlns:a="http://schemas.openxmlformats.org/drawingml/2006/main" xmlns:r="http://schemas.openxmlformats.org/officeDocument/2006/relationships" xmlns:p="http://schemas.openxmlformats.org/presentationml/2006/main">
+  <p:cSld>
+    <p:spTree>
+      <p:nvGrpSpPr>
+        <p:cNvPr id="1" name=""/>
+        <p:cNvGrpSpPr/>
+        <p:nvPr/>
+      </p:nvGrpSpPr>
+      <p:grpSpPr>
+        <a:xfrm>
+          <a:off x="0" y="0"/>
+          <a:ext cx="0" cy="0"/>
+          <a:chOff x="0" y="0"/>
+          <a:chExt cx="0" cy="0"/>
+        </a:xfrm>
+      </p:grpSpPr>
+      <p:sp>
+        <p:nvSpPr>
+          <p:cNvPr id="5" name="CuadroTexto 4">
+            <a:extLst>
+              <a:ext uri="{FF2B5EF4-FFF2-40B4-BE49-F238E27FC236}">
+                <a16:creationId xmlns:a16="http://schemas.microsoft.com/office/drawing/2014/main" id="{770D1113-6E89-42EB-BCA1-9E7EB0E2430F}"/>
+              </a:ext>
+            </a:extLst>
+          </p:cNvPr>
+          <p:cNvSpPr txBox="1"/>
+          <p:nvPr/>
+        </p:nvSpPr>
+        <p:spPr>
+          <a:xfrm>
+            <a:off x="494950" y="335560"/>
+            <a:ext cx="3154261" cy="923330"/>
+          </a:xfrm>
+          <a:prstGeom prst="rect">
+            <a:avLst/>
+          </a:prstGeom>
+          <a:noFill/>
+        </p:spPr>
+        <p:txBody>
+          <a:bodyPr wrap="square" rtlCol="0">
+            <a:spAutoFit/>
+          </a:bodyPr>
+          <a:lstStyle/>
+          <a:p>
+            <a:r>
+              <a:rPr lang="es-ES" dirty="0">
+                <a:solidFill>
+                  <a:srgbClr val="FF0000"/>
+                </a:solidFill>
+              </a:rPr>
+              <a:t>Cuarto bug</a:t>
+            </a:r>
+          </a:p>
+          <a:p>
+            <a:endParaRPr lang="es-ES" dirty="0">
+              <a:solidFill>
+                <a:srgbClr val="FF0000"/>
+              </a:solidFill>
+            </a:endParaRPr>
+          </a:p>
+          <a:p>
+            <a:r>
+              <a:rPr lang="es-ES" dirty="0"/>
+              <a:t>Abrimos la pagina web </a:t>
+            </a:r>
+            <a:r>
+              <a:rPr lang="es-ES" dirty="0">
+                <a:solidFill>
+                  <a:schemeClr val="accent1"/>
+                </a:solidFill>
+              </a:rPr>
+              <a:t>Guru99</a:t>
+            </a:r>
+            <a:endParaRPr lang="es-MX" dirty="0">
+              <a:solidFill>
+                <a:schemeClr val="accent1"/>
+              </a:solidFill>
+            </a:endParaRPr>
+          </a:p>
+        </p:txBody>
+      </p:sp>
+      <p:pic>
+        <p:nvPicPr>
+          <p:cNvPr id="7" name="Imagen 6">
+            <a:extLst>
+              <a:ext uri="{FF2B5EF4-FFF2-40B4-BE49-F238E27FC236}">
+                <a16:creationId xmlns:a16="http://schemas.microsoft.com/office/drawing/2014/main" id="{0C95BD47-6FCF-45E6-85E9-92A63A260799}"/>
+              </a:ext>
+            </a:extLst>
+          </p:cNvPr>
+          <p:cNvPicPr>
+            <a:picLocks noChangeAspect="1"/>
+          </p:cNvPicPr>
+          <p:nvPr/>
+        </p:nvPicPr>
+        <p:blipFill>
+          <a:blip r:embed="rId2">
+            <a:extLst>
+              <a:ext uri="{28A0092B-C50C-407E-A947-70E740481C1C}">
+                <a14:useLocalDpi xmlns:a14="http://schemas.microsoft.com/office/drawing/2010/main" val="0"/>
+              </a:ext>
+            </a:extLst>
+          </a:blip>
+          <a:stretch>
+            <a:fillRect/>
+          </a:stretch>
+        </p:blipFill>
+        <p:spPr>
+          <a:xfrm>
+            <a:off x="218114" y="1258890"/>
+            <a:ext cx="10490707" cy="5599110"/>
+          </a:xfrm>
+          <a:prstGeom prst="rect">
+            <a:avLst/>
+          </a:prstGeom>
+        </p:spPr>
+      </p:pic>
+    </p:spTree>
+    <p:extLst>
+      <p:ext uri="{BB962C8B-B14F-4D97-AF65-F5344CB8AC3E}">
+        <p14:creationId xmlns:p14="http://schemas.microsoft.com/office/powerpoint/2010/main" val="3792564724"/>
+      </p:ext>
+    </p:extLst>
+  </p:cSld>
+  <p:clrMapOvr>
+    <a:masterClrMapping/>
+  </p:clrMapOvr>
+</p:sld>
+</file>
+
+<file path=ppt/slides/slide19.xml><?xml version="1.0" encoding="utf-8"?>
+<p:sld xmlns:a="http://schemas.openxmlformats.org/drawingml/2006/main" xmlns:r="http://schemas.openxmlformats.org/officeDocument/2006/relationships" xmlns:p="http://schemas.openxmlformats.org/presentationml/2006/main">
+  <p:cSld>
+    <p:spTree>
+      <p:nvGrpSpPr>
+        <p:cNvPr id="1" name=""/>
+        <p:cNvGrpSpPr/>
+        <p:nvPr/>
+      </p:nvGrpSpPr>
+      <p:grpSpPr>
+        <a:xfrm>
+          <a:off x="0" y="0"/>
+          <a:ext cx="0" cy="0"/>
+          <a:chOff x="0" y="0"/>
+          <a:chExt cx="0" cy="0"/>
+        </a:xfrm>
+      </p:grpSpPr>
+      <p:pic>
+        <p:nvPicPr>
+          <p:cNvPr id="5" name="Imagen 4">
+            <a:extLst>
+              <a:ext uri="{FF2B5EF4-FFF2-40B4-BE49-F238E27FC236}">
+                <a16:creationId xmlns:a16="http://schemas.microsoft.com/office/drawing/2014/main" id="{0853724E-7E8A-4504-8B63-FAABED5E1367}"/>
+              </a:ext>
+            </a:extLst>
+          </p:cNvPr>
+          <p:cNvPicPr>
+            <a:picLocks noChangeAspect="1"/>
+          </p:cNvPicPr>
+          <p:nvPr/>
+        </p:nvPicPr>
+        <p:blipFill>
+          <a:blip r:embed="rId2">
+            <a:extLst>
+              <a:ext uri="{28A0092B-C50C-407E-A947-70E740481C1C}">
+                <a14:useLocalDpi xmlns:a14="http://schemas.microsoft.com/office/drawing/2010/main" val="0"/>
+              </a:ext>
+            </a:extLst>
+          </a:blip>
+          <a:stretch>
+            <a:fillRect/>
+          </a:stretch>
+        </p:blipFill>
+        <p:spPr>
+          <a:xfrm>
+            <a:off x="1365756" y="0"/>
+            <a:ext cx="9460488" cy="6858000"/>
+          </a:xfrm>
+          <a:prstGeom prst="rect">
+            <a:avLst/>
+          </a:prstGeom>
+        </p:spPr>
+      </p:pic>
+    </p:spTree>
+    <p:extLst>
+      <p:ext uri="{BB962C8B-B14F-4D97-AF65-F5344CB8AC3E}">
+        <p14:creationId xmlns:p14="http://schemas.microsoft.com/office/powerpoint/2010/main" val="2259482930"/>
       </p:ext>
     </p:extLst>
   </p:cSld>
@@ -4258,6 +4686,1533 @@
     <p:extLst>
       <p:ext uri="{BB962C8B-B14F-4D97-AF65-F5344CB8AC3E}">
         <p14:creationId xmlns:p14="http://schemas.microsoft.com/office/powerpoint/2010/main" val="4096494873"/>
+      </p:ext>
+    </p:extLst>
+  </p:cSld>
+  <p:clrMapOvr>
+    <a:masterClrMapping/>
+  </p:clrMapOvr>
+</p:sld>
+</file>
+
+<file path=ppt/slides/slide20.xml><?xml version="1.0" encoding="utf-8"?>
+<p:sld xmlns:a="http://schemas.openxmlformats.org/drawingml/2006/main" xmlns:r="http://schemas.openxmlformats.org/officeDocument/2006/relationships" xmlns:p="http://schemas.openxmlformats.org/presentationml/2006/main">
+  <p:cSld>
+    <p:spTree>
+      <p:nvGrpSpPr>
+        <p:cNvPr id="1" name=""/>
+        <p:cNvGrpSpPr/>
+        <p:nvPr/>
+      </p:nvGrpSpPr>
+      <p:grpSpPr>
+        <a:xfrm>
+          <a:off x="0" y="0"/>
+          <a:ext cx="0" cy="0"/>
+          <a:chOff x="0" y="0"/>
+          <a:chExt cx="0" cy="0"/>
+        </a:xfrm>
+      </p:grpSpPr>
+      <p:graphicFrame>
+        <p:nvGraphicFramePr>
+          <p:cNvPr id="4" name="Tabla 5">
+            <a:extLst>
+              <a:ext uri="{FF2B5EF4-FFF2-40B4-BE49-F238E27FC236}">
+                <a16:creationId xmlns:a16="http://schemas.microsoft.com/office/drawing/2014/main" id="{8F843A8E-689B-449A-96EB-1D46AA58FD9A}"/>
+              </a:ext>
+            </a:extLst>
+          </p:cNvPr>
+          <p:cNvGraphicFramePr>
+            <a:graphicFrameLocks noGrp="1"/>
+          </p:cNvGraphicFramePr>
+          <p:nvPr>
+            <p:extLst>
+              <p:ext uri="{D42A27DB-BD31-4B8C-83A1-F6EECF244321}">
+                <p14:modId xmlns:p14="http://schemas.microsoft.com/office/powerpoint/2010/main" val="4101663030"/>
+              </p:ext>
+            </p:extLst>
+          </p:nvPr>
+        </p:nvGraphicFramePr>
+        <p:xfrm>
+          <a:off x="1906165" y="702888"/>
+          <a:ext cx="9226027" cy="4124960"/>
+        </p:xfrm>
+        <a:graphic>
+          <a:graphicData uri="http://schemas.openxmlformats.org/drawingml/2006/table">
+            <a:tbl>
+              <a:tblPr firstRow="1" bandRow="1">
+                <a:tableStyleId>{073A0DAA-6AF3-43AB-8588-CEC1D06C72B9}</a:tableStyleId>
+              </a:tblPr>
+              <a:tblGrid>
+                <a:gridCol w="3225936">
+                  <a:extLst>
+                    <a:ext uri="{9D8B030D-6E8A-4147-A177-3AD203B41FA5}">
+                      <a16:colId xmlns:a16="http://schemas.microsoft.com/office/drawing/2014/main" val="3209075916"/>
+                    </a:ext>
+                  </a:extLst>
+                </a:gridCol>
+                <a:gridCol w="6000091">
+                  <a:extLst>
+                    <a:ext uri="{9D8B030D-6E8A-4147-A177-3AD203B41FA5}">
+                      <a16:colId xmlns:a16="http://schemas.microsoft.com/office/drawing/2014/main" val="4058670583"/>
+                    </a:ext>
+                  </a:extLst>
+                </a:gridCol>
+              </a:tblGrid>
+              <a:tr h="370840">
+                <a:tc>
+                  <a:txBody>
+                    <a:bodyPr/>
+                    <a:lstStyle/>
+                    <a:p>
+                      <a:r>
+                        <a:rPr lang="es-MX" b="0" dirty="0"/>
+                        <a:t>Titulo</a:t>
+                      </a:r>
+                    </a:p>
+                  </a:txBody>
+                  <a:tcPr/>
+                </a:tc>
+                <a:tc>
+                  <a:txBody>
+                    <a:bodyPr/>
+                    <a:lstStyle/>
+                    <a:p>
+                      <a:r>
+                        <a:rPr lang="es-MX" dirty="0"/>
+                        <a:t>Se registra sin poner datos</a:t>
+                      </a:r>
+                    </a:p>
+                  </a:txBody>
+                  <a:tcPr/>
+                </a:tc>
+                <a:extLst>
+                  <a:ext uri="{0D108BD9-81ED-4DB2-BD59-A6C34878D82A}">
+                    <a16:rowId xmlns:a16="http://schemas.microsoft.com/office/drawing/2014/main" val="620287769"/>
+                  </a:ext>
+                </a:extLst>
+              </a:tr>
+              <a:tr h="370840">
+                <a:tc>
+                  <a:txBody>
+                    <a:bodyPr/>
+                    <a:lstStyle/>
+                    <a:p>
+                      <a:r>
+                        <a:rPr lang="es-MX" dirty="0"/>
+                        <a:t>Descripción</a:t>
+                      </a:r>
+                    </a:p>
+                  </a:txBody>
+                  <a:tcPr/>
+                </a:tc>
+                <a:tc>
+                  <a:txBody>
+                    <a:bodyPr/>
+                    <a:lstStyle/>
+                    <a:p>
+                      <a:r>
+                        <a:rPr lang="es-MX" dirty="0"/>
+                        <a:t>La pagina web permite el registro de usuario sin ingresar ningún dato</a:t>
+                      </a:r>
+                    </a:p>
+                  </a:txBody>
+                  <a:tcPr/>
+                </a:tc>
+                <a:extLst>
+                  <a:ext uri="{0D108BD9-81ED-4DB2-BD59-A6C34878D82A}">
+                    <a16:rowId xmlns:a16="http://schemas.microsoft.com/office/drawing/2014/main" val="3419308306"/>
+                  </a:ext>
+                </a:extLst>
+              </a:tr>
+              <a:tr h="546358">
+                <a:tc>
+                  <a:txBody>
+                    <a:bodyPr/>
+                    <a:lstStyle/>
+                    <a:p>
+                      <a:r>
+                        <a:rPr lang="es-MX" dirty="0"/>
+                        <a:t>Pasos</a:t>
+                      </a:r>
+                    </a:p>
+                  </a:txBody>
+                  <a:tcPr/>
+                </a:tc>
+                <a:tc>
+                  <a:txBody>
+                    <a:bodyPr/>
+                    <a:lstStyle/>
+                    <a:p>
+                      <a:pPr marL="342900" indent="-342900">
+                        <a:buAutoNum type="arabicPeriod"/>
+                      </a:pPr>
+                      <a:r>
+                        <a:rPr lang="es-MX" dirty="0"/>
+                        <a:t>Ingresar: </a:t>
+                      </a:r>
+                      <a:r>
+                        <a:rPr lang="es-MX" sz="1800" b="0" i="0" kern="1200" dirty="0">
+                          <a:solidFill>
+                            <a:schemeClr val="dk1"/>
+                          </a:solidFill>
+                          <a:effectLst/>
+                          <a:latin typeface="+mn-lt"/>
+                          <a:ea typeface="+mn-ea"/>
+                          <a:cs typeface="+mn-cs"/>
+                          <a:hlinkClick r:id="rId2" tooltip="https://demo.guru99.com/test/newtours/register.php"/>
+                        </a:rPr>
+                        <a:t>https://demo.guru99.com/test/newtours/</a:t>
+                      </a:r>
+                      <a:endParaRPr lang="es-MX" sz="1800" b="0" i="0" kern="1200" dirty="0">
+                        <a:solidFill>
+                          <a:schemeClr val="dk1"/>
+                        </a:solidFill>
+                        <a:effectLst/>
+                        <a:latin typeface="+mn-lt"/>
+                        <a:ea typeface="+mn-ea"/>
+                        <a:cs typeface="+mn-cs"/>
+                      </a:endParaRPr>
+                    </a:p>
+                    <a:p>
+                      <a:pPr marL="342900" indent="-342900">
+                        <a:buAutoNum type="arabicPeriod"/>
+                      </a:pPr>
+                      <a:r>
+                        <a:rPr lang="es-MX" sz="1800" b="0" i="0" kern="1200" dirty="0" err="1">
+                          <a:solidFill>
+                            <a:schemeClr val="dk1"/>
+                          </a:solidFill>
+                          <a:effectLst/>
+                          <a:latin typeface="+mn-lt"/>
+                          <a:ea typeface="+mn-ea"/>
+                          <a:cs typeface="+mn-cs"/>
+                        </a:rPr>
+                        <a:t>Clickear</a:t>
+                      </a:r>
+                      <a:r>
+                        <a:rPr lang="es-MX" sz="1800" b="0" i="0" kern="1200" dirty="0">
+                          <a:solidFill>
+                            <a:schemeClr val="dk1"/>
+                          </a:solidFill>
+                          <a:effectLst/>
+                          <a:latin typeface="+mn-lt"/>
+                          <a:ea typeface="+mn-ea"/>
+                          <a:cs typeface="+mn-cs"/>
+                        </a:rPr>
+                        <a:t> en la opción “</a:t>
+                      </a:r>
+                      <a:r>
+                        <a:rPr lang="es-MX" sz="1800" b="0" i="0" kern="1200" dirty="0" err="1">
+                          <a:solidFill>
+                            <a:schemeClr val="dk1"/>
+                          </a:solidFill>
+                          <a:effectLst/>
+                          <a:latin typeface="+mn-lt"/>
+                          <a:ea typeface="+mn-ea"/>
+                          <a:cs typeface="+mn-cs"/>
+                        </a:rPr>
+                        <a:t>Register</a:t>
+                      </a:r>
+                      <a:r>
+                        <a:rPr lang="es-MX" sz="1800" b="0" i="0" kern="1200" dirty="0">
+                          <a:solidFill>
+                            <a:schemeClr val="dk1"/>
+                          </a:solidFill>
+                          <a:effectLst/>
+                          <a:latin typeface="+mn-lt"/>
+                          <a:ea typeface="+mn-ea"/>
+                          <a:cs typeface="+mn-cs"/>
+                        </a:rPr>
+                        <a:t>”</a:t>
+                      </a:r>
+                    </a:p>
+                    <a:p>
+                      <a:pPr marL="342900" indent="-342900">
+                        <a:buAutoNum type="arabicPeriod"/>
+                      </a:pPr>
+                      <a:r>
+                        <a:rPr lang="es-MX" sz="1800" b="0" i="0" kern="1200" dirty="0">
+                          <a:solidFill>
+                            <a:schemeClr val="dk1"/>
+                          </a:solidFill>
+                          <a:effectLst/>
+                          <a:latin typeface="+mn-lt"/>
+                          <a:ea typeface="+mn-ea"/>
+                          <a:cs typeface="+mn-cs"/>
+                        </a:rPr>
+                        <a:t>No introducir datos</a:t>
+                      </a:r>
+                    </a:p>
+                    <a:p>
+                      <a:pPr marL="342900" indent="-342900">
+                        <a:buAutoNum type="arabicPeriod"/>
+                      </a:pPr>
+                      <a:r>
+                        <a:rPr lang="es-MX" sz="1800" b="0" i="0" kern="1200" dirty="0" err="1">
+                          <a:solidFill>
+                            <a:schemeClr val="dk1"/>
+                          </a:solidFill>
+                          <a:effectLst/>
+                          <a:latin typeface="+mn-lt"/>
+                          <a:ea typeface="+mn-ea"/>
+                          <a:cs typeface="+mn-cs"/>
+                        </a:rPr>
+                        <a:t>Clickear</a:t>
+                      </a:r>
+                      <a:r>
+                        <a:rPr lang="es-MX" sz="1800" b="0" i="0" kern="1200" dirty="0">
+                          <a:solidFill>
+                            <a:schemeClr val="dk1"/>
+                          </a:solidFill>
+                          <a:effectLst/>
+                          <a:latin typeface="+mn-lt"/>
+                          <a:ea typeface="+mn-ea"/>
+                          <a:cs typeface="+mn-cs"/>
+                        </a:rPr>
+                        <a:t> en el botón “Enviar”</a:t>
+                      </a:r>
+                    </a:p>
+                  </a:txBody>
+                  <a:tcPr/>
+                </a:tc>
+                <a:extLst>
+                  <a:ext uri="{0D108BD9-81ED-4DB2-BD59-A6C34878D82A}">
+                    <a16:rowId xmlns:a16="http://schemas.microsoft.com/office/drawing/2014/main" val="1746594758"/>
+                  </a:ext>
+                </a:extLst>
+              </a:tr>
+              <a:tr h="370840">
+                <a:tc>
+                  <a:txBody>
+                    <a:bodyPr/>
+                    <a:lstStyle/>
+                    <a:p>
+                      <a:r>
+                        <a:rPr lang="es-MX" dirty="0"/>
+                        <a:t>Precondiciones</a:t>
+                      </a:r>
+                    </a:p>
+                  </a:txBody>
+                  <a:tcPr/>
+                </a:tc>
+                <a:tc>
+                  <a:txBody>
+                    <a:bodyPr/>
+                    <a:lstStyle/>
+                    <a:p>
+                      <a:r>
+                        <a:rPr lang="es-MX" dirty="0"/>
+                        <a:t>Un navegador de internet.</a:t>
+                      </a:r>
+                    </a:p>
+                    <a:p>
+                      <a:r>
+                        <a:rPr lang="es-MX" dirty="0"/>
+                        <a:t>No tener usuario en la pagina.</a:t>
+                      </a:r>
+                    </a:p>
+                  </a:txBody>
+                  <a:tcPr/>
+                </a:tc>
+                <a:extLst>
+                  <a:ext uri="{0D108BD9-81ED-4DB2-BD59-A6C34878D82A}">
+                    <a16:rowId xmlns:a16="http://schemas.microsoft.com/office/drawing/2014/main" val="2161702613"/>
+                  </a:ext>
+                </a:extLst>
+              </a:tr>
+              <a:tr h="370840">
+                <a:tc>
+                  <a:txBody>
+                    <a:bodyPr/>
+                    <a:lstStyle/>
+                    <a:p>
+                      <a:r>
+                        <a:rPr lang="es-MX" dirty="0"/>
+                        <a:t>Resultado esperado</a:t>
+                      </a:r>
+                    </a:p>
+                  </a:txBody>
+                  <a:tcPr/>
+                </a:tc>
+                <a:tc>
+                  <a:txBody>
+                    <a:bodyPr/>
+                    <a:lstStyle/>
+                    <a:p>
+                      <a:r>
+                        <a:rPr lang="es-MX" dirty="0"/>
+                        <a:t>No permitir el registro de usuario sin completar los datos del formulario.</a:t>
+                      </a:r>
+                    </a:p>
+                    <a:p>
+                      <a:endParaRPr lang="es-MX" dirty="0"/>
+                    </a:p>
+                  </a:txBody>
+                  <a:tcPr/>
+                </a:tc>
+                <a:extLst>
+                  <a:ext uri="{0D108BD9-81ED-4DB2-BD59-A6C34878D82A}">
+                    <a16:rowId xmlns:a16="http://schemas.microsoft.com/office/drawing/2014/main" val="3394570666"/>
+                  </a:ext>
+                </a:extLst>
+              </a:tr>
+              <a:tr h="370840">
+                <a:tc>
+                  <a:txBody>
+                    <a:bodyPr/>
+                    <a:lstStyle/>
+                    <a:p>
+                      <a:r>
+                        <a:rPr lang="es-MX" dirty="0"/>
+                        <a:t>Resultado obtenido</a:t>
+                      </a:r>
+                    </a:p>
+                  </a:txBody>
+                  <a:tcPr/>
+                </a:tc>
+                <a:tc>
+                  <a:txBody>
+                    <a:bodyPr/>
+                    <a:lstStyle/>
+                    <a:p>
+                      <a:r>
+                        <a:rPr lang="es-MX" dirty="0"/>
+                        <a:t>Permite el registro de usuario sin rellenar el formulario.</a:t>
+                      </a:r>
+                    </a:p>
+                  </a:txBody>
+                  <a:tcPr/>
+                </a:tc>
+                <a:extLst>
+                  <a:ext uri="{0D108BD9-81ED-4DB2-BD59-A6C34878D82A}">
+                    <a16:rowId xmlns:a16="http://schemas.microsoft.com/office/drawing/2014/main" val="1327796877"/>
+                  </a:ext>
+                </a:extLst>
+              </a:tr>
+            </a:tbl>
+          </a:graphicData>
+        </a:graphic>
+      </p:graphicFrame>
+    </p:spTree>
+    <p:extLst>
+      <p:ext uri="{BB962C8B-B14F-4D97-AF65-F5344CB8AC3E}">
+        <p14:creationId xmlns:p14="http://schemas.microsoft.com/office/powerpoint/2010/main" val="2419145179"/>
+      </p:ext>
+    </p:extLst>
+  </p:cSld>
+  <p:clrMapOvr>
+    <a:masterClrMapping/>
+  </p:clrMapOvr>
+</p:sld>
+</file>
+
+<file path=ppt/slides/slide21.xml><?xml version="1.0" encoding="utf-8"?>
+<p:sld xmlns:a="http://schemas.openxmlformats.org/drawingml/2006/main" xmlns:r="http://schemas.openxmlformats.org/officeDocument/2006/relationships" xmlns:p="http://schemas.openxmlformats.org/presentationml/2006/main">
+  <p:cSld>
+    <p:spTree>
+      <p:nvGrpSpPr>
+        <p:cNvPr id="1" name=""/>
+        <p:cNvGrpSpPr/>
+        <p:nvPr/>
+      </p:nvGrpSpPr>
+      <p:grpSpPr>
+        <a:xfrm>
+          <a:off x="0" y="0"/>
+          <a:ext cx="0" cy="0"/>
+          <a:chOff x="0" y="0"/>
+          <a:chExt cx="0" cy="0"/>
+        </a:xfrm>
+      </p:grpSpPr>
+      <p:pic>
+        <p:nvPicPr>
+          <p:cNvPr id="5" name="Imagen 4">
+            <a:extLst>
+              <a:ext uri="{FF2B5EF4-FFF2-40B4-BE49-F238E27FC236}">
+                <a16:creationId xmlns:a16="http://schemas.microsoft.com/office/drawing/2014/main" id="{F3436DEC-BDAD-4AD9-A7BA-329A9A99CBEC}"/>
+              </a:ext>
+            </a:extLst>
+          </p:cNvPr>
+          <p:cNvPicPr>
+            <a:picLocks noChangeAspect="1"/>
+          </p:cNvPicPr>
+          <p:nvPr/>
+        </p:nvPicPr>
+        <p:blipFill>
+          <a:blip r:embed="rId2">
+            <a:extLst>
+              <a:ext uri="{28A0092B-C50C-407E-A947-70E740481C1C}">
+                <a14:useLocalDpi xmlns:a14="http://schemas.microsoft.com/office/drawing/2010/main" val="0"/>
+              </a:ext>
+            </a:extLst>
+          </a:blip>
+          <a:stretch>
+            <a:fillRect/>
+          </a:stretch>
+        </p:blipFill>
+        <p:spPr>
+          <a:xfrm>
+            <a:off x="1466169" y="0"/>
+            <a:ext cx="9259661" cy="6858000"/>
+          </a:xfrm>
+          <a:prstGeom prst="rect">
+            <a:avLst/>
+          </a:prstGeom>
+        </p:spPr>
+      </p:pic>
+    </p:spTree>
+    <p:extLst>
+      <p:ext uri="{BB962C8B-B14F-4D97-AF65-F5344CB8AC3E}">
+        <p14:creationId xmlns:p14="http://schemas.microsoft.com/office/powerpoint/2010/main" val="2812204038"/>
+      </p:ext>
+    </p:extLst>
+  </p:cSld>
+  <p:clrMapOvr>
+    <a:masterClrMapping/>
+  </p:clrMapOvr>
+</p:sld>
+</file>
+
+<file path=ppt/slides/slide22.xml><?xml version="1.0" encoding="utf-8"?>
+<p:sld xmlns:a="http://schemas.openxmlformats.org/drawingml/2006/main" xmlns:r="http://schemas.openxmlformats.org/officeDocument/2006/relationships" xmlns:p="http://schemas.openxmlformats.org/presentationml/2006/main">
+  <p:cSld>
+    <p:spTree>
+      <p:nvGrpSpPr>
+        <p:cNvPr id="1" name=""/>
+        <p:cNvGrpSpPr/>
+        <p:nvPr/>
+      </p:nvGrpSpPr>
+      <p:grpSpPr>
+        <a:xfrm>
+          <a:off x="0" y="0"/>
+          <a:ext cx="0" cy="0"/>
+          <a:chOff x="0" y="0"/>
+          <a:chExt cx="0" cy="0"/>
+        </a:xfrm>
+      </p:grpSpPr>
+      <p:pic>
+        <p:nvPicPr>
+          <p:cNvPr id="5" name="Imagen 4">
+            <a:extLst>
+              <a:ext uri="{FF2B5EF4-FFF2-40B4-BE49-F238E27FC236}">
+                <a16:creationId xmlns:a16="http://schemas.microsoft.com/office/drawing/2014/main" id="{7570E8AB-768D-401A-BD28-EBCAEE7A3183}"/>
+              </a:ext>
+            </a:extLst>
+          </p:cNvPr>
+          <p:cNvPicPr>
+            <a:picLocks noChangeAspect="1"/>
+          </p:cNvPicPr>
+          <p:nvPr/>
+        </p:nvPicPr>
+        <p:blipFill>
+          <a:blip r:embed="rId2">
+            <a:extLst>
+              <a:ext uri="{28A0092B-C50C-407E-A947-70E740481C1C}">
+                <a14:useLocalDpi xmlns:a14="http://schemas.microsoft.com/office/drawing/2010/main" val="0"/>
+              </a:ext>
+            </a:extLst>
+          </a:blip>
+          <a:stretch>
+            <a:fillRect/>
+          </a:stretch>
+        </p:blipFill>
+        <p:spPr>
+          <a:xfrm>
+            <a:off x="1470117" y="0"/>
+            <a:ext cx="9251766" cy="6858000"/>
+          </a:xfrm>
+          <a:prstGeom prst="rect">
+            <a:avLst/>
+          </a:prstGeom>
+        </p:spPr>
+      </p:pic>
+    </p:spTree>
+    <p:extLst>
+      <p:ext uri="{BB962C8B-B14F-4D97-AF65-F5344CB8AC3E}">
+        <p14:creationId xmlns:p14="http://schemas.microsoft.com/office/powerpoint/2010/main" val="2382331383"/>
+      </p:ext>
+    </p:extLst>
+  </p:cSld>
+  <p:clrMapOvr>
+    <a:masterClrMapping/>
+  </p:clrMapOvr>
+</p:sld>
+</file>
+
+<file path=ppt/slides/slide23.xml><?xml version="1.0" encoding="utf-8"?>
+<p:sld xmlns:a="http://schemas.openxmlformats.org/drawingml/2006/main" xmlns:r="http://schemas.openxmlformats.org/officeDocument/2006/relationships" xmlns:p="http://schemas.openxmlformats.org/presentationml/2006/main">
+  <p:cSld>
+    <p:spTree>
+      <p:nvGrpSpPr>
+        <p:cNvPr id="1" name=""/>
+        <p:cNvGrpSpPr/>
+        <p:nvPr/>
+      </p:nvGrpSpPr>
+      <p:grpSpPr>
+        <a:xfrm>
+          <a:off x="0" y="0"/>
+          <a:ext cx="0" cy="0"/>
+          <a:chOff x="0" y="0"/>
+          <a:chExt cx="0" cy="0"/>
+        </a:xfrm>
+      </p:grpSpPr>
+      <p:sp>
+        <p:nvSpPr>
+          <p:cNvPr id="3" name="Marcador de contenido 2">
+            <a:extLst>
+              <a:ext uri="{FF2B5EF4-FFF2-40B4-BE49-F238E27FC236}">
+                <a16:creationId xmlns:a16="http://schemas.microsoft.com/office/drawing/2014/main" id="{92B21EB1-16D8-4115-B95F-C2B296511F5E}"/>
+              </a:ext>
+            </a:extLst>
+          </p:cNvPr>
+          <p:cNvSpPr>
+            <a:spLocks noGrp="1"/>
+          </p:cNvSpPr>
+          <p:nvPr>
+            <p:ph idx="1"/>
+          </p:nvPr>
+        </p:nvSpPr>
+        <p:spPr/>
+        <p:txBody>
+          <a:bodyPr>
+            <a:normAutofit/>
+          </a:bodyPr>
+          <a:lstStyle/>
+          <a:p>
+            <a:pPr algn="ctr"/>
+            <a:r>
+              <a:rPr lang="es-ES" sz="8800" dirty="0">
+                <a:solidFill>
+                  <a:srgbClr val="FF0000"/>
+                </a:solidFill>
+              </a:rPr>
+              <a:t>QUINTO BUG</a:t>
+            </a:r>
+            <a:endParaRPr lang="es-MX" sz="8800" dirty="0">
+              <a:solidFill>
+                <a:srgbClr val="FF0000"/>
+              </a:solidFill>
+            </a:endParaRPr>
+          </a:p>
+        </p:txBody>
+      </p:sp>
+    </p:spTree>
+    <p:extLst>
+      <p:ext uri="{BB962C8B-B14F-4D97-AF65-F5344CB8AC3E}">
+        <p14:creationId xmlns:p14="http://schemas.microsoft.com/office/powerpoint/2010/main" val="522282737"/>
+      </p:ext>
+    </p:extLst>
+  </p:cSld>
+  <p:clrMapOvr>
+    <a:masterClrMapping/>
+  </p:clrMapOvr>
+</p:sld>
+</file>
+
+<file path=ppt/slides/slide24.xml><?xml version="1.0" encoding="utf-8"?>
+<p:sld xmlns:a="http://schemas.openxmlformats.org/drawingml/2006/main" xmlns:r="http://schemas.openxmlformats.org/officeDocument/2006/relationships" xmlns:p="http://schemas.openxmlformats.org/presentationml/2006/main">
+  <p:cSld>
+    <p:spTree>
+      <p:nvGrpSpPr>
+        <p:cNvPr id="1" name=""/>
+        <p:cNvGrpSpPr/>
+        <p:nvPr/>
+      </p:nvGrpSpPr>
+      <p:grpSpPr>
+        <a:xfrm>
+          <a:off x="0" y="0"/>
+          <a:ext cx="0" cy="0"/>
+          <a:chOff x="0" y="0"/>
+          <a:chExt cx="0" cy="0"/>
+        </a:xfrm>
+      </p:grpSpPr>
+      <p:sp>
+        <p:nvSpPr>
+          <p:cNvPr id="6" name="CuadroTexto 5">
+            <a:extLst>
+              <a:ext uri="{FF2B5EF4-FFF2-40B4-BE49-F238E27FC236}">
+                <a16:creationId xmlns:a16="http://schemas.microsoft.com/office/drawing/2014/main" id="{3A2FCBCC-2802-4A1C-8600-C607D303FE34}"/>
+              </a:ext>
+            </a:extLst>
+          </p:cNvPr>
+          <p:cNvSpPr txBox="1"/>
+          <p:nvPr/>
+        </p:nvSpPr>
+        <p:spPr>
+          <a:xfrm>
+            <a:off x="956346" y="352338"/>
+            <a:ext cx="3624044" cy="923330"/>
+          </a:xfrm>
+          <a:prstGeom prst="rect">
+            <a:avLst/>
+          </a:prstGeom>
+          <a:noFill/>
+        </p:spPr>
+        <p:txBody>
+          <a:bodyPr wrap="square" rtlCol="0">
+            <a:spAutoFit/>
+          </a:bodyPr>
+          <a:lstStyle/>
+          <a:p>
+            <a:r>
+              <a:rPr lang="es-ES" dirty="0">
+                <a:solidFill>
+                  <a:srgbClr val="FF0000"/>
+                </a:solidFill>
+              </a:rPr>
+              <a:t>Quinto bug.</a:t>
+            </a:r>
+          </a:p>
+          <a:p>
+            <a:endParaRPr lang="es-ES" dirty="0"/>
+          </a:p>
+          <a:p>
+            <a:r>
+              <a:rPr lang="es-MX" dirty="0"/>
+              <a:t>Abrimos la pagina web </a:t>
+            </a:r>
+            <a:r>
+              <a:rPr lang="es-MX" dirty="0">
+                <a:solidFill>
+                  <a:schemeClr val="accent1"/>
+                </a:solidFill>
+              </a:rPr>
+              <a:t>Guru99</a:t>
+            </a:r>
+            <a:endParaRPr lang="es-ES" dirty="0">
+              <a:solidFill>
+                <a:schemeClr val="accent1"/>
+              </a:solidFill>
+            </a:endParaRPr>
+          </a:p>
+        </p:txBody>
+      </p:sp>
+      <p:pic>
+        <p:nvPicPr>
+          <p:cNvPr id="8" name="Imagen 7">
+            <a:extLst>
+              <a:ext uri="{FF2B5EF4-FFF2-40B4-BE49-F238E27FC236}">
+                <a16:creationId xmlns:a16="http://schemas.microsoft.com/office/drawing/2014/main" id="{B82B36F6-5A96-4C9C-A398-DC9700791FB2}"/>
+              </a:ext>
+            </a:extLst>
+          </p:cNvPr>
+          <p:cNvPicPr>
+            <a:picLocks noChangeAspect="1"/>
+          </p:cNvPicPr>
+          <p:nvPr/>
+        </p:nvPicPr>
+        <p:blipFill>
+          <a:blip r:embed="rId2">
+            <a:extLst>
+              <a:ext uri="{28A0092B-C50C-407E-A947-70E740481C1C}">
+                <a14:useLocalDpi xmlns:a14="http://schemas.microsoft.com/office/drawing/2010/main" val="0"/>
+              </a:ext>
+            </a:extLst>
+          </a:blip>
+          <a:stretch>
+            <a:fillRect/>
+          </a:stretch>
+        </p:blipFill>
+        <p:spPr>
+          <a:xfrm>
+            <a:off x="696286" y="1275668"/>
+            <a:ext cx="9968312" cy="5582332"/>
+          </a:xfrm>
+          <a:prstGeom prst="rect">
+            <a:avLst/>
+          </a:prstGeom>
+        </p:spPr>
+      </p:pic>
+    </p:spTree>
+    <p:extLst>
+      <p:ext uri="{BB962C8B-B14F-4D97-AF65-F5344CB8AC3E}">
+        <p14:creationId xmlns:p14="http://schemas.microsoft.com/office/powerpoint/2010/main" val="1630410460"/>
+      </p:ext>
+    </p:extLst>
+  </p:cSld>
+  <p:clrMapOvr>
+    <a:masterClrMapping/>
+  </p:clrMapOvr>
+</p:sld>
+</file>
+
+<file path=ppt/slides/slide25.xml><?xml version="1.0" encoding="utf-8"?>
+<p:sld xmlns:a="http://schemas.openxmlformats.org/drawingml/2006/main" xmlns:r="http://schemas.openxmlformats.org/officeDocument/2006/relationships" xmlns:p="http://schemas.openxmlformats.org/presentationml/2006/main">
+  <p:cSld>
+    <p:spTree>
+      <p:nvGrpSpPr>
+        <p:cNvPr id="1" name=""/>
+        <p:cNvGrpSpPr/>
+        <p:nvPr/>
+      </p:nvGrpSpPr>
+      <p:grpSpPr>
+        <a:xfrm>
+          <a:off x="0" y="0"/>
+          <a:ext cx="0" cy="0"/>
+          <a:chOff x="0" y="0"/>
+          <a:chExt cx="0" cy="0"/>
+        </a:xfrm>
+      </p:grpSpPr>
+      <p:pic>
+        <p:nvPicPr>
+          <p:cNvPr id="5" name="Imagen 4">
+            <a:extLst>
+              <a:ext uri="{FF2B5EF4-FFF2-40B4-BE49-F238E27FC236}">
+                <a16:creationId xmlns:a16="http://schemas.microsoft.com/office/drawing/2014/main" id="{6C94A0B5-90A8-49CD-96C2-8C936F33F451}"/>
+              </a:ext>
+            </a:extLst>
+          </p:cNvPr>
+          <p:cNvPicPr>
+            <a:picLocks noChangeAspect="1"/>
+          </p:cNvPicPr>
+          <p:nvPr/>
+        </p:nvPicPr>
+        <p:blipFill>
+          <a:blip r:embed="rId2">
+            <a:extLst>
+              <a:ext uri="{28A0092B-C50C-407E-A947-70E740481C1C}">
+                <a14:useLocalDpi xmlns:a14="http://schemas.microsoft.com/office/drawing/2010/main" val="0"/>
+              </a:ext>
+            </a:extLst>
+          </a:blip>
+          <a:stretch>
+            <a:fillRect/>
+          </a:stretch>
+        </p:blipFill>
+        <p:spPr>
+          <a:xfrm>
+            <a:off x="1430533" y="0"/>
+            <a:ext cx="9330934" cy="6858000"/>
+          </a:xfrm>
+          <a:prstGeom prst="rect">
+            <a:avLst/>
+          </a:prstGeom>
+        </p:spPr>
+      </p:pic>
+    </p:spTree>
+    <p:extLst>
+      <p:ext uri="{BB962C8B-B14F-4D97-AF65-F5344CB8AC3E}">
+        <p14:creationId xmlns:p14="http://schemas.microsoft.com/office/powerpoint/2010/main" val="1129012792"/>
+      </p:ext>
+    </p:extLst>
+  </p:cSld>
+  <p:clrMapOvr>
+    <a:masterClrMapping/>
+  </p:clrMapOvr>
+</p:sld>
+</file>
+
+<file path=ppt/slides/slide26.xml><?xml version="1.0" encoding="utf-8"?>
+<p:sld xmlns:a="http://schemas.openxmlformats.org/drawingml/2006/main" xmlns:r="http://schemas.openxmlformats.org/officeDocument/2006/relationships" xmlns:p="http://schemas.openxmlformats.org/presentationml/2006/main">
+  <p:cSld>
+    <p:spTree>
+      <p:nvGrpSpPr>
+        <p:cNvPr id="1" name=""/>
+        <p:cNvGrpSpPr/>
+        <p:nvPr/>
+      </p:nvGrpSpPr>
+      <p:grpSpPr>
+        <a:xfrm>
+          <a:off x="0" y="0"/>
+          <a:ext cx="0" cy="0"/>
+          <a:chOff x="0" y="0"/>
+          <a:chExt cx="0" cy="0"/>
+        </a:xfrm>
+      </p:grpSpPr>
+      <p:graphicFrame>
+        <p:nvGraphicFramePr>
+          <p:cNvPr id="6" name="Tabla 5">
+            <a:extLst>
+              <a:ext uri="{FF2B5EF4-FFF2-40B4-BE49-F238E27FC236}">
+                <a16:creationId xmlns:a16="http://schemas.microsoft.com/office/drawing/2014/main" id="{64A58262-4EA2-4839-99EC-5752F7DFC20C}"/>
+              </a:ext>
+            </a:extLst>
+          </p:cNvPr>
+          <p:cNvGraphicFramePr>
+            <a:graphicFrameLocks noGrp="1"/>
+          </p:cNvGraphicFramePr>
+          <p:nvPr>
+            <p:extLst>
+              <p:ext uri="{D42A27DB-BD31-4B8C-83A1-F6EECF244321}">
+                <p14:modId xmlns:p14="http://schemas.microsoft.com/office/powerpoint/2010/main" val="1014330021"/>
+              </p:ext>
+            </p:extLst>
+          </p:nvPr>
+        </p:nvGraphicFramePr>
+        <p:xfrm>
+          <a:off x="1906165" y="702888"/>
+          <a:ext cx="9226027" cy="3307080"/>
+        </p:xfrm>
+        <a:graphic>
+          <a:graphicData uri="http://schemas.openxmlformats.org/drawingml/2006/table">
+            <a:tbl>
+              <a:tblPr firstRow="1" bandRow="1">
+                <a:tableStyleId>{073A0DAA-6AF3-43AB-8588-CEC1D06C72B9}</a:tableStyleId>
+              </a:tblPr>
+              <a:tblGrid>
+                <a:gridCol w="3225936">
+                  <a:extLst>
+                    <a:ext uri="{9D8B030D-6E8A-4147-A177-3AD203B41FA5}">
+                      <a16:colId xmlns:a16="http://schemas.microsoft.com/office/drawing/2014/main" val="3209075916"/>
+                    </a:ext>
+                  </a:extLst>
+                </a:gridCol>
+                <a:gridCol w="6000091">
+                  <a:extLst>
+                    <a:ext uri="{9D8B030D-6E8A-4147-A177-3AD203B41FA5}">
+                      <a16:colId xmlns:a16="http://schemas.microsoft.com/office/drawing/2014/main" val="4058670583"/>
+                    </a:ext>
+                  </a:extLst>
+                </a:gridCol>
+              </a:tblGrid>
+              <a:tr h="370840">
+                <a:tc>
+                  <a:txBody>
+                    <a:bodyPr/>
+                    <a:lstStyle/>
+                    <a:p>
+                      <a:r>
+                        <a:rPr lang="es-MX" b="0" dirty="0"/>
+                        <a:t>Titulo</a:t>
+                      </a:r>
+                    </a:p>
+                  </a:txBody>
+                  <a:tcPr/>
+                </a:tc>
+                <a:tc>
+                  <a:txBody>
+                    <a:bodyPr/>
+                    <a:lstStyle/>
+                    <a:p>
+                      <a:r>
+                        <a:rPr lang="es-MX" dirty="0"/>
+                        <a:t>Link </a:t>
+                      </a:r>
+                      <a:r>
+                        <a:rPr lang="es-MX" sz="1800" b="0" i="0" u="sng" kern="1200" dirty="0">
+                          <a:solidFill>
+                            <a:schemeClr val="lt1"/>
+                          </a:solidFill>
+                          <a:effectLst/>
+                          <a:latin typeface="+mn-lt"/>
+                          <a:ea typeface="+mn-ea"/>
+                          <a:cs typeface="+mn-cs"/>
+                        </a:rPr>
+                        <a:t>incorrecto</a:t>
+                      </a:r>
+                      <a:endParaRPr lang="es-MX" dirty="0"/>
+                    </a:p>
+                  </a:txBody>
+                  <a:tcPr/>
+                </a:tc>
+                <a:extLst>
+                  <a:ext uri="{0D108BD9-81ED-4DB2-BD59-A6C34878D82A}">
+                    <a16:rowId xmlns:a16="http://schemas.microsoft.com/office/drawing/2014/main" val="620287769"/>
+                  </a:ext>
+                </a:extLst>
+              </a:tr>
+              <a:tr h="370840">
+                <a:tc>
+                  <a:txBody>
+                    <a:bodyPr/>
+                    <a:lstStyle/>
+                    <a:p>
+                      <a:r>
+                        <a:rPr lang="es-MX" dirty="0"/>
+                        <a:t>Descripción</a:t>
+                      </a:r>
+                    </a:p>
+                  </a:txBody>
+                  <a:tcPr/>
+                </a:tc>
+                <a:tc>
+                  <a:txBody>
+                    <a:bodyPr/>
+                    <a:lstStyle/>
+                    <a:p>
+                      <a:r>
+                        <a:rPr lang="es-MX" dirty="0"/>
+                        <a:t>El link </a:t>
+                      </a:r>
+                      <a:r>
+                        <a:rPr lang="es-MX" dirty="0">
+                          <a:hlinkClick r:id="rId2"/>
+                        </a:rPr>
+                        <a:t>“</a:t>
+                      </a:r>
+                      <a:r>
+                        <a:rPr lang="es-MX" sz="1800" b="0" i="0" u="sng" kern="1200" dirty="0">
+                          <a:solidFill>
+                            <a:schemeClr val="dk1"/>
+                          </a:solidFill>
+                          <a:effectLst/>
+                          <a:latin typeface="+mn-lt"/>
+                          <a:ea typeface="+mn-ea"/>
+                          <a:cs typeface="+mn-cs"/>
+                          <a:hlinkClick r:id="rId2"/>
+                        </a:rPr>
+                        <a:t>Business </a:t>
+                      </a:r>
+                      <a:r>
+                        <a:rPr lang="es-MX" sz="1800" b="0" i="0" u="sng" kern="1200" dirty="0" err="1">
+                          <a:solidFill>
+                            <a:schemeClr val="dk1"/>
+                          </a:solidFill>
+                          <a:effectLst/>
+                          <a:latin typeface="+mn-lt"/>
+                          <a:ea typeface="+mn-ea"/>
+                          <a:cs typeface="+mn-cs"/>
+                          <a:hlinkClick r:id="rId2"/>
+                        </a:rPr>
+                        <a:t>Travel</a:t>
+                      </a:r>
+                      <a:r>
+                        <a:rPr lang="es-MX" sz="1800" b="0" i="0" u="sng" kern="1200" dirty="0">
+                          <a:solidFill>
+                            <a:schemeClr val="dk1"/>
+                          </a:solidFill>
+                          <a:effectLst/>
+                          <a:latin typeface="+mn-lt"/>
+                          <a:ea typeface="+mn-ea"/>
+                          <a:cs typeface="+mn-cs"/>
+                          <a:hlinkClick r:id="rId2"/>
+                        </a:rPr>
+                        <a:t> @ About.com</a:t>
+                      </a:r>
+                      <a:r>
+                        <a:rPr lang="es-MX" sz="1800" b="0" i="0" u="sng" kern="1200" dirty="0">
+                          <a:solidFill>
+                            <a:schemeClr val="dk1"/>
+                          </a:solidFill>
+                          <a:effectLst/>
+                          <a:latin typeface="+mn-lt"/>
+                          <a:ea typeface="+mn-ea"/>
+                          <a:cs typeface="+mn-cs"/>
+                        </a:rPr>
+                        <a:t>” es incorrecto.</a:t>
+                      </a:r>
+                      <a:endParaRPr lang="es-MX" dirty="0"/>
+                    </a:p>
+                  </a:txBody>
+                  <a:tcPr/>
+                </a:tc>
+                <a:extLst>
+                  <a:ext uri="{0D108BD9-81ED-4DB2-BD59-A6C34878D82A}">
+                    <a16:rowId xmlns:a16="http://schemas.microsoft.com/office/drawing/2014/main" val="3419308306"/>
+                  </a:ext>
+                </a:extLst>
+              </a:tr>
+              <a:tr h="546358">
+                <a:tc>
+                  <a:txBody>
+                    <a:bodyPr/>
+                    <a:lstStyle/>
+                    <a:p>
+                      <a:r>
+                        <a:rPr lang="es-MX" dirty="0"/>
+                        <a:t>Pasos</a:t>
+                      </a:r>
+                    </a:p>
+                  </a:txBody>
+                  <a:tcPr/>
+                </a:tc>
+                <a:tc>
+                  <a:txBody>
+                    <a:bodyPr/>
+                    <a:lstStyle/>
+                    <a:p>
+                      <a:pPr marL="342900" indent="-342900">
+                        <a:buAutoNum type="arabicPeriod"/>
+                      </a:pPr>
+                      <a:r>
+                        <a:rPr lang="es-MX" dirty="0"/>
+                        <a:t>Ingresar: </a:t>
+                      </a:r>
+                      <a:r>
+                        <a:rPr lang="es-MX" sz="1800" b="0" i="0" kern="1200" dirty="0">
+                          <a:solidFill>
+                            <a:schemeClr val="dk1"/>
+                          </a:solidFill>
+                          <a:effectLst/>
+                          <a:latin typeface="+mn-lt"/>
+                          <a:ea typeface="+mn-ea"/>
+                          <a:cs typeface="+mn-cs"/>
+                          <a:hlinkClick r:id="rId3" tooltip="https://demo.guru99.com/test/newtours/register.php"/>
+                        </a:rPr>
+                        <a:t>https://demo.guru99.com/test/newtours/</a:t>
+                      </a:r>
+                      <a:endParaRPr lang="es-MX" sz="1800" b="0" i="0" kern="1200" dirty="0">
+                        <a:solidFill>
+                          <a:schemeClr val="dk1"/>
+                        </a:solidFill>
+                        <a:effectLst/>
+                        <a:latin typeface="+mn-lt"/>
+                        <a:ea typeface="+mn-ea"/>
+                        <a:cs typeface="+mn-cs"/>
+                      </a:endParaRPr>
+                    </a:p>
+                    <a:p>
+                      <a:pPr marL="342900" indent="-342900">
+                        <a:buAutoNum type="arabicPeriod"/>
+                      </a:pPr>
+                      <a:r>
+                        <a:rPr lang="es-MX" sz="1800" b="0" i="0" kern="1200" dirty="0">
+                          <a:solidFill>
+                            <a:schemeClr val="dk1"/>
+                          </a:solidFill>
+                          <a:effectLst/>
+                          <a:latin typeface="+mn-lt"/>
+                          <a:ea typeface="+mn-ea"/>
+                          <a:cs typeface="+mn-cs"/>
+                        </a:rPr>
+                        <a:t>Abajo a la derecha dar </a:t>
+                      </a:r>
+                      <a:r>
+                        <a:rPr lang="es-MX" sz="1800" b="0" i="0" kern="1200" dirty="0" err="1">
+                          <a:solidFill>
+                            <a:schemeClr val="dk1"/>
+                          </a:solidFill>
+                          <a:effectLst/>
+                          <a:latin typeface="+mn-lt"/>
+                          <a:ea typeface="+mn-ea"/>
+                          <a:cs typeface="+mn-cs"/>
+                        </a:rPr>
+                        <a:t>click</a:t>
+                      </a:r>
+                      <a:r>
+                        <a:rPr lang="es-MX" sz="1800" b="0" i="0" kern="1200" dirty="0">
+                          <a:solidFill>
+                            <a:schemeClr val="dk1"/>
+                          </a:solidFill>
+                          <a:effectLst/>
+                          <a:latin typeface="+mn-lt"/>
+                          <a:ea typeface="+mn-ea"/>
+                          <a:cs typeface="+mn-cs"/>
+                        </a:rPr>
+                        <a:t> en </a:t>
+                      </a:r>
+                      <a:r>
+                        <a:rPr lang="es-MX" sz="1800" b="0" i="0" kern="1200" dirty="0">
+                          <a:solidFill>
+                            <a:schemeClr val="dk1"/>
+                          </a:solidFill>
+                          <a:effectLst/>
+                          <a:latin typeface="+mn-lt"/>
+                          <a:ea typeface="+mn-ea"/>
+                          <a:cs typeface="+mn-cs"/>
+                          <a:hlinkClick r:id="rId2"/>
+                        </a:rPr>
+                        <a:t>“</a:t>
+                      </a:r>
+                      <a:r>
+                        <a:rPr lang="es-MX" sz="1800" b="0" i="0" u="sng" kern="1200" dirty="0">
+                          <a:solidFill>
+                            <a:schemeClr val="dk1"/>
+                          </a:solidFill>
+                          <a:effectLst/>
+                          <a:latin typeface="+mn-lt"/>
+                          <a:ea typeface="+mn-ea"/>
+                          <a:cs typeface="+mn-cs"/>
+                          <a:hlinkClick r:id="rId2"/>
+                        </a:rPr>
+                        <a:t>Business </a:t>
+                      </a:r>
+                      <a:r>
+                        <a:rPr lang="es-MX" sz="1800" b="0" i="0" u="sng" kern="1200" dirty="0" err="1">
+                          <a:solidFill>
+                            <a:schemeClr val="dk1"/>
+                          </a:solidFill>
+                          <a:effectLst/>
+                          <a:latin typeface="+mn-lt"/>
+                          <a:ea typeface="+mn-ea"/>
+                          <a:cs typeface="+mn-cs"/>
+                          <a:hlinkClick r:id="rId2"/>
+                        </a:rPr>
+                        <a:t>Travel</a:t>
+                      </a:r>
+                      <a:r>
+                        <a:rPr lang="es-MX" sz="1800" b="0" i="0" u="sng" kern="1200" dirty="0">
+                          <a:solidFill>
+                            <a:schemeClr val="dk1"/>
+                          </a:solidFill>
+                          <a:effectLst/>
+                          <a:latin typeface="+mn-lt"/>
+                          <a:ea typeface="+mn-ea"/>
+                          <a:cs typeface="+mn-cs"/>
+                          <a:hlinkClick r:id="rId2"/>
+                        </a:rPr>
+                        <a:t> @ About.com</a:t>
+                      </a:r>
+                      <a:r>
+                        <a:rPr lang="es-MX" sz="1800" b="0" i="0" u="sng" kern="1200" dirty="0">
+                          <a:solidFill>
+                            <a:schemeClr val="dk1"/>
+                          </a:solidFill>
+                          <a:effectLst/>
+                          <a:latin typeface="+mn-lt"/>
+                          <a:ea typeface="+mn-ea"/>
+                          <a:cs typeface="+mn-cs"/>
+                        </a:rPr>
+                        <a:t>”.</a:t>
+                      </a:r>
+                      <a:endParaRPr lang="es-MX" sz="1800" b="0" i="0" kern="1200" dirty="0">
+                        <a:solidFill>
+                          <a:schemeClr val="dk1"/>
+                        </a:solidFill>
+                        <a:effectLst/>
+                        <a:latin typeface="+mn-lt"/>
+                        <a:ea typeface="+mn-ea"/>
+                        <a:cs typeface="+mn-cs"/>
+                      </a:endParaRPr>
+                    </a:p>
+                  </a:txBody>
+                  <a:tcPr/>
+                </a:tc>
+                <a:extLst>
+                  <a:ext uri="{0D108BD9-81ED-4DB2-BD59-A6C34878D82A}">
+                    <a16:rowId xmlns:a16="http://schemas.microsoft.com/office/drawing/2014/main" val="1746594758"/>
+                  </a:ext>
+                </a:extLst>
+              </a:tr>
+              <a:tr h="370840">
+                <a:tc>
+                  <a:txBody>
+                    <a:bodyPr/>
+                    <a:lstStyle/>
+                    <a:p>
+                      <a:r>
+                        <a:rPr lang="es-MX" dirty="0"/>
+                        <a:t>Precondiciones</a:t>
+                      </a:r>
+                    </a:p>
+                  </a:txBody>
+                  <a:tcPr/>
+                </a:tc>
+                <a:tc>
+                  <a:txBody>
+                    <a:bodyPr/>
+                    <a:lstStyle/>
+                    <a:p>
+                      <a:r>
+                        <a:rPr lang="es-MX" dirty="0"/>
+                        <a:t>Un navegador de internet.</a:t>
+                      </a:r>
+                    </a:p>
+                  </a:txBody>
+                  <a:tcPr/>
+                </a:tc>
+                <a:extLst>
+                  <a:ext uri="{0D108BD9-81ED-4DB2-BD59-A6C34878D82A}">
+                    <a16:rowId xmlns:a16="http://schemas.microsoft.com/office/drawing/2014/main" val="2161702613"/>
+                  </a:ext>
+                </a:extLst>
+              </a:tr>
+              <a:tr h="370840">
+                <a:tc>
+                  <a:txBody>
+                    <a:bodyPr/>
+                    <a:lstStyle/>
+                    <a:p>
+                      <a:r>
+                        <a:rPr lang="es-MX" dirty="0"/>
+                        <a:t>Resultado esperado</a:t>
+                      </a:r>
+                    </a:p>
+                  </a:txBody>
+                  <a:tcPr/>
+                </a:tc>
+                <a:tc>
+                  <a:txBody>
+                    <a:bodyPr/>
+                    <a:lstStyle/>
+                    <a:p>
+                      <a:r>
+                        <a:rPr lang="es-MX" dirty="0"/>
+                        <a:t>Redirigir al link del mail.</a:t>
+                      </a:r>
+                    </a:p>
+                    <a:p>
+                      <a:endParaRPr lang="es-MX" dirty="0"/>
+                    </a:p>
+                  </a:txBody>
+                  <a:tcPr/>
+                </a:tc>
+                <a:extLst>
+                  <a:ext uri="{0D108BD9-81ED-4DB2-BD59-A6C34878D82A}">
+                    <a16:rowId xmlns:a16="http://schemas.microsoft.com/office/drawing/2014/main" val="3394570666"/>
+                  </a:ext>
+                </a:extLst>
+              </a:tr>
+              <a:tr h="370840">
+                <a:tc>
+                  <a:txBody>
+                    <a:bodyPr/>
+                    <a:lstStyle/>
+                    <a:p>
+                      <a:r>
+                        <a:rPr lang="es-MX" dirty="0"/>
+                        <a:t>Resultado obtenido</a:t>
+                      </a:r>
+                    </a:p>
+                  </a:txBody>
+                  <a:tcPr/>
+                </a:tc>
+                <a:tc>
+                  <a:txBody>
+                    <a:bodyPr/>
+                    <a:lstStyle/>
+                    <a:p>
+                      <a:pPr marL="0" marR="0" lvl="0" indent="0" algn="l" defTabSz="914400" rtl="0" eaLnBrk="1" fontAlgn="auto" latinLnBrk="0" hangingPunct="1">
+                        <a:lnSpc>
+                          <a:spcPct val="100000"/>
+                        </a:lnSpc>
+                        <a:spcBef>
+                          <a:spcPts val="0"/>
+                        </a:spcBef>
+                        <a:spcAft>
+                          <a:spcPts val="0"/>
+                        </a:spcAft>
+                        <a:buClrTx/>
+                        <a:buSzTx/>
+                        <a:buFontTx/>
+                        <a:buNone/>
+                        <a:tabLst/>
+                        <a:defRPr/>
+                      </a:pPr>
+                      <a:r>
+                        <a:rPr lang="es-ES" sz="1800" b="0" i="0" kern="1200" dirty="0">
+                          <a:solidFill>
+                            <a:schemeClr val="dk1"/>
+                          </a:solidFill>
+                          <a:effectLst/>
+                          <a:latin typeface="+mn-lt"/>
+                          <a:ea typeface="+mn-ea"/>
+                          <a:cs typeface="+mn-cs"/>
+                        </a:rPr>
+                        <a:t>No se puede acceder a este sitio web.</a:t>
+                      </a:r>
+                    </a:p>
+                    <a:p>
+                      <a:endParaRPr lang="es-MX" dirty="0"/>
+                    </a:p>
+                  </a:txBody>
+                  <a:tcPr/>
+                </a:tc>
+                <a:extLst>
+                  <a:ext uri="{0D108BD9-81ED-4DB2-BD59-A6C34878D82A}">
+                    <a16:rowId xmlns:a16="http://schemas.microsoft.com/office/drawing/2014/main" val="1327796877"/>
+                  </a:ext>
+                </a:extLst>
+              </a:tr>
+            </a:tbl>
+          </a:graphicData>
+        </a:graphic>
+      </p:graphicFrame>
+    </p:spTree>
+    <p:extLst>
+      <p:ext uri="{BB962C8B-B14F-4D97-AF65-F5344CB8AC3E}">
+        <p14:creationId xmlns:p14="http://schemas.microsoft.com/office/powerpoint/2010/main" val="2091886673"/>
+      </p:ext>
+    </p:extLst>
+  </p:cSld>
+  <p:clrMapOvr>
+    <a:masterClrMapping/>
+  </p:clrMapOvr>
+</p:sld>
+</file>
+
+<file path=ppt/slides/slide27.xml><?xml version="1.0" encoding="utf-8"?>
+<p:sld xmlns:a="http://schemas.openxmlformats.org/drawingml/2006/main" xmlns:r="http://schemas.openxmlformats.org/officeDocument/2006/relationships" xmlns:p="http://schemas.openxmlformats.org/presentationml/2006/main">
+  <p:cSld>
+    <p:spTree>
+      <p:nvGrpSpPr>
+        <p:cNvPr id="1" name=""/>
+        <p:cNvGrpSpPr/>
+        <p:nvPr/>
+      </p:nvGrpSpPr>
+      <p:grpSpPr>
+        <a:xfrm>
+          <a:off x="0" y="0"/>
+          <a:ext cx="0" cy="0"/>
+          <a:chOff x="0" y="0"/>
+          <a:chExt cx="0" cy="0"/>
+        </a:xfrm>
+      </p:grpSpPr>
+      <p:pic>
+        <p:nvPicPr>
+          <p:cNvPr id="5" name="Imagen 4">
+            <a:extLst>
+              <a:ext uri="{FF2B5EF4-FFF2-40B4-BE49-F238E27FC236}">
+                <a16:creationId xmlns:a16="http://schemas.microsoft.com/office/drawing/2014/main" id="{B4B84BEF-C114-45B1-8B6B-D834333AD814}"/>
+              </a:ext>
+            </a:extLst>
+          </p:cNvPr>
+          <p:cNvPicPr>
+            <a:picLocks noChangeAspect="1"/>
+          </p:cNvPicPr>
+          <p:nvPr/>
+        </p:nvPicPr>
+        <p:blipFill>
+          <a:blip r:embed="rId2">
+            <a:extLst>
+              <a:ext uri="{28A0092B-C50C-407E-A947-70E740481C1C}">
+                <a14:useLocalDpi xmlns:a14="http://schemas.microsoft.com/office/drawing/2010/main" val="0"/>
+              </a:ext>
+            </a:extLst>
+          </a:blip>
+          <a:stretch>
+            <a:fillRect/>
+          </a:stretch>
+        </p:blipFill>
+        <p:spPr>
+          <a:xfrm>
+            <a:off x="1517196" y="0"/>
+            <a:ext cx="9157607" cy="6858000"/>
+          </a:xfrm>
+          <a:prstGeom prst="rect">
+            <a:avLst/>
+          </a:prstGeom>
+        </p:spPr>
+      </p:pic>
+    </p:spTree>
+    <p:extLst>
+      <p:ext uri="{BB962C8B-B14F-4D97-AF65-F5344CB8AC3E}">
+        <p14:creationId xmlns:p14="http://schemas.microsoft.com/office/powerpoint/2010/main" val="4002461151"/>
+      </p:ext>
+    </p:extLst>
+  </p:cSld>
+  <p:clrMapOvr>
+    <a:masterClrMapping/>
+  </p:clrMapOvr>
+</p:sld>
+</file>
+
+<file path=ppt/slides/slide28.xml><?xml version="1.0" encoding="utf-8"?>
+<p:sld xmlns:a="http://schemas.openxmlformats.org/drawingml/2006/main" xmlns:r="http://schemas.openxmlformats.org/officeDocument/2006/relationships" xmlns:p="http://schemas.openxmlformats.org/presentationml/2006/main">
+  <p:cSld>
+    <p:spTree>
+      <p:nvGrpSpPr>
+        <p:cNvPr id="1" name=""/>
+        <p:cNvGrpSpPr/>
+        <p:nvPr/>
+      </p:nvGrpSpPr>
+      <p:grpSpPr>
+        <a:xfrm>
+          <a:off x="0" y="0"/>
+          <a:ext cx="0" cy="0"/>
+          <a:chOff x="0" y="0"/>
+          <a:chExt cx="0" cy="0"/>
+        </a:xfrm>
+      </p:grpSpPr>
+      <p:pic>
+        <p:nvPicPr>
+          <p:cNvPr id="5" name="Imagen 4">
+            <a:extLst>
+              <a:ext uri="{FF2B5EF4-FFF2-40B4-BE49-F238E27FC236}">
+                <a16:creationId xmlns:a16="http://schemas.microsoft.com/office/drawing/2014/main" id="{9C5E7721-7A0D-483F-9C7E-7D5D64A1DE17}"/>
+              </a:ext>
+            </a:extLst>
+          </p:cNvPr>
+          <p:cNvPicPr>
+            <a:picLocks noChangeAspect="1"/>
+          </p:cNvPicPr>
+          <p:nvPr/>
+        </p:nvPicPr>
+        <p:blipFill>
+          <a:blip r:embed="rId2">
+            <a:extLst>
+              <a:ext uri="{28A0092B-C50C-407E-A947-70E740481C1C}">
+                <a14:useLocalDpi xmlns:a14="http://schemas.microsoft.com/office/drawing/2010/main" val="0"/>
+              </a:ext>
+            </a:extLst>
+          </a:blip>
+          <a:stretch>
+            <a:fillRect/>
+          </a:stretch>
+        </p:blipFill>
+        <p:spPr>
+          <a:xfrm>
+            <a:off x="1402428" y="0"/>
+            <a:ext cx="9387144" cy="6858000"/>
+          </a:xfrm>
+          <a:prstGeom prst="rect">
+            <a:avLst/>
+          </a:prstGeom>
+        </p:spPr>
+      </p:pic>
+    </p:spTree>
+    <p:extLst>
+      <p:ext uri="{BB962C8B-B14F-4D97-AF65-F5344CB8AC3E}">
+        <p14:creationId xmlns:p14="http://schemas.microsoft.com/office/powerpoint/2010/main" val="3848351816"/>
+      </p:ext>
+    </p:extLst>
+  </p:cSld>
+  <p:clrMapOvr>
+    <a:masterClrMapping/>
+  </p:clrMapOvr>
+</p:sld>
+</file>
+
+<file path=ppt/slides/slide29.xml><?xml version="1.0" encoding="utf-8"?>
+<p:sld xmlns:a="http://schemas.openxmlformats.org/drawingml/2006/main" xmlns:r="http://schemas.openxmlformats.org/officeDocument/2006/relationships" xmlns:p="http://schemas.openxmlformats.org/presentationml/2006/main">
+  <p:cSld>
+    <p:spTree>
+      <p:nvGrpSpPr>
+        <p:cNvPr id="1" name=""/>
+        <p:cNvGrpSpPr/>
+        <p:nvPr/>
+      </p:nvGrpSpPr>
+      <p:grpSpPr>
+        <a:xfrm>
+          <a:off x="0" y="0"/>
+          <a:ext cx="0" cy="0"/>
+          <a:chOff x="0" y="0"/>
+          <a:chExt cx="0" cy="0"/>
+        </a:xfrm>
+      </p:grpSpPr>
+      <p:sp>
+        <p:nvSpPr>
+          <p:cNvPr id="3" name="Marcador de contenido 2">
+            <a:extLst>
+              <a:ext uri="{FF2B5EF4-FFF2-40B4-BE49-F238E27FC236}">
+                <a16:creationId xmlns:a16="http://schemas.microsoft.com/office/drawing/2014/main" id="{D4A657D1-A607-4047-B2E7-2BE87AE6DBD2}"/>
+              </a:ext>
+            </a:extLst>
+          </p:cNvPr>
+          <p:cNvSpPr>
+            <a:spLocks noGrp="1"/>
+          </p:cNvSpPr>
+          <p:nvPr>
+            <p:ph idx="1"/>
+          </p:nvPr>
+        </p:nvSpPr>
+        <p:spPr/>
+        <p:txBody>
+          <a:bodyPr>
+            <a:normAutofit/>
+          </a:bodyPr>
+          <a:lstStyle/>
+          <a:p>
+            <a:pPr algn="ctr"/>
+            <a:r>
+              <a:rPr lang="es-ES" sz="8800" dirty="0">
+                <a:solidFill>
+                  <a:srgbClr val="FF0000"/>
+                </a:solidFill>
+              </a:rPr>
+              <a:t>SEXTO BUG</a:t>
+            </a:r>
+            <a:endParaRPr lang="es-MX" sz="8800" dirty="0">
+              <a:solidFill>
+                <a:srgbClr val="FF0000"/>
+              </a:solidFill>
+            </a:endParaRPr>
+          </a:p>
+        </p:txBody>
+      </p:sp>
+    </p:spTree>
+    <p:extLst>
+      <p:ext uri="{BB962C8B-B14F-4D97-AF65-F5344CB8AC3E}">
+        <p14:creationId xmlns:p14="http://schemas.microsoft.com/office/powerpoint/2010/main" val="1704762628"/>
       </p:ext>
     </p:extLst>
   </p:cSld>
@@ -4796,6 +6751,156 @@
     <p:extLst>
       <p:ext uri="{BB962C8B-B14F-4D97-AF65-F5344CB8AC3E}">
         <p14:creationId xmlns:p14="http://schemas.microsoft.com/office/powerpoint/2010/main" val="543269831"/>
+      </p:ext>
+    </p:extLst>
+  </p:cSld>
+  <p:clrMapOvr>
+    <a:masterClrMapping/>
+  </p:clrMapOvr>
+</p:sld>
+</file>
+
+<file path=ppt/slides/slide30.xml><?xml version="1.0" encoding="utf-8"?>
+<p:sld xmlns:a="http://schemas.openxmlformats.org/drawingml/2006/main" xmlns:r="http://schemas.openxmlformats.org/officeDocument/2006/relationships" xmlns:p="http://schemas.openxmlformats.org/presentationml/2006/main">
+  <p:cSld>
+    <p:spTree>
+      <p:nvGrpSpPr>
+        <p:cNvPr id="1" name=""/>
+        <p:cNvGrpSpPr/>
+        <p:nvPr/>
+      </p:nvGrpSpPr>
+      <p:grpSpPr>
+        <a:xfrm>
+          <a:off x="0" y="0"/>
+          <a:ext cx="0" cy="0"/>
+          <a:chOff x="0" y="0"/>
+          <a:chExt cx="0" cy="0"/>
+        </a:xfrm>
+      </p:grpSpPr>
+    </p:spTree>
+    <p:extLst>
+      <p:ext uri="{BB962C8B-B14F-4D97-AF65-F5344CB8AC3E}">
+        <p14:creationId xmlns:p14="http://schemas.microsoft.com/office/powerpoint/2010/main" val="3055732767"/>
+      </p:ext>
+    </p:extLst>
+  </p:cSld>
+  <p:clrMapOvr>
+    <a:masterClrMapping/>
+  </p:clrMapOvr>
+</p:sld>
+</file>
+
+<file path=ppt/slides/slide31.xml><?xml version="1.0" encoding="utf-8"?>
+<p:sld xmlns:a="http://schemas.openxmlformats.org/drawingml/2006/main" xmlns:r="http://schemas.openxmlformats.org/officeDocument/2006/relationships" xmlns:p="http://schemas.openxmlformats.org/presentationml/2006/main">
+  <p:cSld>
+    <p:spTree>
+      <p:nvGrpSpPr>
+        <p:cNvPr id="1" name=""/>
+        <p:cNvGrpSpPr/>
+        <p:nvPr/>
+      </p:nvGrpSpPr>
+      <p:grpSpPr>
+        <a:xfrm>
+          <a:off x="0" y="0"/>
+          <a:ext cx="0" cy="0"/>
+          <a:chOff x="0" y="0"/>
+          <a:chExt cx="0" cy="0"/>
+        </a:xfrm>
+      </p:grpSpPr>
+    </p:spTree>
+    <p:extLst>
+      <p:ext uri="{BB962C8B-B14F-4D97-AF65-F5344CB8AC3E}">
+        <p14:creationId xmlns:p14="http://schemas.microsoft.com/office/powerpoint/2010/main" val="3354732512"/>
+      </p:ext>
+    </p:extLst>
+  </p:cSld>
+  <p:clrMapOvr>
+    <a:masterClrMapping/>
+  </p:clrMapOvr>
+</p:sld>
+</file>
+
+<file path=ppt/slides/slide32.xml><?xml version="1.0" encoding="utf-8"?>
+<p:sld xmlns:a="http://schemas.openxmlformats.org/drawingml/2006/main" xmlns:r="http://schemas.openxmlformats.org/officeDocument/2006/relationships" xmlns:p="http://schemas.openxmlformats.org/presentationml/2006/main">
+  <p:cSld>
+    <p:spTree>
+      <p:nvGrpSpPr>
+        <p:cNvPr id="1" name=""/>
+        <p:cNvGrpSpPr/>
+        <p:nvPr/>
+      </p:nvGrpSpPr>
+      <p:grpSpPr>
+        <a:xfrm>
+          <a:off x="0" y="0"/>
+          <a:ext cx="0" cy="0"/>
+          <a:chOff x="0" y="0"/>
+          <a:chExt cx="0" cy="0"/>
+        </a:xfrm>
+      </p:grpSpPr>
+    </p:spTree>
+    <p:extLst>
+      <p:ext uri="{BB962C8B-B14F-4D97-AF65-F5344CB8AC3E}">
+        <p14:creationId xmlns:p14="http://schemas.microsoft.com/office/powerpoint/2010/main" val="3691723581"/>
+      </p:ext>
+    </p:extLst>
+  </p:cSld>
+  <p:clrMapOvr>
+    <a:masterClrMapping/>
+  </p:clrMapOvr>
+</p:sld>
+</file>
+
+<file path=ppt/slides/slide33.xml><?xml version="1.0" encoding="utf-8"?>
+<p:sld xmlns:a="http://schemas.openxmlformats.org/drawingml/2006/main" xmlns:r="http://schemas.openxmlformats.org/officeDocument/2006/relationships" xmlns:p="http://schemas.openxmlformats.org/presentationml/2006/main">
+  <p:cSld>
+    <p:spTree>
+      <p:nvGrpSpPr>
+        <p:cNvPr id="1" name=""/>
+        <p:cNvGrpSpPr/>
+        <p:nvPr/>
+      </p:nvGrpSpPr>
+      <p:grpSpPr>
+        <a:xfrm>
+          <a:off x="0" y="0"/>
+          <a:ext cx="0" cy="0"/>
+          <a:chOff x="0" y="0"/>
+          <a:chExt cx="0" cy="0"/>
+        </a:xfrm>
+      </p:grpSpPr>
+    </p:spTree>
+    <p:extLst>
+      <p:ext uri="{BB962C8B-B14F-4D97-AF65-F5344CB8AC3E}">
+        <p14:creationId xmlns:p14="http://schemas.microsoft.com/office/powerpoint/2010/main" val="3744492564"/>
+      </p:ext>
+    </p:extLst>
+  </p:cSld>
+  <p:clrMapOvr>
+    <a:masterClrMapping/>
+  </p:clrMapOvr>
+</p:sld>
+</file>
+
+<file path=ppt/slides/slide34.xml><?xml version="1.0" encoding="utf-8"?>
+<p:sld xmlns:a="http://schemas.openxmlformats.org/drawingml/2006/main" xmlns:r="http://schemas.openxmlformats.org/officeDocument/2006/relationships" xmlns:p="http://schemas.openxmlformats.org/presentationml/2006/main">
+  <p:cSld>
+    <p:spTree>
+      <p:nvGrpSpPr>
+        <p:cNvPr id="1" name=""/>
+        <p:cNvGrpSpPr/>
+        <p:nvPr/>
+      </p:nvGrpSpPr>
+      <p:grpSpPr>
+        <a:xfrm>
+          <a:off x="0" y="0"/>
+          <a:ext cx="0" cy="0"/>
+          <a:chOff x="0" y="0"/>
+          <a:chExt cx="0" cy="0"/>
+        </a:xfrm>
+      </p:grpSpPr>
+    </p:spTree>
+    <p:extLst>
+      <p:ext uri="{BB962C8B-B14F-4D97-AF65-F5344CB8AC3E}">
+        <p14:creationId xmlns:p14="http://schemas.microsoft.com/office/powerpoint/2010/main" val="67380645"/>
       </p:ext>
     </p:extLst>
   </p:cSld>
@@ -4956,6 +7061,77 @@
       </p:grpSpPr>
       <p:sp>
         <p:nvSpPr>
+          <p:cNvPr id="3" name="Marcador de contenido 2">
+            <a:extLst>
+              <a:ext uri="{FF2B5EF4-FFF2-40B4-BE49-F238E27FC236}">
+                <a16:creationId xmlns:a16="http://schemas.microsoft.com/office/drawing/2014/main" id="{CEEAA383-6BB3-448C-9767-03A4026E724E}"/>
+              </a:ext>
+            </a:extLst>
+          </p:cNvPr>
+          <p:cNvSpPr>
+            <a:spLocks noGrp="1"/>
+          </p:cNvSpPr>
+          <p:nvPr>
+            <p:ph idx="1"/>
+          </p:nvPr>
+        </p:nvSpPr>
+        <p:spPr>
+          <a:xfrm>
+            <a:off x="838200" y="1825625"/>
+            <a:ext cx="10515600" cy="4351338"/>
+          </a:xfrm>
+        </p:spPr>
+        <p:txBody>
+          <a:bodyPr/>
+          <a:lstStyle/>
+          <a:p>
+            <a:pPr algn="ctr"/>
+            <a:r>
+              <a:rPr lang="es-ES" sz="8800" dirty="0">
+                <a:solidFill>
+                  <a:srgbClr val="FF0000"/>
+                </a:solidFill>
+              </a:rPr>
+              <a:t>SEGUNDO BUG</a:t>
+            </a:r>
+          </a:p>
+          <a:p>
+            <a:endParaRPr lang="es-MX" dirty="0"/>
+          </a:p>
+        </p:txBody>
+      </p:sp>
+    </p:spTree>
+    <p:extLst>
+      <p:ext uri="{BB962C8B-B14F-4D97-AF65-F5344CB8AC3E}">
+        <p14:creationId xmlns:p14="http://schemas.microsoft.com/office/powerpoint/2010/main" val="2040906961"/>
+      </p:ext>
+    </p:extLst>
+  </p:cSld>
+  <p:clrMapOvr>
+    <a:masterClrMapping/>
+  </p:clrMapOvr>
+</p:sld>
+</file>
+
+<file path=ppt/slides/slide7.xml><?xml version="1.0" encoding="utf-8"?>
+<p:sld xmlns:a="http://schemas.openxmlformats.org/drawingml/2006/main" xmlns:r="http://schemas.openxmlformats.org/officeDocument/2006/relationships" xmlns:p="http://schemas.openxmlformats.org/presentationml/2006/main">
+  <p:cSld>
+    <p:spTree>
+      <p:nvGrpSpPr>
+        <p:cNvPr id="1" name=""/>
+        <p:cNvGrpSpPr/>
+        <p:nvPr/>
+      </p:nvGrpSpPr>
+      <p:grpSpPr>
+        <a:xfrm>
+          <a:off x="0" y="0"/>
+          <a:ext cx="0" cy="0"/>
+          <a:chOff x="0" y="0"/>
+          <a:chExt cx="0" cy="0"/>
+        </a:xfrm>
+      </p:grpSpPr>
+      <p:sp>
+        <p:nvSpPr>
           <p:cNvPr id="4" name="CuadroTexto 3">
             <a:extLst>
               <a:ext uri="{FF2B5EF4-FFF2-40B4-BE49-F238E27FC236}">
@@ -5069,7 +7245,7 @@
 </p:sld>
 </file>
 
-<file path=ppt/slides/slide7.xml><?xml version="1.0" encoding="utf-8"?>
+<file path=ppt/slides/slide8.xml><?xml version="1.0" encoding="utf-8"?>
 <p:sld xmlns:a="http://schemas.openxmlformats.org/drawingml/2006/main" xmlns:r="http://schemas.openxmlformats.org/officeDocument/2006/relationships" xmlns:p="http://schemas.openxmlformats.org/presentationml/2006/main">
   <p:cSld>
     <p:spTree>
@@ -5706,7 +7882,7 @@
 </p:sld>
 </file>
 
-<file path=ppt/slides/slide8.xml><?xml version="1.0" encoding="utf-8"?>
+<file path=ppt/slides/slide9.xml><?xml version="1.0" encoding="utf-8"?>
 <p:sld xmlns:a="http://schemas.openxmlformats.org/drawingml/2006/main" xmlns:r="http://schemas.openxmlformats.org/officeDocument/2006/relationships" xmlns:p="http://schemas.openxmlformats.org/presentationml/2006/main">
   <p:cSld>
     <p:spTree>
@@ -5763,72 +7939,6 @@
     <p:extLst>
       <p:ext uri="{BB962C8B-B14F-4D97-AF65-F5344CB8AC3E}">
         <p14:creationId xmlns:p14="http://schemas.microsoft.com/office/powerpoint/2010/main" val="2900171089"/>
-      </p:ext>
-    </p:extLst>
-  </p:cSld>
-  <p:clrMapOvr>
-    <a:masterClrMapping/>
-  </p:clrMapOvr>
-</p:sld>
-</file>
-
-<file path=ppt/slides/slide9.xml><?xml version="1.0" encoding="utf-8"?>
-<p:sld xmlns:a="http://schemas.openxmlformats.org/drawingml/2006/main" xmlns:r="http://schemas.openxmlformats.org/officeDocument/2006/relationships" xmlns:p="http://schemas.openxmlformats.org/presentationml/2006/main">
-  <p:cSld>
-    <p:spTree>
-      <p:nvGrpSpPr>
-        <p:cNvPr id="1" name=""/>
-        <p:cNvGrpSpPr/>
-        <p:nvPr/>
-      </p:nvGrpSpPr>
-      <p:grpSpPr>
-        <a:xfrm>
-          <a:off x="0" y="0"/>
-          <a:ext cx="0" cy="0"/>
-          <a:chOff x="0" y="0"/>
-          <a:chExt cx="0" cy="0"/>
-        </a:xfrm>
-      </p:grpSpPr>
-      <p:pic>
-        <p:nvPicPr>
-          <p:cNvPr id="9" name="Imagen 8">
-            <a:extLst>
-              <a:ext uri="{FF2B5EF4-FFF2-40B4-BE49-F238E27FC236}">
-                <a16:creationId xmlns:a16="http://schemas.microsoft.com/office/drawing/2014/main" id="{D29C3316-EF32-4977-A755-B876C23C7DD9}"/>
-              </a:ext>
-            </a:extLst>
-          </p:cNvPr>
-          <p:cNvPicPr>
-            <a:picLocks noChangeAspect="1"/>
-          </p:cNvPicPr>
-          <p:nvPr/>
-        </p:nvPicPr>
-        <p:blipFill>
-          <a:blip r:embed="rId2">
-            <a:extLst>
-              <a:ext uri="{28A0092B-C50C-407E-A947-70E740481C1C}">
-                <a14:useLocalDpi xmlns:a14="http://schemas.microsoft.com/office/drawing/2010/main" val="0"/>
-              </a:ext>
-            </a:extLst>
-          </a:blip>
-          <a:stretch>
-            <a:fillRect/>
-          </a:stretch>
-        </p:blipFill>
-        <p:spPr>
-          <a:xfrm>
-            <a:off x="705665" y="0"/>
-            <a:ext cx="10780669" cy="6858000"/>
-          </a:xfrm>
-          <a:prstGeom prst="rect">
-            <a:avLst/>
-          </a:prstGeom>
-        </p:spPr>
-      </p:pic>
-    </p:spTree>
-    <p:extLst>
-      <p:ext uri="{BB962C8B-B14F-4D97-AF65-F5344CB8AC3E}">
-        <p14:creationId xmlns:p14="http://schemas.microsoft.com/office/powerpoint/2010/main" val="1159073202"/>
       </p:ext>
     </p:extLst>
   </p:cSld>

</xml_diff>

<commit_message>
Encontrado eror 4 y 4 error de registro y mail
</commit_message>
<xml_diff>
--- a/alumnos/gabriel_gonzalez/errores_guru.pptx
+++ b/alumnos/gabriel_gonzalez/errores_guru.pptx
@@ -10,15 +10,35 @@
     <p:sldId id="258" r:id="rId4"/>
     <p:sldId id="259" r:id="rId5"/>
     <p:sldId id="260" r:id="rId6"/>
-    <p:sldId id="261" r:id="rId7"/>
-    <p:sldId id="262" r:id="rId8"/>
-    <p:sldId id="263" r:id="rId9"/>
-    <p:sldId id="264" r:id="rId10"/>
-    <p:sldId id="265" r:id="rId11"/>
-    <p:sldId id="266" r:id="rId12"/>
-    <p:sldId id="267" r:id="rId13"/>
-    <p:sldId id="268" r:id="rId14"/>
-    <p:sldId id="269" r:id="rId15"/>
+    <p:sldId id="270" r:id="rId7"/>
+    <p:sldId id="261" r:id="rId8"/>
+    <p:sldId id="262" r:id="rId9"/>
+    <p:sldId id="263" r:id="rId10"/>
+    <p:sldId id="264" r:id="rId11"/>
+    <p:sldId id="271" r:id="rId12"/>
+    <p:sldId id="265" r:id="rId13"/>
+    <p:sldId id="266" r:id="rId14"/>
+    <p:sldId id="267" r:id="rId15"/>
+    <p:sldId id="268" r:id="rId16"/>
+    <p:sldId id="269" r:id="rId17"/>
+    <p:sldId id="272" r:id="rId18"/>
+    <p:sldId id="273" r:id="rId19"/>
+    <p:sldId id="274" r:id="rId20"/>
+    <p:sldId id="275" r:id="rId21"/>
+    <p:sldId id="276" r:id="rId22"/>
+    <p:sldId id="277" r:id="rId23"/>
+    <p:sldId id="278" r:id="rId24"/>
+    <p:sldId id="279" r:id="rId25"/>
+    <p:sldId id="280" r:id="rId26"/>
+    <p:sldId id="281" r:id="rId27"/>
+    <p:sldId id="282" r:id="rId28"/>
+    <p:sldId id="283" r:id="rId29"/>
+    <p:sldId id="284" r:id="rId30"/>
+    <p:sldId id="285" r:id="rId31"/>
+    <p:sldId id="286" r:id="rId32"/>
+    <p:sldId id="287" r:id="rId33"/>
+    <p:sldId id="288" r:id="rId34"/>
+    <p:sldId id="289" r:id="rId35"/>
   </p:sldIdLst>
   <p:sldSz cx="12192000" cy="6858000"/>
   <p:notesSz cx="6858000" cy="9144000"/>
@@ -274,7 +294,7 @@
           <a:p>
             <a:fld id="{5F8819B3-F807-4F78-9ED5-58D6C3743EEB}" type="datetimeFigureOut">
               <a:rPr lang="es-MX" smtClean="0"/>
-              <a:t>05/06/2023</a:t>
+              <a:t>07/06/2023</a:t>
             </a:fld>
             <a:endParaRPr lang="es-MX"/>
           </a:p>
@@ -474,7 +494,7 @@
           <a:p>
             <a:fld id="{5F8819B3-F807-4F78-9ED5-58D6C3743EEB}" type="datetimeFigureOut">
               <a:rPr lang="es-MX" smtClean="0"/>
-              <a:t>05/06/2023</a:t>
+              <a:t>07/06/2023</a:t>
             </a:fld>
             <a:endParaRPr lang="es-MX"/>
           </a:p>
@@ -684,7 +704,7 @@
           <a:p>
             <a:fld id="{5F8819B3-F807-4F78-9ED5-58D6C3743EEB}" type="datetimeFigureOut">
               <a:rPr lang="es-MX" smtClean="0"/>
-              <a:t>05/06/2023</a:t>
+              <a:t>07/06/2023</a:t>
             </a:fld>
             <a:endParaRPr lang="es-MX"/>
           </a:p>
@@ -884,7 +904,7 @@
           <a:p>
             <a:fld id="{5F8819B3-F807-4F78-9ED5-58D6C3743EEB}" type="datetimeFigureOut">
               <a:rPr lang="es-MX" smtClean="0"/>
-              <a:t>05/06/2023</a:t>
+              <a:t>07/06/2023</a:t>
             </a:fld>
             <a:endParaRPr lang="es-MX"/>
           </a:p>
@@ -1160,7 +1180,7 @@
           <a:p>
             <a:fld id="{5F8819B3-F807-4F78-9ED5-58D6C3743EEB}" type="datetimeFigureOut">
               <a:rPr lang="es-MX" smtClean="0"/>
-              <a:t>05/06/2023</a:t>
+              <a:t>07/06/2023</a:t>
             </a:fld>
             <a:endParaRPr lang="es-MX"/>
           </a:p>
@@ -1428,7 +1448,7 @@
           <a:p>
             <a:fld id="{5F8819B3-F807-4F78-9ED5-58D6C3743EEB}" type="datetimeFigureOut">
               <a:rPr lang="es-MX" smtClean="0"/>
-              <a:t>05/06/2023</a:t>
+              <a:t>07/06/2023</a:t>
             </a:fld>
             <a:endParaRPr lang="es-MX"/>
           </a:p>
@@ -1843,7 +1863,7 @@
           <a:p>
             <a:fld id="{5F8819B3-F807-4F78-9ED5-58D6C3743EEB}" type="datetimeFigureOut">
               <a:rPr lang="es-MX" smtClean="0"/>
-              <a:t>05/06/2023</a:t>
+              <a:t>07/06/2023</a:t>
             </a:fld>
             <a:endParaRPr lang="es-MX"/>
           </a:p>
@@ -1985,7 +2005,7 @@
           <a:p>
             <a:fld id="{5F8819B3-F807-4F78-9ED5-58D6C3743EEB}" type="datetimeFigureOut">
               <a:rPr lang="es-MX" smtClean="0"/>
-              <a:t>05/06/2023</a:t>
+              <a:t>07/06/2023</a:t>
             </a:fld>
             <a:endParaRPr lang="es-MX"/>
           </a:p>
@@ -2098,7 +2118,7 @@
           <a:p>
             <a:fld id="{5F8819B3-F807-4F78-9ED5-58D6C3743EEB}" type="datetimeFigureOut">
               <a:rPr lang="es-MX" smtClean="0"/>
-              <a:t>05/06/2023</a:t>
+              <a:t>07/06/2023</a:t>
             </a:fld>
             <a:endParaRPr lang="es-MX"/>
           </a:p>
@@ -2411,7 +2431,7 @@
           <a:p>
             <a:fld id="{5F8819B3-F807-4F78-9ED5-58D6C3743EEB}" type="datetimeFigureOut">
               <a:rPr lang="es-MX" smtClean="0"/>
-              <a:t>05/06/2023</a:t>
+              <a:t>07/06/2023</a:t>
             </a:fld>
             <a:endParaRPr lang="es-MX"/>
           </a:p>
@@ -2700,7 +2720,7 @@
           <a:p>
             <a:fld id="{5F8819B3-F807-4F78-9ED5-58D6C3743EEB}" type="datetimeFigureOut">
               <a:rPr lang="es-MX" smtClean="0"/>
-              <a:t>05/06/2023</a:t>
+              <a:t>07/06/2023</a:t>
             </a:fld>
             <a:endParaRPr lang="es-MX"/>
           </a:p>
@@ -2943,7 +2963,7 @@
           <a:p>
             <a:fld id="{5F8819B3-F807-4F78-9ED5-58D6C3743EEB}" type="datetimeFigureOut">
               <a:rPr lang="es-MX" smtClean="0"/>
-              <a:t>05/06/2023</a:t>
+              <a:t>07/06/2023</a:t>
             </a:fld>
             <a:endParaRPr lang="es-MX"/>
           </a:p>
@@ -3478,6 +3498,142 @@
           <a:chExt cx="0" cy="0"/>
         </a:xfrm>
       </p:grpSpPr>
+      <p:pic>
+        <p:nvPicPr>
+          <p:cNvPr id="9" name="Imagen 8">
+            <a:extLst>
+              <a:ext uri="{FF2B5EF4-FFF2-40B4-BE49-F238E27FC236}">
+                <a16:creationId xmlns:a16="http://schemas.microsoft.com/office/drawing/2014/main" id="{D29C3316-EF32-4977-A755-B876C23C7DD9}"/>
+              </a:ext>
+            </a:extLst>
+          </p:cNvPr>
+          <p:cNvPicPr>
+            <a:picLocks noChangeAspect="1"/>
+          </p:cNvPicPr>
+          <p:nvPr/>
+        </p:nvPicPr>
+        <p:blipFill>
+          <a:blip r:embed="rId2">
+            <a:extLst>
+              <a:ext uri="{28A0092B-C50C-407E-A947-70E740481C1C}">
+                <a14:useLocalDpi xmlns:a14="http://schemas.microsoft.com/office/drawing/2010/main" val="0"/>
+              </a:ext>
+            </a:extLst>
+          </a:blip>
+          <a:stretch>
+            <a:fillRect/>
+          </a:stretch>
+        </p:blipFill>
+        <p:spPr>
+          <a:xfrm>
+            <a:off x="705665" y="0"/>
+            <a:ext cx="10780669" cy="6858000"/>
+          </a:xfrm>
+          <a:prstGeom prst="rect">
+            <a:avLst/>
+          </a:prstGeom>
+        </p:spPr>
+      </p:pic>
+    </p:spTree>
+    <p:extLst>
+      <p:ext uri="{BB962C8B-B14F-4D97-AF65-F5344CB8AC3E}">
+        <p14:creationId xmlns:p14="http://schemas.microsoft.com/office/powerpoint/2010/main" val="1159073202"/>
+      </p:ext>
+    </p:extLst>
+  </p:cSld>
+  <p:clrMapOvr>
+    <a:masterClrMapping/>
+  </p:clrMapOvr>
+</p:sld>
+</file>
+
+<file path=ppt/slides/slide11.xml><?xml version="1.0" encoding="utf-8"?>
+<p:sld xmlns:a="http://schemas.openxmlformats.org/drawingml/2006/main" xmlns:r="http://schemas.openxmlformats.org/officeDocument/2006/relationships" xmlns:p="http://schemas.openxmlformats.org/presentationml/2006/main">
+  <p:cSld>
+    <p:spTree>
+      <p:nvGrpSpPr>
+        <p:cNvPr id="1" name=""/>
+        <p:cNvGrpSpPr/>
+        <p:nvPr/>
+      </p:nvGrpSpPr>
+      <p:grpSpPr>
+        <a:xfrm>
+          <a:off x="0" y="0"/>
+          <a:ext cx="0" cy="0"/>
+          <a:chOff x="0" y="0"/>
+          <a:chExt cx="0" cy="0"/>
+        </a:xfrm>
+      </p:grpSpPr>
+      <p:sp>
+        <p:nvSpPr>
+          <p:cNvPr id="3" name="Marcador de contenido 2">
+            <a:extLst>
+              <a:ext uri="{FF2B5EF4-FFF2-40B4-BE49-F238E27FC236}">
+                <a16:creationId xmlns:a16="http://schemas.microsoft.com/office/drawing/2014/main" id="{B0CAFBDA-A30E-40FF-8A11-80970746258A}"/>
+              </a:ext>
+            </a:extLst>
+          </p:cNvPr>
+          <p:cNvSpPr>
+            <a:spLocks noGrp="1"/>
+          </p:cNvSpPr>
+          <p:nvPr>
+            <p:ph idx="1"/>
+          </p:nvPr>
+        </p:nvSpPr>
+        <p:spPr/>
+        <p:txBody>
+          <a:bodyPr>
+            <a:normAutofit/>
+          </a:bodyPr>
+          <a:lstStyle/>
+          <a:p>
+            <a:pPr algn="ctr"/>
+            <a:r>
+              <a:rPr lang="es-ES" sz="8800" dirty="0">
+                <a:solidFill>
+                  <a:srgbClr val="FF0000"/>
+                </a:solidFill>
+              </a:rPr>
+              <a:t>TERCER BUG</a:t>
+            </a:r>
+            <a:endParaRPr lang="es-MX" sz="8800" dirty="0">
+              <a:solidFill>
+                <a:srgbClr val="FF0000"/>
+              </a:solidFill>
+            </a:endParaRPr>
+          </a:p>
+        </p:txBody>
+      </p:sp>
+    </p:spTree>
+    <p:extLst>
+      <p:ext uri="{BB962C8B-B14F-4D97-AF65-F5344CB8AC3E}">
+        <p14:creationId xmlns:p14="http://schemas.microsoft.com/office/powerpoint/2010/main" val="3718315860"/>
+      </p:ext>
+    </p:extLst>
+  </p:cSld>
+  <p:clrMapOvr>
+    <a:masterClrMapping/>
+  </p:clrMapOvr>
+</p:sld>
+</file>
+
+<file path=ppt/slides/slide12.xml><?xml version="1.0" encoding="utf-8"?>
+<p:sld xmlns:a="http://schemas.openxmlformats.org/drawingml/2006/main" xmlns:r="http://schemas.openxmlformats.org/officeDocument/2006/relationships" xmlns:p="http://schemas.openxmlformats.org/presentationml/2006/main">
+  <p:cSld>
+    <p:spTree>
+      <p:nvGrpSpPr>
+        <p:cNvPr id="1" name=""/>
+        <p:cNvGrpSpPr/>
+        <p:nvPr/>
+      </p:nvGrpSpPr>
+      <p:grpSpPr>
+        <a:xfrm>
+          <a:off x="0" y="0"/>
+          <a:ext cx="0" cy="0"/>
+          <a:chOff x="0" y="0"/>
+          <a:chExt cx="0" cy="0"/>
+        </a:xfrm>
+      </p:grpSpPr>
       <p:sp>
         <p:nvSpPr>
           <p:cNvPr id="5" name="CuadroTexto 4">
@@ -3612,7 +3768,7 @@
 </p:sld>
 </file>
 
-<file path=ppt/slides/slide11.xml><?xml version="1.0" encoding="utf-8"?>
+<file path=ppt/slides/slide13.xml><?xml version="1.0" encoding="utf-8"?>
 <p:sld xmlns:a="http://schemas.openxmlformats.org/drawingml/2006/main" xmlns:r="http://schemas.openxmlformats.org/officeDocument/2006/relationships" xmlns:p="http://schemas.openxmlformats.org/presentationml/2006/main">
   <p:cSld>
     <p:spTree>
@@ -3678,7 +3834,7 @@
 </p:sld>
 </file>
 
-<file path=ppt/slides/slide12.xml><?xml version="1.0" encoding="utf-8"?>
+<file path=ppt/slides/slide14.xml><?xml version="1.0" encoding="utf-8"?>
 <p:sld xmlns:a="http://schemas.openxmlformats.org/drawingml/2006/main" xmlns:r="http://schemas.openxmlformats.org/officeDocument/2006/relationships" xmlns:p="http://schemas.openxmlformats.org/presentationml/2006/main">
   <p:cSld>
     <p:spTree>
@@ -4069,7 +4225,7 @@
 </p:sld>
 </file>
 
-<file path=ppt/slides/slide13.xml><?xml version="1.0" encoding="utf-8"?>
+<file path=ppt/slides/slide15.xml><?xml version="1.0" encoding="utf-8"?>
 <p:sld xmlns:a="http://schemas.openxmlformats.org/drawingml/2006/main" xmlns:r="http://schemas.openxmlformats.org/officeDocument/2006/relationships" xmlns:p="http://schemas.openxmlformats.org/presentationml/2006/main">
   <p:cSld>
     <p:spTree>
@@ -4135,7 +4291,7 @@
 </p:sld>
 </file>
 
-<file path=ppt/slides/slide14.xml><?xml version="1.0" encoding="utf-8"?>
+<file path=ppt/slides/slide16.xml><?xml version="1.0" encoding="utf-8"?>
 <p:sld xmlns:a="http://schemas.openxmlformats.org/drawingml/2006/main" xmlns:r="http://schemas.openxmlformats.org/officeDocument/2006/relationships" xmlns:p="http://schemas.openxmlformats.org/presentationml/2006/main">
   <p:cSld>
     <p:spTree>
@@ -4192,6 +4348,278 @@
     <p:extLst>
       <p:ext uri="{BB962C8B-B14F-4D97-AF65-F5344CB8AC3E}">
         <p14:creationId xmlns:p14="http://schemas.microsoft.com/office/powerpoint/2010/main" val="2294022973"/>
+      </p:ext>
+    </p:extLst>
+  </p:cSld>
+  <p:clrMapOvr>
+    <a:masterClrMapping/>
+  </p:clrMapOvr>
+</p:sld>
+</file>
+
+<file path=ppt/slides/slide17.xml><?xml version="1.0" encoding="utf-8"?>
+<p:sld xmlns:a="http://schemas.openxmlformats.org/drawingml/2006/main" xmlns:r="http://schemas.openxmlformats.org/officeDocument/2006/relationships" xmlns:p="http://schemas.openxmlformats.org/presentationml/2006/main">
+  <p:cSld>
+    <p:spTree>
+      <p:nvGrpSpPr>
+        <p:cNvPr id="1" name=""/>
+        <p:cNvGrpSpPr/>
+        <p:nvPr/>
+      </p:nvGrpSpPr>
+      <p:grpSpPr>
+        <a:xfrm>
+          <a:off x="0" y="0"/>
+          <a:ext cx="0" cy="0"/>
+          <a:chOff x="0" y="0"/>
+          <a:chExt cx="0" cy="0"/>
+        </a:xfrm>
+      </p:grpSpPr>
+      <p:sp>
+        <p:nvSpPr>
+          <p:cNvPr id="3" name="Marcador de contenido 2">
+            <a:extLst>
+              <a:ext uri="{FF2B5EF4-FFF2-40B4-BE49-F238E27FC236}">
+                <a16:creationId xmlns:a16="http://schemas.microsoft.com/office/drawing/2014/main" id="{1B849EC0-1245-448B-891C-39C9FE6894AE}"/>
+              </a:ext>
+            </a:extLst>
+          </p:cNvPr>
+          <p:cNvSpPr>
+            <a:spLocks noGrp="1"/>
+          </p:cNvSpPr>
+          <p:nvPr>
+            <p:ph idx="1"/>
+          </p:nvPr>
+        </p:nvSpPr>
+        <p:spPr>
+          <a:xfrm>
+            <a:off x="511029" y="1607511"/>
+            <a:ext cx="10515600" cy="4351338"/>
+          </a:xfrm>
+        </p:spPr>
+        <p:txBody>
+          <a:bodyPr>
+            <a:normAutofit/>
+          </a:bodyPr>
+          <a:lstStyle/>
+          <a:p>
+            <a:pPr algn="ctr"/>
+            <a:r>
+              <a:rPr lang="es-ES" sz="8800" dirty="0">
+                <a:solidFill>
+                  <a:srgbClr val="FF0000"/>
+                </a:solidFill>
+              </a:rPr>
+              <a:t>CUARTO BUG</a:t>
+            </a:r>
+            <a:endParaRPr lang="es-MX" sz="8800" dirty="0">
+              <a:solidFill>
+                <a:srgbClr val="FF0000"/>
+              </a:solidFill>
+            </a:endParaRPr>
+          </a:p>
+        </p:txBody>
+      </p:sp>
+    </p:spTree>
+    <p:extLst>
+      <p:ext uri="{BB962C8B-B14F-4D97-AF65-F5344CB8AC3E}">
+        <p14:creationId xmlns:p14="http://schemas.microsoft.com/office/powerpoint/2010/main" val="3172972419"/>
+      </p:ext>
+    </p:extLst>
+  </p:cSld>
+  <p:clrMapOvr>
+    <a:masterClrMapping/>
+  </p:clrMapOvr>
+</p:sld>
+</file>
+
+<file path=ppt/slides/slide18.xml><?xml version="1.0" encoding="utf-8"?>
+<p:sld xmlns:a="http://schemas.openxmlformats.org/drawingml/2006/main" xmlns:r="http://schemas.openxmlformats.org/officeDocument/2006/relationships" xmlns:p="http://schemas.openxmlformats.org/presentationml/2006/main">
+  <p:cSld>
+    <p:spTree>
+      <p:nvGrpSpPr>
+        <p:cNvPr id="1" name=""/>
+        <p:cNvGrpSpPr/>
+        <p:nvPr/>
+      </p:nvGrpSpPr>
+      <p:grpSpPr>
+        <a:xfrm>
+          <a:off x="0" y="0"/>
+          <a:ext cx="0" cy="0"/>
+          <a:chOff x="0" y="0"/>
+          <a:chExt cx="0" cy="0"/>
+        </a:xfrm>
+      </p:grpSpPr>
+      <p:sp>
+        <p:nvSpPr>
+          <p:cNvPr id="5" name="CuadroTexto 4">
+            <a:extLst>
+              <a:ext uri="{FF2B5EF4-FFF2-40B4-BE49-F238E27FC236}">
+                <a16:creationId xmlns:a16="http://schemas.microsoft.com/office/drawing/2014/main" id="{770D1113-6E89-42EB-BCA1-9E7EB0E2430F}"/>
+              </a:ext>
+            </a:extLst>
+          </p:cNvPr>
+          <p:cNvSpPr txBox="1"/>
+          <p:nvPr/>
+        </p:nvSpPr>
+        <p:spPr>
+          <a:xfrm>
+            <a:off x="494950" y="335560"/>
+            <a:ext cx="3154261" cy="923330"/>
+          </a:xfrm>
+          <a:prstGeom prst="rect">
+            <a:avLst/>
+          </a:prstGeom>
+          <a:noFill/>
+        </p:spPr>
+        <p:txBody>
+          <a:bodyPr wrap="square" rtlCol="0">
+            <a:spAutoFit/>
+          </a:bodyPr>
+          <a:lstStyle/>
+          <a:p>
+            <a:r>
+              <a:rPr lang="es-ES" dirty="0">
+                <a:solidFill>
+                  <a:srgbClr val="FF0000"/>
+                </a:solidFill>
+              </a:rPr>
+              <a:t>Cuarto bug</a:t>
+            </a:r>
+          </a:p>
+          <a:p>
+            <a:endParaRPr lang="es-ES" dirty="0">
+              <a:solidFill>
+                <a:srgbClr val="FF0000"/>
+              </a:solidFill>
+            </a:endParaRPr>
+          </a:p>
+          <a:p>
+            <a:r>
+              <a:rPr lang="es-ES" dirty="0"/>
+              <a:t>Abrimos la pagina web </a:t>
+            </a:r>
+            <a:r>
+              <a:rPr lang="es-ES" dirty="0">
+                <a:solidFill>
+                  <a:schemeClr val="accent1"/>
+                </a:solidFill>
+              </a:rPr>
+              <a:t>Guru99</a:t>
+            </a:r>
+            <a:endParaRPr lang="es-MX" dirty="0">
+              <a:solidFill>
+                <a:schemeClr val="accent1"/>
+              </a:solidFill>
+            </a:endParaRPr>
+          </a:p>
+        </p:txBody>
+      </p:sp>
+      <p:pic>
+        <p:nvPicPr>
+          <p:cNvPr id="7" name="Imagen 6">
+            <a:extLst>
+              <a:ext uri="{FF2B5EF4-FFF2-40B4-BE49-F238E27FC236}">
+                <a16:creationId xmlns:a16="http://schemas.microsoft.com/office/drawing/2014/main" id="{0C95BD47-6FCF-45E6-85E9-92A63A260799}"/>
+              </a:ext>
+            </a:extLst>
+          </p:cNvPr>
+          <p:cNvPicPr>
+            <a:picLocks noChangeAspect="1"/>
+          </p:cNvPicPr>
+          <p:nvPr/>
+        </p:nvPicPr>
+        <p:blipFill>
+          <a:blip r:embed="rId2">
+            <a:extLst>
+              <a:ext uri="{28A0092B-C50C-407E-A947-70E740481C1C}">
+                <a14:useLocalDpi xmlns:a14="http://schemas.microsoft.com/office/drawing/2010/main" val="0"/>
+              </a:ext>
+            </a:extLst>
+          </a:blip>
+          <a:stretch>
+            <a:fillRect/>
+          </a:stretch>
+        </p:blipFill>
+        <p:spPr>
+          <a:xfrm>
+            <a:off x="218114" y="1258890"/>
+            <a:ext cx="10490707" cy="5599110"/>
+          </a:xfrm>
+          <a:prstGeom prst="rect">
+            <a:avLst/>
+          </a:prstGeom>
+        </p:spPr>
+      </p:pic>
+    </p:spTree>
+    <p:extLst>
+      <p:ext uri="{BB962C8B-B14F-4D97-AF65-F5344CB8AC3E}">
+        <p14:creationId xmlns:p14="http://schemas.microsoft.com/office/powerpoint/2010/main" val="3792564724"/>
+      </p:ext>
+    </p:extLst>
+  </p:cSld>
+  <p:clrMapOvr>
+    <a:masterClrMapping/>
+  </p:clrMapOvr>
+</p:sld>
+</file>
+
+<file path=ppt/slides/slide19.xml><?xml version="1.0" encoding="utf-8"?>
+<p:sld xmlns:a="http://schemas.openxmlformats.org/drawingml/2006/main" xmlns:r="http://schemas.openxmlformats.org/officeDocument/2006/relationships" xmlns:p="http://schemas.openxmlformats.org/presentationml/2006/main">
+  <p:cSld>
+    <p:spTree>
+      <p:nvGrpSpPr>
+        <p:cNvPr id="1" name=""/>
+        <p:cNvGrpSpPr/>
+        <p:nvPr/>
+      </p:nvGrpSpPr>
+      <p:grpSpPr>
+        <a:xfrm>
+          <a:off x="0" y="0"/>
+          <a:ext cx="0" cy="0"/>
+          <a:chOff x="0" y="0"/>
+          <a:chExt cx="0" cy="0"/>
+        </a:xfrm>
+      </p:grpSpPr>
+      <p:pic>
+        <p:nvPicPr>
+          <p:cNvPr id="5" name="Imagen 4">
+            <a:extLst>
+              <a:ext uri="{FF2B5EF4-FFF2-40B4-BE49-F238E27FC236}">
+                <a16:creationId xmlns:a16="http://schemas.microsoft.com/office/drawing/2014/main" id="{0853724E-7E8A-4504-8B63-FAABED5E1367}"/>
+              </a:ext>
+            </a:extLst>
+          </p:cNvPr>
+          <p:cNvPicPr>
+            <a:picLocks noChangeAspect="1"/>
+          </p:cNvPicPr>
+          <p:nvPr/>
+        </p:nvPicPr>
+        <p:blipFill>
+          <a:blip r:embed="rId2">
+            <a:extLst>
+              <a:ext uri="{28A0092B-C50C-407E-A947-70E740481C1C}">
+                <a14:useLocalDpi xmlns:a14="http://schemas.microsoft.com/office/drawing/2010/main" val="0"/>
+              </a:ext>
+            </a:extLst>
+          </a:blip>
+          <a:stretch>
+            <a:fillRect/>
+          </a:stretch>
+        </p:blipFill>
+        <p:spPr>
+          <a:xfrm>
+            <a:off x="1365756" y="0"/>
+            <a:ext cx="9460488" cy="6858000"/>
+          </a:xfrm>
+          <a:prstGeom prst="rect">
+            <a:avLst/>
+          </a:prstGeom>
+        </p:spPr>
+      </p:pic>
+    </p:spTree>
+    <p:extLst>
+      <p:ext uri="{BB962C8B-B14F-4D97-AF65-F5344CB8AC3E}">
+        <p14:creationId xmlns:p14="http://schemas.microsoft.com/office/powerpoint/2010/main" val="2259482930"/>
       </p:ext>
     </p:extLst>
   </p:cSld>
@@ -4258,6 +4686,1533 @@
     <p:extLst>
       <p:ext uri="{BB962C8B-B14F-4D97-AF65-F5344CB8AC3E}">
         <p14:creationId xmlns:p14="http://schemas.microsoft.com/office/powerpoint/2010/main" val="4096494873"/>
+      </p:ext>
+    </p:extLst>
+  </p:cSld>
+  <p:clrMapOvr>
+    <a:masterClrMapping/>
+  </p:clrMapOvr>
+</p:sld>
+</file>
+
+<file path=ppt/slides/slide20.xml><?xml version="1.0" encoding="utf-8"?>
+<p:sld xmlns:a="http://schemas.openxmlformats.org/drawingml/2006/main" xmlns:r="http://schemas.openxmlformats.org/officeDocument/2006/relationships" xmlns:p="http://schemas.openxmlformats.org/presentationml/2006/main">
+  <p:cSld>
+    <p:spTree>
+      <p:nvGrpSpPr>
+        <p:cNvPr id="1" name=""/>
+        <p:cNvGrpSpPr/>
+        <p:nvPr/>
+      </p:nvGrpSpPr>
+      <p:grpSpPr>
+        <a:xfrm>
+          <a:off x="0" y="0"/>
+          <a:ext cx="0" cy="0"/>
+          <a:chOff x="0" y="0"/>
+          <a:chExt cx="0" cy="0"/>
+        </a:xfrm>
+      </p:grpSpPr>
+      <p:graphicFrame>
+        <p:nvGraphicFramePr>
+          <p:cNvPr id="4" name="Tabla 5">
+            <a:extLst>
+              <a:ext uri="{FF2B5EF4-FFF2-40B4-BE49-F238E27FC236}">
+                <a16:creationId xmlns:a16="http://schemas.microsoft.com/office/drawing/2014/main" id="{8F843A8E-689B-449A-96EB-1D46AA58FD9A}"/>
+              </a:ext>
+            </a:extLst>
+          </p:cNvPr>
+          <p:cNvGraphicFramePr>
+            <a:graphicFrameLocks noGrp="1"/>
+          </p:cNvGraphicFramePr>
+          <p:nvPr>
+            <p:extLst>
+              <p:ext uri="{D42A27DB-BD31-4B8C-83A1-F6EECF244321}">
+                <p14:modId xmlns:p14="http://schemas.microsoft.com/office/powerpoint/2010/main" val="4101663030"/>
+              </p:ext>
+            </p:extLst>
+          </p:nvPr>
+        </p:nvGraphicFramePr>
+        <p:xfrm>
+          <a:off x="1906165" y="702888"/>
+          <a:ext cx="9226027" cy="4124960"/>
+        </p:xfrm>
+        <a:graphic>
+          <a:graphicData uri="http://schemas.openxmlformats.org/drawingml/2006/table">
+            <a:tbl>
+              <a:tblPr firstRow="1" bandRow="1">
+                <a:tableStyleId>{073A0DAA-6AF3-43AB-8588-CEC1D06C72B9}</a:tableStyleId>
+              </a:tblPr>
+              <a:tblGrid>
+                <a:gridCol w="3225936">
+                  <a:extLst>
+                    <a:ext uri="{9D8B030D-6E8A-4147-A177-3AD203B41FA5}">
+                      <a16:colId xmlns:a16="http://schemas.microsoft.com/office/drawing/2014/main" val="3209075916"/>
+                    </a:ext>
+                  </a:extLst>
+                </a:gridCol>
+                <a:gridCol w="6000091">
+                  <a:extLst>
+                    <a:ext uri="{9D8B030D-6E8A-4147-A177-3AD203B41FA5}">
+                      <a16:colId xmlns:a16="http://schemas.microsoft.com/office/drawing/2014/main" val="4058670583"/>
+                    </a:ext>
+                  </a:extLst>
+                </a:gridCol>
+              </a:tblGrid>
+              <a:tr h="370840">
+                <a:tc>
+                  <a:txBody>
+                    <a:bodyPr/>
+                    <a:lstStyle/>
+                    <a:p>
+                      <a:r>
+                        <a:rPr lang="es-MX" b="0" dirty="0"/>
+                        <a:t>Titulo</a:t>
+                      </a:r>
+                    </a:p>
+                  </a:txBody>
+                  <a:tcPr/>
+                </a:tc>
+                <a:tc>
+                  <a:txBody>
+                    <a:bodyPr/>
+                    <a:lstStyle/>
+                    <a:p>
+                      <a:r>
+                        <a:rPr lang="es-MX" dirty="0"/>
+                        <a:t>Se registra sin poner datos</a:t>
+                      </a:r>
+                    </a:p>
+                  </a:txBody>
+                  <a:tcPr/>
+                </a:tc>
+                <a:extLst>
+                  <a:ext uri="{0D108BD9-81ED-4DB2-BD59-A6C34878D82A}">
+                    <a16:rowId xmlns:a16="http://schemas.microsoft.com/office/drawing/2014/main" val="620287769"/>
+                  </a:ext>
+                </a:extLst>
+              </a:tr>
+              <a:tr h="370840">
+                <a:tc>
+                  <a:txBody>
+                    <a:bodyPr/>
+                    <a:lstStyle/>
+                    <a:p>
+                      <a:r>
+                        <a:rPr lang="es-MX" dirty="0"/>
+                        <a:t>Descripción</a:t>
+                      </a:r>
+                    </a:p>
+                  </a:txBody>
+                  <a:tcPr/>
+                </a:tc>
+                <a:tc>
+                  <a:txBody>
+                    <a:bodyPr/>
+                    <a:lstStyle/>
+                    <a:p>
+                      <a:r>
+                        <a:rPr lang="es-MX" dirty="0"/>
+                        <a:t>La pagina web permite el registro de usuario sin ingresar ningún dato</a:t>
+                      </a:r>
+                    </a:p>
+                  </a:txBody>
+                  <a:tcPr/>
+                </a:tc>
+                <a:extLst>
+                  <a:ext uri="{0D108BD9-81ED-4DB2-BD59-A6C34878D82A}">
+                    <a16:rowId xmlns:a16="http://schemas.microsoft.com/office/drawing/2014/main" val="3419308306"/>
+                  </a:ext>
+                </a:extLst>
+              </a:tr>
+              <a:tr h="546358">
+                <a:tc>
+                  <a:txBody>
+                    <a:bodyPr/>
+                    <a:lstStyle/>
+                    <a:p>
+                      <a:r>
+                        <a:rPr lang="es-MX" dirty="0"/>
+                        <a:t>Pasos</a:t>
+                      </a:r>
+                    </a:p>
+                  </a:txBody>
+                  <a:tcPr/>
+                </a:tc>
+                <a:tc>
+                  <a:txBody>
+                    <a:bodyPr/>
+                    <a:lstStyle/>
+                    <a:p>
+                      <a:pPr marL="342900" indent="-342900">
+                        <a:buAutoNum type="arabicPeriod"/>
+                      </a:pPr>
+                      <a:r>
+                        <a:rPr lang="es-MX" dirty="0"/>
+                        <a:t>Ingresar: </a:t>
+                      </a:r>
+                      <a:r>
+                        <a:rPr lang="es-MX" sz="1800" b="0" i="0" kern="1200" dirty="0">
+                          <a:solidFill>
+                            <a:schemeClr val="dk1"/>
+                          </a:solidFill>
+                          <a:effectLst/>
+                          <a:latin typeface="+mn-lt"/>
+                          <a:ea typeface="+mn-ea"/>
+                          <a:cs typeface="+mn-cs"/>
+                          <a:hlinkClick r:id="rId2" tooltip="https://demo.guru99.com/test/newtours/register.php"/>
+                        </a:rPr>
+                        <a:t>https://demo.guru99.com/test/newtours/</a:t>
+                      </a:r>
+                      <a:endParaRPr lang="es-MX" sz="1800" b="0" i="0" kern="1200" dirty="0">
+                        <a:solidFill>
+                          <a:schemeClr val="dk1"/>
+                        </a:solidFill>
+                        <a:effectLst/>
+                        <a:latin typeface="+mn-lt"/>
+                        <a:ea typeface="+mn-ea"/>
+                        <a:cs typeface="+mn-cs"/>
+                      </a:endParaRPr>
+                    </a:p>
+                    <a:p>
+                      <a:pPr marL="342900" indent="-342900">
+                        <a:buAutoNum type="arabicPeriod"/>
+                      </a:pPr>
+                      <a:r>
+                        <a:rPr lang="es-MX" sz="1800" b="0" i="0" kern="1200" dirty="0" err="1">
+                          <a:solidFill>
+                            <a:schemeClr val="dk1"/>
+                          </a:solidFill>
+                          <a:effectLst/>
+                          <a:latin typeface="+mn-lt"/>
+                          <a:ea typeface="+mn-ea"/>
+                          <a:cs typeface="+mn-cs"/>
+                        </a:rPr>
+                        <a:t>Clickear</a:t>
+                      </a:r>
+                      <a:r>
+                        <a:rPr lang="es-MX" sz="1800" b="0" i="0" kern="1200" dirty="0">
+                          <a:solidFill>
+                            <a:schemeClr val="dk1"/>
+                          </a:solidFill>
+                          <a:effectLst/>
+                          <a:latin typeface="+mn-lt"/>
+                          <a:ea typeface="+mn-ea"/>
+                          <a:cs typeface="+mn-cs"/>
+                        </a:rPr>
+                        <a:t> en la opción “</a:t>
+                      </a:r>
+                      <a:r>
+                        <a:rPr lang="es-MX" sz="1800" b="0" i="0" kern="1200" dirty="0" err="1">
+                          <a:solidFill>
+                            <a:schemeClr val="dk1"/>
+                          </a:solidFill>
+                          <a:effectLst/>
+                          <a:latin typeface="+mn-lt"/>
+                          <a:ea typeface="+mn-ea"/>
+                          <a:cs typeface="+mn-cs"/>
+                        </a:rPr>
+                        <a:t>Register</a:t>
+                      </a:r>
+                      <a:r>
+                        <a:rPr lang="es-MX" sz="1800" b="0" i="0" kern="1200" dirty="0">
+                          <a:solidFill>
+                            <a:schemeClr val="dk1"/>
+                          </a:solidFill>
+                          <a:effectLst/>
+                          <a:latin typeface="+mn-lt"/>
+                          <a:ea typeface="+mn-ea"/>
+                          <a:cs typeface="+mn-cs"/>
+                        </a:rPr>
+                        <a:t>”</a:t>
+                      </a:r>
+                    </a:p>
+                    <a:p>
+                      <a:pPr marL="342900" indent="-342900">
+                        <a:buAutoNum type="arabicPeriod"/>
+                      </a:pPr>
+                      <a:r>
+                        <a:rPr lang="es-MX" sz="1800" b="0" i="0" kern="1200" dirty="0">
+                          <a:solidFill>
+                            <a:schemeClr val="dk1"/>
+                          </a:solidFill>
+                          <a:effectLst/>
+                          <a:latin typeface="+mn-lt"/>
+                          <a:ea typeface="+mn-ea"/>
+                          <a:cs typeface="+mn-cs"/>
+                        </a:rPr>
+                        <a:t>No introducir datos</a:t>
+                      </a:r>
+                    </a:p>
+                    <a:p>
+                      <a:pPr marL="342900" indent="-342900">
+                        <a:buAutoNum type="arabicPeriod"/>
+                      </a:pPr>
+                      <a:r>
+                        <a:rPr lang="es-MX" sz="1800" b="0" i="0" kern="1200" dirty="0" err="1">
+                          <a:solidFill>
+                            <a:schemeClr val="dk1"/>
+                          </a:solidFill>
+                          <a:effectLst/>
+                          <a:latin typeface="+mn-lt"/>
+                          <a:ea typeface="+mn-ea"/>
+                          <a:cs typeface="+mn-cs"/>
+                        </a:rPr>
+                        <a:t>Clickear</a:t>
+                      </a:r>
+                      <a:r>
+                        <a:rPr lang="es-MX" sz="1800" b="0" i="0" kern="1200" dirty="0">
+                          <a:solidFill>
+                            <a:schemeClr val="dk1"/>
+                          </a:solidFill>
+                          <a:effectLst/>
+                          <a:latin typeface="+mn-lt"/>
+                          <a:ea typeface="+mn-ea"/>
+                          <a:cs typeface="+mn-cs"/>
+                        </a:rPr>
+                        <a:t> en el botón “Enviar”</a:t>
+                      </a:r>
+                    </a:p>
+                  </a:txBody>
+                  <a:tcPr/>
+                </a:tc>
+                <a:extLst>
+                  <a:ext uri="{0D108BD9-81ED-4DB2-BD59-A6C34878D82A}">
+                    <a16:rowId xmlns:a16="http://schemas.microsoft.com/office/drawing/2014/main" val="1746594758"/>
+                  </a:ext>
+                </a:extLst>
+              </a:tr>
+              <a:tr h="370840">
+                <a:tc>
+                  <a:txBody>
+                    <a:bodyPr/>
+                    <a:lstStyle/>
+                    <a:p>
+                      <a:r>
+                        <a:rPr lang="es-MX" dirty="0"/>
+                        <a:t>Precondiciones</a:t>
+                      </a:r>
+                    </a:p>
+                  </a:txBody>
+                  <a:tcPr/>
+                </a:tc>
+                <a:tc>
+                  <a:txBody>
+                    <a:bodyPr/>
+                    <a:lstStyle/>
+                    <a:p>
+                      <a:r>
+                        <a:rPr lang="es-MX" dirty="0"/>
+                        <a:t>Un navegador de internet.</a:t>
+                      </a:r>
+                    </a:p>
+                    <a:p>
+                      <a:r>
+                        <a:rPr lang="es-MX" dirty="0"/>
+                        <a:t>No tener usuario en la pagina.</a:t>
+                      </a:r>
+                    </a:p>
+                  </a:txBody>
+                  <a:tcPr/>
+                </a:tc>
+                <a:extLst>
+                  <a:ext uri="{0D108BD9-81ED-4DB2-BD59-A6C34878D82A}">
+                    <a16:rowId xmlns:a16="http://schemas.microsoft.com/office/drawing/2014/main" val="2161702613"/>
+                  </a:ext>
+                </a:extLst>
+              </a:tr>
+              <a:tr h="370840">
+                <a:tc>
+                  <a:txBody>
+                    <a:bodyPr/>
+                    <a:lstStyle/>
+                    <a:p>
+                      <a:r>
+                        <a:rPr lang="es-MX" dirty="0"/>
+                        <a:t>Resultado esperado</a:t>
+                      </a:r>
+                    </a:p>
+                  </a:txBody>
+                  <a:tcPr/>
+                </a:tc>
+                <a:tc>
+                  <a:txBody>
+                    <a:bodyPr/>
+                    <a:lstStyle/>
+                    <a:p>
+                      <a:r>
+                        <a:rPr lang="es-MX" dirty="0"/>
+                        <a:t>No permitir el registro de usuario sin completar los datos del formulario.</a:t>
+                      </a:r>
+                    </a:p>
+                    <a:p>
+                      <a:endParaRPr lang="es-MX" dirty="0"/>
+                    </a:p>
+                  </a:txBody>
+                  <a:tcPr/>
+                </a:tc>
+                <a:extLst>
+                  <a:ext uri="{0D108BD9-81ED-4DB2-BD59-A6C34878D82A}">
+                    <a16:rowId xmlns:a16="http://schemas.microsoft.com/office/drawing/2014/main" val="3394570666"/>
+                  </a:ext>
+                </a:extLst>
+              </a:tr>
+              <a:tr h="370840">
+                <a:tc>
+                  <a:txBody>
+                    <a:bodyPr/>
+                    <a:lstStyle/>
+                    <a:p>
+                      <a:r>
+                        <a:rPr lang="es-MX" dirty="0"/>
+                        <a:t>Resultado obtenido</a:t>
+                      </a:r>
+                    </a:p>
+                  </a:txBody>
+                  <a:tcPr/>
+                </a:tc>
+                <a:tc>
+                  <a:txBody>
+                    <a:bodyPr/>
+                    <a:lstStyle/>
+                    <a:p>
+                      <a:r>
+                        <a:rPr lang="es-MX" dirty="0"/>
+                        <a:t>Permite el registro de usuario sin rellenar el formulario.</a:t>
+                      </a:r>
+                    </a:p>
+                  </a:txBody>
+                  <a:tcPr/>
+                </a:tc>
+                <a:extLst>
+                  <a:ext uri="{0D108BD9-81ED-4DB2-BD59-A6C34878D82A}">
+                    <a16:rowId xmlns:a16="http://schemas.microsoft.com/office/drawing/2014/main" val="1327796877"/>
+                  </a:ext>
+                </a:extLst>
+              </a:tr>
+            </a:tbl>
+          </a:graphicData>
+        </a:graphic>
+      </p:graphicFrame>
+    </p:spTree>
+    <p:extLst>
+      <p:ext uri="{BB962C8B-B14F-4D97-AF65-F5344CB8AC3E}">
+        <p14:creationId xmlns:p14="http://schemas.microsoft.com/office/powerpoint/2010/main" val="2419145179"/>
+      </p:ext>
+    </p:extLst>
+  </p:cSld>
+  <p:clrMapOvr>
+    <a:masterClrMapping/>
+  </p:clrMapOvr>
+</p:sld>
+</file>
+
+<file path=ppt/slides/slide21.xml><?xml version="1.0" encoding="utf-8"?>
+<p:sld xmlns:a="http://schemas.openxmlformats.org/drawingml/2006/main" xmlns:r="http://schemas.openxmlformats.org/officeDocument/2006/relationships" xmlns:p="http://schemas.openxmlformats.org/presentationml/2006/main">
+  <p:cSld>
+    <p:spTree>
+      <p:nvGrpSpPr>
+        <p:cNvPr id="1" name=""/>
+        <p:cNvGrpSpPr/>
+        <p:nvPr/>
+      </p:nvGrpSpPr>
+      <p:grpSpPr>
+        <a:xfrm>
+          <a:off x="0" y="0"/>
+          <a:ext cx="0" cy="0"/>
+          <a:chOff x="0" y="0"/>
+          <a:chExt cx="0" cy="0"/>
+        </a:xfrm>
+      </p:grpSpPr>
+      <p:pic>
+        <p:nvPicPr>
+          <p:cNvPr id="5" name="Imagen 4">
+            <a:extLst>
+              <a:ext uri="{FF2B5EF4-FFF2-40B4-BE49-F238E27FC236}">
+                <a16:creationId xmlns:a16="http://schemas.microsoft.com/office/drawing/2014/main" id="{F3436DEC-BDAD-4AD9-A7BA-329A9A99CBEC}"/>
+              </a:ext>
+            </a:extLst>
+          </p:cNvPr>
+          <p:cNvPicPr>
+            <a:picLocks noChangeAspect="1"/>
+          </p:cNvPicPr>
+          <p:nvPr/>
+        </p:nvPicPr>
+        <p:blipFill>
+          <a:blip r:embed="rId2">
+            <a:extLst>
+              <a:ext uri="{28A0092B-C50C-407E-A947-70E740481C1C}">
+                <a14:useLocalDpi xmlns:a14="http://schemas.microsoft.com/office/drawing/2010/main" val="0"/>
+              </a:ext>
+            </a:extLst>
+          </a:blip>
+          <a:stretch>
+            <a:fillRect/>
+          </a:stretch>
+        </p:blipFill>
+        <p:spPr>
+          <a:xfrm>
+            <a:off x="1466169" y="0"/>
+            <a:ext cx="9259661" cy="6858000"/>
+          </a:xfrm>
+          <a:prstGeom prst="rect">
+            <a:avLst/>
+          </a:prstGeom>
+        </p:spPr>
+      </p:pic>
+    </p:spTree>
+    <p:extLst>
+      <p:ext uri="{BB962C8B-B14F-4D97-AF65-F5344CB8AC3E}">
+        <p14:creationId xmlns:p14="http://schemas.microsoft.com/office/powerpoint/2010/main" val="2812204038"/>
+      </p:ext>
+    </p:extLst>
+  </p:cSld>
+  <p:clrMapOvr>
+    <a:masterClrMapping/>
+  </p:clrMapOvr>
+</p:sld>
+</file>
+
+<file path=ppt/slides/slide22.xml><?xml version="1.0" encoding="utf-8"?>
+<p:sld xmlns:a="http://schemas.openxmlformats.org/drawingml/2006/main" xmlns:r="http://schemas.openxmlformats.org/officeDocument/2006/relationships" xmlns:p="http://schemas.openxmlformats.org/presentationml/2006/main">
+  <p:cSld>
+    <p:spTree>
+      <p:nvGrpSpPr>
+        <p:cNvPr id="1" name=""/>
+        <p:cNvGrpSpPr/>
+        <p:nvPr/>
+      </p:nvGrpSpPr>
+      <p:grpSpPr>
+        <a:xfrm>
+          <a:off x="0" y="0"/>
+          <a:ext cx="0" cy="0"/>
+          <a:chOff x="0" y="0"/>
+          <a:chExt cx="0" cy="0"/>
+        </a:xfrm>
+      </p:grpSpPr>
+      <p:pic>
+        <p:nvPicPr>
+          <p:cNvPr id="5" name="Imagen 4">
+            <a:extLst>
+              <a:ext uri="{FF2B5EF4-FFF2-40B4-BE49-F238E27FC236}">
+                <a16:creationId xmlns:a16="http://schemas.microsoft.com/office/drawing/2014/main" id="{7570E8AB-768D-401A-BD28-EBCAEE7A3183}"/>
+              </a:ext>
+            </a:extLst>
+          </p:cNvPr>
+          <p:cNvPicPr>
+            <a:picLocks noChangeAspect="1"/>
+          </p:cNvPicPr>
+          <p:nvPr/>
+        </p:nvPicPr>
+        <p:blipFill>
+          <a:blip r:embed="rId2">
+            <a:extLst>
+              <a:ext uri="{28A0092B-C50C-407E-A947-70E740481C1C}">
+                <a14:useLocalDpi xmlns:a14="http://schemas.microsoft.com/office/drawing/2010/main" val="0"/>
+              </a:ext>
+            </a:extLst>
+          </a:blip>
+          <a:stretch>
+            <a:fillRect/>
+          </a:stretch>
+        </p:blipFill>
+        <p:spPr>
+          <a:xfrm>
+            <a:off x="1470117" y="0"/>
+            <a:ext cx="9251766" cy="6858000"/>
+          </a:xfrm>
+          <a:prstGeom prst="rect">
+            <a:avLst/>
+          </a:prstGeom>
+        </p:spPr>
+      </p:pic>
+    </p:spTree>
+    <p:extLst>
+      <p:ext uri="{BB962C8B-B14F-4D97-AF65-F5344CB8AC3E}">
+        <p14:creationId xmlns:p14="http://schemas.microsoft.com/office/powerpoint/2010/main" val="2382331383"/>
+      </p:ext>
+    </p:extLst>
+  </p:cSld>
+  <p:clrMapOvr>
+    <a:masterClrMapping/>
+  </p:clrMapOvr>
+</p:sld>
+</file>
+
+<file path=ppt/slides/slide23.xml><?xml version="1.0" encoding="utf-8"?>
+<p:sld xmlns:a="http://schemas.openxmlformats.org/drawingml/2006/main" xmlns:r="http://schemas.openxmlformats.org/officeDocument/2006/relationships" xmlns:p="http://schemas.openxmlformats.org/presentationml/2006/main">
+  <p:cSld>
+    <p:spTree>
+      <p:nvGrpSpPr>
+        <p:cNvPr id="1" name=""/>
+        <p:cNvGrpSpPr/>
+        <p:nvPr/>
+      </p:nvGrpSpPr>
+      <p:grpSpPr>
+        <a:xfrm>
+          <a:off x="0" y="0"/>
+          <a:ext cx="0" cy="0"/>
+          <a:chOff x="0" y="0"/>
+          <a:chExt cx="0" cy="0"/>
+        </a:xfrm>
+      </p:grpSpPr>
+      <p:sp>
+        <p:nvSpPr>
+          <p:cNvPr id="3" name="Marcador de contenido 2">
+            <a:extLst>
+              <a:ext uri="{FF2B5EF4-FFF2-40B4-BE49-F238E27FC236}">
+                <a16:creationId xmlns:a16="http://schemas.microsoft.com/office/drawing/2014/main" id="{92B21EB1-16D8-4115-B95F-C2B296511F5E}"/>
+              </a:ext>
+            </a:extLst>
+          </p:cNvPr>
+          <p:cNvSpPr>
+            <a:spLocks noGrp="1"/>
+          </p:cNvSpPr>
+          <p:nvPr>
+            <p:ph idx="1"/>
+          </p:nvPr>
+        </p:nvSpPr>
+        <p:spPr/>
+        <p:txBody>
+          <a:bodyPr>
+            <a:normAutofit/>
+          </a:bodyPr>
+          <a:lstStyle/>
+          <a:p>
+            <a:pPr algn="ctr"/>
+            <a:r>
+              <a:rPr lang="es-ES" sz="8800" dirty="0">
+                <a:solidFill>
+                  <a:srgbClr val="FF0000"/>
+                </a:solidFill>
+              </a:rPr>
+              <a:t>QUINTO BUG</a:t>
+            </a:r>
+            <a:endParaRPr lang="es-MX" sz="8800" dirty="0">
+              <a:solidFill>
+                <a:srgbClr val="FF0000"/>
+              </a:solidFill>
+            </a:endParaRPr>
+          </a:p>
+        </p:txBody>
+      </p:sp>
+    </p:spTree>
+    <p:extLst>
+      <p:ext uri="{BB962C8B-B14F-4D97-AF65-F5344CB8AC3E}">
+        <p14:creationId xmlns:p14="http://schemas.microsoft.com/office/powerpoint/2010/main" val="522282737"/>
+      </p:ext>
+    </p:extLst>
+  </p:cSld>
+  <p:clrMapOvr>
+    <a:masterClrMapping/>
+  </p:clrMapOvr>
+</p:sld>
+</file>
+
+<file path=ppt/slides/slide24.xml><?xml version="1.0" encoding="utf-8"?>
+<p:sld xmlns:a="http://schemas.openxmlformats.org/drawingml/2006/main" xmlns:r="http://schemas.openxmlformats.org/officeDocument/2006/relationships" xmlns:p="http://schemas.openxmlformats.org/presentationml/2006/main">
+  <p:cSld>
+    <p:spTree>
+      <p:nvGrpSpPr>
+        <p:cNvPr id="1" name=""/>
+        <p:cNvGrpSpPr/>
+        <p:nvPr/>
+      </p:nvGrpSpPr>
+      <p:grpSpPr>
+        <a:xfrm>
+          <a:off x="0" y="0"/>
+          <a:ext cx="0" cy="0"/>
+          <a:chOff x="0" y="0"/>
+          <a:chExt cx="0" cy="0"/>
+        </a:xfrm>
+      </p:grpSpPr>
+      <p:sp>
+        <p:nvSpPr>
+          <p:cNvPr id="6" name="CuadroTexto 5">
+            <a:extLst>
+              <a:ext uri="{FF2B5EF4-FFF2-40B4-BE49-F238E27FC236}">
+                <a16:creationId xmlns:a16="http://schemas.microsoft.com/office/drawing/2014/main" id="{3A2FCBCC-2802-4A1C-8600-C607D303FE34}"/>
+              </a:ext>
+            </a:extLst>
+          </p:cNvPr>
+          <p:cNvSpPr txBox="1"/>
+          <p:nvPr/>
+        </p:nvSpPr>
+        <p:spPr>
+          <a:xfrm>
+            <a:off x="956346" y="352338"/>
+            <a:ext cx="3624044" cy="923330"/>
+          </a:xfrm>
+          <a:prstGeom prst="rect">
+            <a:avLst/>
+          </a:prstGeom>
+          <a:noFill/>
+        </p:spPr>
+        <p:txBody>
+          <a:bodyPr wrap="square" rtlCol="0">
+            <a:spAutoFit/>
+          </a:bodyPr>
+          <a:lstStyle/>
+          <a:p>
+            <a:r>
+              <a:rPr lang="es-ES" dirty="0">
+                <a:solidFill>
+                  <a:srgbClr val="FF0000"/>
+                </a:solidFill>
+              </a:rPr>
+              <a:t>Quinto bug.</a:t>
+            </a:r>
+          </a:p>
+          <a:p>
+            <a:endParaRPr lang="es-ES" dirty="0"/>
+          </a:p>
+          <a:p>
+            <a:r>
+              <a:rPr lang="es-MX" dirty="0"/>
+              <a:t>Abrimos la pagina web </a:t>
+            </a:r>
+            <a:r>
+              <a:rPr lang="es-MX" dirty="0">
+                <a:solidFill>
+                  <a:schemeClr val="accent1"/>
+                </a:solidFill>
+              </a:rPr>
+              <a:t>Guru99</a:t>
+            </a:r>
+            <a:endParaRPr lang="es-ES" dirty="0">
+              <a:solidFill>
+                <a:schemeClr val="accent1"/>
+              </a:solidFill>
+            </a:endParaRPr>
+          </a:p>
+        </p:txBody>
+      </p:sp>
+      <p:pic>
+        <p:nvPicPr>
+          <p:cNvPr id="8" name="Imagen 7">
+            <a:extLst>
+              <a:ext uri="{FF2B5EF4-FFF2-40B4-BE49-F238E27FC236}">
+                <a16:creationId xmlns:a16="http://schemas.microsoft.com/office/drawing/2014/main" id="{B82B36F6-5A96-4C9C-A398-DC9700791FB2}"/>
+              </a:ext>
+            </a:extLst>
+          </p:cNvPr>
+          <p:cNvPicPr>
+            <a:picLocks noChangeAspect="1"/>
+          </p:cNvPicPr>
+          <p:nvPr/>
+        </p:nvPicPr>
+        <p:blipFill>
+          <a:blip r:embed="rId2">
+            <a:extLst>
+              <a:ext uri="{28A0092B-C50C-407E-A947-70E740481C1C}">
+                <a14:useLocalDpi xmlns:a14="http://schemas.microsoft.com/office/drawing/2010/main" val="0"/>
+              </a:ext>
+            </a:extLst>
+          </a:blip>
+          <a:stretch>
+            <a:fillRect/>
+          </a:stretch>
+        </p:blipFill>
+        <p:spPr>
+          <a:xfrm>
+            <a:off x="696286" y="1275668"/>
+            <a:ext cx="9968312" cy="5582332"/>
+          </a:xfrm>
+          <a:prstGeom prst="rect">
+            <a:avLst/>
+          </a:prstGeom>
+        </p:spPr>
+      </p:pic>
+    </p:spTree>
+    <p:extLst>
+      <p:ext uri="{BB962C8B-B14F-4D97-AF65-F5344CB8AC3E}">
+        <p14:creationId xmlns:p14="http://schemas.microsoft.com/office/powerpoint/2010/main" val="1630410460"/>
+      </p:ext>
+    </p:extLst>
+  </p:cSld>
+  <p:clrMapOvr>
+    <a:masterClrMapping/>
+  </p:clrMapOvr>
+</p:sld>
+</file>
+
+<file path=ppt/slides/slide25.xml><?xml version="1.0" encoding="utf-8"?>
+<p:sld xmlns:a="http://schemas.openxmlformats.org/drawingml/2006/main" xmlns:r="http://schemas.openxmlformats.org/officeDocument/2006/relationships" xmlns:p="http://schemas.openxmlformats.org/presentationml/2006/main">
+  <p:cSld>
+    <p:spTree>
+      <p:nvGrpSpPr>
+        <p:cNvPr id="1" name=""/>
+        <p:cNvGrpSpPr/>
+        <p:nvPr/>
+      </p:nvGrpSpPr>
+      <p:grpSpPr>
+        <a:xfrm>
+          <a:off x="0" y="0"/>
+          <a:ext cx="0" cy="0"/>
+          <a:chOff x="0" y="0"/>
+          <a:chExt cx="0" cy="0"/>
+        </a:xfrm>
+      </p:grpSpPr>
+      <p:pic>
+        <p:nvPicPr>
+          <p:cNvPr id="5" name="Imagen 4">
+            <a:extLst>
+              <a:ext uri="{FF2B5EF4-FFF2-40B4-BE49-F238E27FC236}">
+                <a16:creationId xmlns:a16="http://schemas.microsoft.com/office/drawing/2014/main" id="{6C94A0B5-90A8-49CD-96C2-8C936F33F451}"/>
+              </a:ext>
+            </a:extLst>
+          </p:cNvPr>
+          <p:cNvPicPr>
+            <a:picLocks noChangeAspect="1"/>
+          </p:cNvPicPr>
+          <p:nvPr/>
+        </p:nvPicPr>
+        <p:blipFill>
+          <a:blip r:embed="rId2">
+            <a:extLst>
+              <a:ext uri="{28A0092B-C50C-407E-A947-70E740481C1C}">
+                <a14:useLocalDpi xmlns:a14="http://schemas.microsoft.com/office/drawing/2010/main" val="0"/>
+              </a:ext>
+            </a:extLst>
+          </a:blip>
+          <a:stretch>
+            <a:fillRect/>
+          </a:stretch>
+        </p:blipFill>
+        <p:spPr>
+          <a:xfrm>
+            <a:off x="1430533" y="0"/>
+            <a:ext cx="9330934" cy="6858000"/>
+          </a:xfrm>
+          <a:prstGeom prst="rect">
+            <a:avLst/>
+          </a:prstGeom>
+        </p:spPr>
+      </p:pic>
+    </p:spTree>
+    <p:extLst>
+      <p:ext uri="{BB962C8B-B14F-4D97-AF65-F5344CB8AC3E}">
+        <p14:creationId xmlns:p14="http://schemas.microsoft.com/office/powerpoint/2010/main" val="1129012792"/>
+      </p:ext>
+    </p:extLst>
+  </p:cSld>
+  <p:clrMapOvr>
+    <a:masterClrMapping/>
+  </p:clrMapOvr>
+</p:sld>
+</file>
+
+<file path=ppt/slides/slide26.xml><?xml version="1.0" encoding="utf-8"?>
+<p:sld xmlns:a="http://schemas.openxmlformats.org/drawingml/2006/main" xmlns:r="http://schemas.openxmlformats.org/officeDocument/2006/relationships" xmlns:p="http://schemas.openxmlformats.org/presentationml/2006/main">
+  <p:cSld>
+    <p:spTree>
+      <p:nvGrpSpPr>
+        <p:cNvPr id="1" name=""/>
+        <p:cNvGrpSpPr/>
+        <p:nvPr/>
+      </p:nvGrpSpPr>
+      <p:grpSpPr>
+        <a:xfrm>
+          <a:off x="0" y="0"/>
+          <a:ext cx="0" cy="0"/>
+          <a:chOff x="0" y="0"/>
+          <a:chExt cx="0" cy="0"/>
+        </a:xfrm>
+      </p:grpSpPr>
+      <p:graphicFrame>
+        <p:nvGraphicFramePr>
+          <p:cNvPr id="6" name="Tabla 5">
+            <a:extLst>
+              <a:ext uri="{FF2B5EF4-FFF2-40B4-BE49-F238E27FC236}">
+                <a16:creationId xmlns:a16="http://schemas.microsoft.com/office/drawing/2014/main" id="{64A58262-4EA2-4839-99EC-5752F7DFC20C}"/>
+              </a:ext>
+            </a:extLst>
+          </p:cNvPr>
+          <p:cNvGraphicFramePr>
+            <a:graphicFrameLocks noGrp="1"/>
+          </p:cNvGraphicFramePr>
+          <p:nvPr>
+            <p:extLst>
+              <p:ext uri="{D42A27DB-BD31-4B8C-83A1-F6EECF244321}">
+                <p14:modId xmlns:p14="http://schemas.microsoft.com/office/powerpoint/2010/main" val="1014330021"/>
+              </p:ext>
+            </p:extLst>
+          </p:nvPr>
+        </p:nvGraphicFramePr>
+        <p:xfrm>
+          <a:off x="1906165" y="702888"/>
+          <a:ext cx="9226027" cy="3307080"/>
+        </p:xfrm>
+        <a:graphic>
+          <a:graphicData uri="http://schemas.openxmlformats.org/drawingml/2006/table">
+            <a:tbl>
+              <a:tblPr firstRow="1" bandRow="1">
+                <a:tableStyleId>{073A0DAA-6AF3-43AB-8588-CEC1D06C72B9}</a:tableStyleId>
+              </a:tblPr>
+              <a:tblGrid>
+                <a:gridCol w="3225936">
+                  <a:extLst>
+                    <a:ext uri="{9D8B030D-6E8A-4147-A177-3AD203B41FA5}">
+                      <a16:colId xmlns:a16="http://schemas.microsoft.com/office/drawing/2014/main" val="3209075916"/>
+                    </a:ext>
+                  </a:extLst>
+                </a:gridCol>
+                <a:gridCol w="6000091">
+                  <a:extLst>
+                    <a:ext uri="{9D8B030D-6E8A-4147-A177-3AD203B41FA5}">
+                      <a16:colId xmlns:a16="http://schemas.microsoft.com/office/drawing/2014/main" val="4058670583"/>
+                    </a:ext>
+                  </a:extLst>
+                </a:gridCol>
+              </a:tblGrid>
+              <a:tr h="370840">
+                <a:tc>
+                  <a:txBody>
+                    <a:bodyPr/>
+                    <a:lstStyle/>
+                    <a:p>
+                      <a:r>
+                        <a:rPr lang="es-MX" b="0" dirty="0"/>
+                        <a:t>Titulo</a:t>
+                      </a:r>
+                    </a:p>
+                  </a:txBody>
+                  <a:tcPr/>
+                </a:tc>
+                <a:tc>
+                  <a:txBody>
+                    <a:bodyPr/>
+                    <a:lstStyle/>
+                    <a:p>
+                      <a:r>
+                        <a:rPr lang="es-MX" dirty="0"/>
+                        <a:t>Link </a:t>
+                      </a:r>
+                      <a:r>
+                        <a:rPr lang="es-MX" sz="1800" b="0" i="0" u="sng" kern="1200" dirty="0">
+                          <a:solidFill>
+                            <a:schemeClr val="lt1"/>
+                          </a:solidFill>
+                          <a:effectLst/>
+                          <a:latin typeface="+mn-lt"/>
+                          <a:ea typeface="+mn-ea"/>
+                          <a:cs typeface="+mn-cs"/>
+                        </a:rPr>
+                        <a:t>incorrecto</a:t>
+                      </a:r>
+                      <a:endParaRPr lang="es-MX" dirty="0"/>
+                    </a:p>
+                  </a:txBody>
+                  <a:tcPr/>
+                </a:tc>
+                <a:extLst>
+                  <a:ext uri="{0D108BD9-81ED-4DB2-BD59-A6C34878D82A}">
+                    <a16:rowId xmlns:a16="http://schemas.microsoft.com/office/drawing/2014/main" val="620287769"/>
+                  </a:ext>
+                </a:extLst>
+              </a:tr>
+              <a:tr h="370840">
+                <a:tc>
+                  <a:txBody>
+                    <a:bodyPr/>
+                    <a:lstStyle/>
+                    <a:p>
+                      <a:r>
+                        <a:rPr lang="es-MX" dirty="0"/>
+                        <a:t>Descripción</a:t>
+                      </a:r>
+                    </a:p>
+                  </a:txBody>
+                  <a:tcPr/>
+                </a:tc>
+                <a:tc>
+                  <a:txBody>
+                    <a:bodyPr/>
+                    <a:lstStyle/>
+                    <a:p>
+                      <a:r>
+                        <a:rPr lang="es-MX" dirty="0"/>
+                        <a:t>El link </a:t>
+                      </a:r>
+                      <a:r>
+                        <a:rPr lang="es-MX" dirty="0">
+                          <a:hlinkClick r:id="rId2"/>
+                        </a:rPr>
+                        <a:t>“</a:t>
+                      </a:r>
+                      <a:r>
+                        <a:rPr lang="es-MX" sz="1800" b="0" i="0" u="sng" kern="1200" dirty="0">
+                          <a:solidFill>
+                            <a:schemeClr val="dk1"/>
+                          </a:solidFill>
+                          <a:effectLst/>
+                          <a:latin typeface="+mn-lt"/>
+                          <a:ea typeface="+mn-ea"/>
+                          <a:cs typeface="+mn-cs"/>
+                          <a:hlinkClick r:id="rId2"/>
+                        </a:rPr>
+                        <a:t>Business </a:t>
+                      </a:r>
+                      <a:r>
+                        <a:rPr lang="es-MX" sz="1800" b="0" i="0" u="sng" kern="1200" dirty="0" err="1">
+                          <a:solidFill>
+                            <a:schemeClr val="dk1"/>
+                          </a:solidFill>
+                          <a:effectLst/>
+                          <a:latin typeface="+mn-lt"/>
+                          <a:ea typeface="+mn-ea"/>
+                          <a:cs typeface="+mn-cs"/>
+                          <a:hlinkClick r:id="rId2"/>
+                        </a:rPr>
+                        <a:t>Travel</a:t>
+                      </a:r>
+                      <a:r>
+                        <a:rPr lang="es-MX" sz="1800" b="0" i="0" u="sng" kern="1200" dirty="0">
+                          <a:solidFill>
+                            <a:schemeClr val="dk1"/>
+                          </a:solidFill>
+                          <a:effectLst/>
+                          <a:latin typeface="+mn-lt"/>
+                          <a:ea typeface="+mn-ea"/>
+                          <a:cs typeface="+mn-cs"/>
+                          <a:hlinkClick r:id="rId2"/>
+                        </a:rPr>
+                        <a:t> @ About.com</a:t>
+                      </a:r>
+                      <a:r>
+                        <a:rPr lang="es-MX" sz="1800" b="0" i="0" u="sng" kern="1200" dirty="0">
+                          <a:solidFill>
+                            <a:schemeClr val="dk1"/>
+                          </a:solidFill>
+                          <a:effectLst/>
+                          <a:latin typeface="+mn-lt"/>
+                          <a:ea typeface="+mn-ea"/>
+                          <a:cs typeface="+mn-cs"/>
+                        </a:rPr>
+                        <a:t>” es incorrecto.</a:t>
+                      </a:r>
+                      <a:endParaRPr lang="es-MX" dirty="0"/>
+                    </a:p>
+                  </a:txBody>
+                  <a:tcPr/>
+                </a:tc>
+                <a:extLst>
+                  <a:ext uri="{0D108BD9-81ED-4DB2-BD59-A6C34878D82A}">
+                    <a16:rowId xmlns:a16="http://schemas.microsoft.com/office/drawing/2014/main" val="3419308306"/>
+                  </a:ext>
+                </a:extLst>
+              </a:tr>
+              <a:tr h="546358">
+                <a:tc>
+                  <a:txBody>
+                    <a:bodyPr/>
+                    <a:lstStyle/>
+                    <a:p>
+                      <a:r>
+                        <a:rPr lang="es-MX" dirty="0"/>
+                        <a:t>Pasos</a:t>
+                      </a:r>
+                    </a:p>
+                  </a:txBody>
+                  <a:tcPr/>
+                </a:tc>
+                <a:tc>
+                  <a:txBody>
+                    <a:bodyPr/>
+                    <a:lstStyle/>
+                    <a:p>
+                      <a:pPr marL="342900" indent="-342900">
+                        <a:buAutoNum type="arabicPeriod"/>
+                      </a:pPr>
+                      <a:r>
+                        <a:rPr lang="es-MX" dirty="0"/>
+                        <a:t>Ingresar: </a:t>
+                      </a:r>
+                      <a:r>
+                        <a:rPr lang="es-MX" sz="1800" b="0" i="0" kern="1200" dirty="0">
+                          <a:solidFill>
+                            <a:schemeClr val="dk1"/>
+                          </a:solidFill>
+                          <a:effectLst/>
+                          <a:latin typeface="+mn-lt"/>
+                          <a:ea typeface="+mn-ea"/>
+                          <a:cs typeface="+mn-cs"/>
+                          <a:hlinkClick r:id="rId3" tooltip="https://demo.guru99.com/test/newtours/register.php"/>
+                        </a:rPr>
+                        <a:t>https://demo.guru99.com/test/newtours/</a:t>
+                      </a:r>
+                      <a:endParaRPr lang="es-MX" sz="1800" b="0" i="0" kern="1200" dirty="0">
+                        <a:solidFill>
+                          <a:schemeClr val="dk1"/>
+                        </a:solidFill>
+                        <a:effectLst/>
+                        <a:latin typeface="+mn-lt"/>
+                        <a:ea typeface="+mn-ea"/>
+                        <a:cs typeface="+mn-cs"/>
+                      </a:endParaRPr>
+                    </a:p>
+                    <a:p>
+                      <a:pPr marL="342900" indent="-342900">
+                        <a:buAutoNum type="arabicPeriod"/>
+                      </a:pPr>
+                      <a:r>
+                        <a:rPr lang="es-MX" sz="1800" b="0" i="0" kern="1200" dirty="0">
+                          <a:solidFill>
+                            <a:schemeClr val="dk1"/>
+                          </a:solidFill>
+                          <a:effectLst/>
+                          <a:latin typeface="+mn-lt"/>
+                          <a:ea typeface="+mn-ea"/>
+                          <a:cs typeface="+mn-cs"/>
+                        </a:rPr>
+                        <a:t>Abajo a la derecha dar </a:t>
+                      </a:r>
+                      <a:r>
+                        <a:rPr lang="es-MX" sz="1800" b="0" i="0" kern="1200" dirty="0" err="1">
+                          <a:solidFill>
+                            <a:schemeClr val="dk1"/>
+                          </a:solidFill>
+                          <a:effectLst/>
+                          <a:latin typeface="+mn-lt"/>
+                          <a:ea typeface="+mn-ea"/>
+                          <a:cs typeface="+mn-cs"/>
+                        </a:rPr>
+                        <a:t>click</a:t>
+                      </a:r>
+                      <a:r>
+                        <a:rPr lang="es-MX" sz="1800" b="0" i="0" kern="1200" dirty="0">
+                          <a:solidFill>
+                            <a:schemeClr val="dk1"/>
+                          </a:solidFill>
+                          <a:effectLst/>
+                          <a:latin typeface="+mn-lt"/>
+                          <a:ea typeface="+mn-ea"/>
+                          <a:cs typeface="+mn-cs"/>
+                        </a:rPr>
+                        <a:t> en </a:t>
+                      </a:r>
+                      <a:r>
+                        <a:rPr lang="es-MX" sz="1800" b="0" i="0" kern="1200" dirty="0">
+                          <a:solidFill>
+                            <a:schemeClr val="dk1"/>
+                          </a:solidFill>
+                          <a:effectLst/>
+                          <a:latin typeface="+mn-lt"/>
+                          <a:ea typeface="+mn-ea"/>
+                          <a:cs typeface="+mn-cs"/>
+                          <a:hlinkClick r:id="rId2"/>
+                        </a:rPr>
+                        <a:t>“</a:t>
+                      </a:r>
+                      <a:r>
+                        <a:rPr lang="es-MX" sz="1800" b="0" i="0" u="sng" kern="1200" dirty="0">
+                          <a:solidFill>
+                            <a:schemeClr val="dk1"/>
+                          </a:solidFill>
+                          <a:effectLst/>
+                          <a:latin typeface="+mn-lt"/>
+                          <a:ea typeface="+mn-ea"/>
+                          <a:cs typeface="+mn-cs"/>
+                          <a:hlinkClick r:id="rId2"/>
+                        </a:rPr>
+                        <a:t>Business </a:t>
+                      </a:r>
+                      <a:r>
+                        <a:rPr lang="es-MX" sz="1800" b="0" i="0" u="sng" kern="1200" dirty="0" err="1">
+                          <a:solidFill>
+                            <a:schemeClr val="dk1"/>
+                          </a:solidFill>
+                          <a:effectLst/>
+                          <a:latin typeface="+mn-lt"/>
+                          <a:ea typeface="+mn-ea"/>
+                          <a:cs typeface="+mn-cs"/>
+                          <a:hlinkClick r:id="rId2"/>
+                        </a:rPr>
+                        <a:t>Travel</a:t>
+                      </a:r>
+                      <a:r>
+                        <a:rPr lang="es-MX" sz="1800" b="0" i="0" u="sng" kern="1200" dirty="0">
+                          <a:solidFill>
+                            <a:schemeClr val="dk1"/>
+                          </a:solidFill>
+                          <a:effectLst/>
+                          <a:latin typeface="+mn-lt"/>
+                          <a:ea typeface="+mn-ea"/>
+                          <a:cs typeface="+mn-cs"/>
+                          <a:hlinkClick r:id="rId2"/>
+                        </a:rPr>
+                        <a:t> @ About.com</a:t>
+                      </a:r>
+                      <a:r>
+                        <a:rPr lang="es-MX" sz="1800" b="0" i="0" u="sng" kern="1200" dirty="0">
+                          <a:solidFill>
+                            <a:schemeClr val="dk1"/>
+                          </a:solidFill>
+                          <a:effectLst/>
+                          <a:latin typeface="+mn-lt"/>
+                          <a:ea typeface="+mn-ea"/>
+                          <a:cs typeface="+mn-cs"/>
+                        </a:rPr>
+                        <a:t>”.</a:t>
+                      </a:r>
+                      <a:endParaRPr lang="es-MX" sz="1800" b="0" i="0" kern="1200" dirty="0">
+                        <a:solidFill>
+                          <a:schemeClr val="dk1"/>
+                        </a:solidFill>
+                        <a:effectLst/>
+                        <a:latin typeface="+mn-lt"/>
+                        <a:ea typeface="+mn-ea"/>
+                        <a:cs typeface="+mn-cs"/>
+                      </a:endParaRPr>
+                    </a:p>
+                  </a:txBody>
+                  <a:tcPr/>
+                </a:tc>
+                <a:extLst>
+                  <a:ext uri="{0D108BD9-81ED-4DB2-BD59-A6C34878D82A}">
+                    <a16:rowId xmlns:a16="http://schemas.microsoft.com/office/drawing/2014/main" val="1746594758"/>
+                  </a:ext>
+                </a:extLst>
+              </a:tr>
+              <a:tr h="370840">
+                <a:tc>
+                  <a:txBody>
+                    <a:bodyPr/>
+                    <a:lstStyle/>
+                    <a:p>
+                      <a:r>
+                        <a:rPr lang="es-MX" dirty="0"/>
+                        <a:t>Precondiciones</a:t>
+                      </a:r>
+                    </a:p>
+                  </a:txBody>
+                  <a:tcPr/>
+                </a:tc>
+                <a:tc>
+                  <a:txBody>
+                    <a:bodyPr/>
+                    <a:lstStyle/>
+                    <a:p>
+                      <a:r>
+                        <a:rPr lang="es-MX" dirty="0"/>
+                        <a:t>Un navegador de internet.</a:t>
+                      </a:r>
+                    </a:p>
+                  </a:txBody>
+                  <a:tcPr/>
+                </a:tc>
+                <a:extLst>
+                  <a:ext uri="{0D108BD9-81ED-4DB2-BD59-A6C34878D82A}">
+                    <a16:rowId xmlns:a16="http://schemas.microsoft.com/office/drawing/2014/main" val="2161702613"/>
+                  </a:ext>
+                </a:extLst>
+              </a:tr>
+              <a:tr h="370840">
+                <a:tc>
+                  <a:txBody>
+                    <a:bodyPr/>
+                    <a:lstStyle/>
+                    <a:p>
+                      <a:r>
+                        <a:rPr lang="es-MX" dirty="0"/>
+                        <a:t>Resultado esperado</a:t>
+                      </a:r>
+                    </a:p>
+                  </a:txBody>
+                  <a:tcPr/>
+                </a:tc>
+                <a:tc>
+                  <a:txBody>
+                    <a:bodyPr/>
+                    <a:lstStyle/>
+                    <a:p>
+                      <a:r>
+                        <a:rPr lang="es-MX" dirty="0"/>
+                        <a:t>Redirigir al link del mail.</a:t>
+                      </a:r>
+                    </a:p>
+                    <a:p>
+                      <a:endParaRPr lang="es-MX" dirty="0"/>
+                    </a:p>
+                  </a:txBody>
+                  <a:tcPr/>
+                </a:tc>
+                <a:extLst>
+                  <a:ext uri="{0D108BD9-81ED-4DB2-BD59-A6C34878D82A}">
+                    <a16:rowId xmlns:a16="http://schemas.microsoft.com/office/drawing/2014/main" val="3394570666"/>
+                  </a:ext>
+                </a:extLst>
+              </a:tr>
+              <a:tr h="370840">
+                <a:tc>
+                  <a:txBody>
+                    <a:bodyPr/>
+                    <a:lstStyle/>
+                    <a:p>
+                      <a:r>
+                        <a:rPr lang="es-MX" dirty="0"/>
+                        <a:t>Resultado obtenido</a:t>
+                      </a:r>
+                    </a:p>
+                  </a:txBody>
+                  <a:tcPr/>
+                </a:tc>
+                <a:tc>
+                  <a:txBody>
+                    <a:bodyPr/>
+                    <a:lstStyle/>
+                    <a:p>
+                      <a:pPr marL="0" marR="0" lvl="0" indent="0" algn="l" defTabSz="914400" rtl="0" eaLnBrk="1" fontAlgn="auto" latinLnBrk="0" hangingPunct="1">
+                        <a:lnSpc>
+                          <a:spcPct val="100000"/>
+                        </a:lnSpc>
+                        <a:spcBef>
+                          <a:spcPts val="0"/>
+                        </a:spcBef>
+                        <a:spcAft>
+                          <a:spcPts val="0"/>
+                        </a:spcAft>
+                        <a:buClrTx/>
+                        <a:buSzTx/>
+                        <a:buFontTx/>
+                        <a:buNone/>
+                        <a:tabLst/>
+                        <a:defRPr/>
+                      </a:pPr>
+                      <a:r>
+                        <a:rPr lang="es-ES" sz="1800" b="0" i="0" kern="1200" dirty="0">
+                          <a:solidFill>
+                            <a:schemeClr val="dk1"/>
+                          </a:solidFill>
+                          <a:effectLst/>
+                          <a:latin typeface="+mn-lt"/>
+                          <a:ea typeface="+mn-ea"/>
+                          <a:cs typeface="+mn-cs"/>
+                        </a:rPr>
+                        <a:t>No se puede acceder a este sitio web.</a:t>
+                      </a:r>
+                    </a:p>
+                    <a:p>
+                      <a:endParaRPr lang="es-MX" dirty="0"/>
+                    </a:p>
+                  </a:txBody>
+                  <a:tcPr/>
+                </a:tc>
+                <a:extLst>
+                  <a:ext uri="{0D108BD9-81ED-4DB2-BD59-A6C34878D82A}">
+                    <a16:rowId xmlns:a16="http://schemas.microsoft.com/office/drawing/2014/main" val="1327796877"/>
+                  </a:ext>
+                </a:extLst>
+              </a:tr>
+            </a:tbl>
+          </a:graphicData>
+        </a:graphic>
+      </p:graphicFrame>
+    </p:spTree>
+    <p:extLst>
+      <p:ext uri="{BB962C8B-B14F-4D97-AF65-F5344CB8AC3E}">
+        <p14:creationId xmlns:p14="http://schemas.microsoft.com/office/powerpoint/2010/main" val="2091886673"/>
+      </p:ext>
+    </p:extLst>
+  </p:cSld>
+  <p:clrMapOvr>
+    <a:masterClrMapping/>
+  </p:clrMapOvr>
+</p:sld>
+</file>
+
+<file path=ppt/slides/slide27.xml><?xml version="1.0" encoding="utf-8"?>
+<p:sld xmlns:a="http://schemas.openxmlformats.org/drawingml/2006/main" xmlns:r="http://schemas.openxmlformats.org/officeDocument/2006/relationships" xmlns:p="http://schemas.openxmlformats.org/presentationml/2006/main">
+  <p:cSld>
+    <p:spTree>
+      <p:nvGrpSpPr>
+        <p:cNvPr id="1" name=""/>
+        <p:cNvGrpSpPr/>
+        <p:nvPr/>
+      </p:nvGrpSpPr>
+      <p:grpSpPr>
+        <a:xfrm>
+          <a:off x="0" y="0"/>
+          <a:ext cx="0" cy="0"/>
+          <a:chOff x="0" y="0"/>
+          <a:chExt cx="0" cy="0"/>
+        </a:xfrm>
+      </p:grpSpPr>
+      <p:pic>
+        <p:nvPicPr>
+          <p:cNvPr id="5" name="Imagen 4">
+            <a:extLst>
+              <a:ext uri="{FF2B5EF4-FFF2-40B4-BE49-F238E27FC236}">
+                <a16:creationId xmlns:a16="http://schemas.microsoft.com/office/drawing/2014/main" id="{B4B84BEF-C114-45B1-8B6B-D834333AD814}"/>
+              </a:ext>
+            </a:extLst>
+          </p:cNvPr>
+          <p:cNvPicPr>
+            <a:picLocks noChangeAspect="1"/>
+          </p:cNvPicPr>
+          <p:nvPr/>
+        </p:nvPicPr>
+        <p:blipFill>
+          <a:blip r:embed="rId2">
+            <a:extLst>
+              <a:ext uri="{28A0092B-C50C-407E-A947-70E740481C1C}">
+                <a14:useLocalDpi xmlns:a14="http://schemas.microsoft.com/office/drawing/2010/main" val="0"/>
+              </a:ext>
+            </a:extLst>
+          </a:blip>
+          <a:stretch>
+            <a:fillRect/>
+          </a:stretch>
+        </p:blipFill>
+        <p:spPr>
+          <a:xfrm>
+            <a:off x="1517196" y="0"/>
+            <a:ext cx="9157607" cy="6858000"/>
+          </a:xfrm>
+          <a:prstGeom prst="rect">
+            <a:avLst/>
+          </a:prstGeom>
+        </p:spPr>
+      </p:pic>
+    </p:spTree>
+    <p:extLst>
+      <p:ext uri="{BB962C8B-B14F-4D97-AF65-F5344CB8AC3E}">
+        <p14:creationId xmlns:p14="http://schemas.microsoft.com/office/powerpoint/2010/main" val="4002461151"/>
+      </p:ext>
+    </p:extLst>
+  </p:cSld>
+  <p:clrMapOvr>
+    <a:masterClrMapping/>
+  </p:clrMapOvr>
+</p:sld>
+</file>
+
+<file path=ppt/slides/slide28.xml><?xml version="1.0" encoding="utf-8"?>
+<p:sld xmlns:a="http://schemas.openxmlformats.org/drawingml/2006/main" xmlns:r="http://schemas.openxmlformats.org/officeDocument/2006/relationships" xmlns:p="http://schemas.openxmlformats.org/presentationml/2006/main">
+  <p:cSld>
+    <p:spTree>
+      <p:nvGrpSpPr>
+        <p:cNvPr id="1" name=""/>
+        <p:cNvGrpSpPr/>
+        <p:nvPr/>
+      </p:nvGrpSpPr>
+      <p:grpSpPr>
+        <a:xfrm>
+          <a:off x="0" y="0"/>
+          <a:ext cx="0" cy="0"/>
+          <a:chOff x="0" y="0"/>
+          <a:chExt cx="0" cy="0"/>
+        </a:xfrm>
+      </p:grpSpPr>
+      <p:pic>
+        <p:nvPicPr>
+          <p:cNvPr id="5" name="Imagen 4">
+            <a:extLst>
+              <a:ext uri="{FF2B5EF4-FFF2-40B4-BE49-F238E27FC236}">
+                <a16:creationId xmlns:a16="http://schemas.microsoft.com/office/drawing/2014/main" id="{9C5E7721-7A0D-483F-9C7E-7D5D64A1DE17}"/>
+              </a:ext>
+            </a:extLst>
+          </p:cNvPr>
+          <p:cNvPicPr>
+            <a:picLocks noChangeAspect="1"/>
+          </p:cNvPicPr>
+          <p:nvPr/>
+        </p:nvPicPr>
+        <p:blipFill>
+          <a:blip r:embed="rId2">
+            <a:extLst>
+              <a:ext uri="{28A0092B-C50C-407E-A947-70E740481C1C}">
+                <a14:useLocalDpi xmlns:a14="http://schemas.microsoft.com/office/drawing/2010/main" val="0"/>
+              </a:ext>
+            </a:extLst>
+          </a:blip>
+          <a:stretch>
+            <a:fillRect/>
+          </a:stretch>
+        </p:blipFill>
+        <p:spPr>
+          <a:xfrm>
+            <a:off x="1402428" y="0"/>
+            <a:ext cx="9387144" cy="6858000"/>
+          </a:xfrm>
+          <a:prstGeom prst="rect">
+            <a:avLst/>
+          </a:prstGeom>
+        </p:spPr>
+      </p:pic>
+    </p:spTree>
+    <p:extLst>
+      <p:ext uri="{BB962C8B-B14F-4D97-AF65-F5344CB8AC3E}">
+        <p14:creationId xmlns:p14="http://schemas.microsoft.com/office/powerpoint/2010/main" val="3848351816"/>
+      </p:ext>
+    </p:extLst>
+  </p:cSld>
+  <p:clrMapOvr>
+    <a:masterClrMapping/>
+  </p:clrMapOvr>
+</p:sld>
+</file>
+
+<file path=ppt/slides/slide29.xml><?xml version="1.0" encoding="utf-8"?>
+<p:sld xmlns:a="http://schemas.openxmlformats.org/drawingml/2006/main" xmlns:r="http://schemas.openxmlformats.org/officeDocument/2006/relationships" xmlns:p="http://schemas.openxmlformats.org/presentationml/2006/main">
+  <p:cSld>
+    <p:spTree>
+      <p:nvGrpSpPr>
+        <p:cNvPr id="1" name=""/>
+        <p:cNvGrpSpPr/>
+        <p:nvPr/>
+      </p:nvGrpSpPr>
+      <p:grpSpPr>
+        <a:xfrm>
+          <a:off x="0" y="0"/>
+          <a:ext cx="0" cy="0"/>
+          <a:chOff x="0" y="0"/>
+          <a:chExt cx="0" cy="0"/>
+        </a:xfrm>
+      </p:grpSpPr>
+      <p:sp>
+        <p:nvSpPr>
+          <p:cNvPr id="3" name="Marcador de contenido 2">
+            <a:extLst>
+              <a:ext uri="{FF2B5EF4-FFF2-40B4-BE49-F238E27FC236}">
+                <a16:creationId xmlns:a16="http://schemas.microsoft.com/office/drawing/2014/main" id="{D4A657D1-A607-4047-B2E7-2BE87AE6DBD2}"/>
+              </a:ext>
+            </a:extLst>
+          </p:cNvPr>
+          <p:cNvSpPr>
+            <a:spLocks noGrp="1"/>
+          </p:cNvSpPr>
+          <p:nvPr>
+            <p:ph idx="1"/>
+          </p:nvPr>
+        </p:nvSpPr>
+        <p:spPr/>
+        <p:txBody>
+          <a:bodyPr>
+            <a:normAutofit/>
+          </a:bodyPr>
+          <a:lstStyle/>
+          <a:p>
+            <a:pPr algn="ctr"/>
+            <a:r>
+              <a:rPr lang="es-ES" sz="8800" dirty="0">
+                <a:solidFill>
+                  <a:srgbClr val="FF0000"/>
+                </a:solidFill>
+              </a:rPr>
+              <a:t>SEXTO BUG</a:t>
+            </a:r>
+            <a:endParaRPr lang="es-MX" sz="8800" dirty="0">
+              <a:solidFill>
+                <a:srgbClr val="FF0000"/>
+              </a:solidFill>
+            </a:endParaRPr>
+          </a:p>
+        </p:txBody>
+      </p:sp>
+    </p:spTree>
+    <p:extLst>
+      <p:ext uri="{BB962C8B-B14F-4D97-AF65-F5344CB8AC3E}">
+        <p14:creationId xmlns:p14="http://schemas.microsoft.com/office/powerpoint/2010/main" val="1704762628"/>
       </p:ext>
     </p:extLst>
   </p:cSld>
@@ -4796,6 +6751,156 @@
     <p:extLst>
       <p:ext uri="{BB962C8B-B14F-4D97-AF65-F5344CB8AC3E}">
         <p14:creationId xmlns:p14="http://schemas.microsoft.com/office/powerpoint/2010/main" val="543269831"/>
+      </p:ext>
+    </p:extLst>
+  </p:cSld>
+  <p:clrMapOvr>
+    <a:masterClrMapping/>
+  </p:clrMapOvr>
+</p:sld>
+</file>
+
+<file path=ppt/slides/slide30.xml><?xml version="1.0" encoding="utf-8"?>
+<p:sld xmlns:a="http://schemas.openxmlformats.org/drawingml/2006/main" xmlns:r="http://schemas.openxmlformats.org/officeDocument/2006/relationships" xmlns:p="http://schemas.openxmlformats.org/presentationml/2006/main">
+  <p:cSld>
+    <p:spTree>
+      <p:nvGrpSpPr>
+        <p:cNvPr id="1" name=""/>
+        <p:cNvGrpSpPr/>
+        <p:nvPr/>
+      </p:nvGrpSpPr>
+      <p:grpSpPr>
+        <a:xfrm>
+          <a:off x="0" y="0"/>
+          <a:ext cx="0" cy="0"/>
+          <a:chOff x="0" y="0"/>
+          <a:chExt cx="0" cy="0"/>
+        </a:xfrm>
+      </p:grpSpPr>
+    </p:spTree>
+    <p:extLst>
+      <p:ext uri="{BB962C8B-B14F-4D97-AF65-F5344CB8AC3E}">
+        <p14:creationId xmlns:p14="http://schemas.microsoft.com/office/powerpoint/2010/main" val="3055732767"/>
+      </p:ext>
+    </p:extLst>
+  </p:cSld>
+  <p:clrMapOvr>
+    <a:masterClrMapping/>
+  </p:clrMapOvr>
+</p:sld>
+</file>
+
+<file path=ppt/slides/slide31.xml><?xml version="1.0" encoding="utf-8"?>
+<p:sld xmlns:a="http://schemas.openxmlformats.org/drawingml/2006/main" xmlns:r="http://schemas.openxmlformats.org/officeDocument/2006/relationships" xmlns:p="http://schemas.openxmlformats.org/presentationml/2006/main">
+  <p:cSld>
+    <p:spTree>
+      <p:nvGrpSpPr>
+        <p:cNvPr id="1" name=""/>
+        <p:cNvGrpSpPr/>
+        <p:nvPr/>
+      </p:nvGrpSpPr>
+      <p:grpSpPr>
+        <a:xfrm>
+          <a:off x="0" y="0"/>
+          <a:ext cx="0" cy="0"/>
+          <a:chOff x="0" y="0"/>
+          <a:chExt cx="0" cy="0"/>
+        </a:xfrm>
+      </p:grpSpPr>
+    </p:spTree>
+    <p:extLst>
+      <p:ext uri="{BB962C8B-B14F-4D97-AF65-F5344CB8AC3E}">
+        <p14:creationId xmlns:p14="http://schemas.microsoft.com/office/powerpoint/2010/main" val="3354732512"/>
+      </p:ext>
+    </p:extLst>
+  </p:cSld>
+  <p:clrMapOvr>
+    <a:masterClrMapping/>
+  </p:clrMapOvr>
+</p:sld>
+</file>
+
+<file path=ppt/slides/slide32.xml><?xml version="1.0" encoding="utf-8"?>
+<p:sld xmlns:a="http://schemas.openxmlformats.org/drawingml/2006/main" xmlns:r="http://schemas.openxmlformats.org/officeDocument/2006/relationships" xmlns:p="http://schemas.openxmlformats.org/presentationml/2006/main">
+  <p:cSld>
+    <p:spTree>
+      <p:nvGrpSpPr>
+        <p:cNvPr id="1" name=""/>
+        <p:cNvGrpSpPr/>
+        <p:nvPr/>
+      </p:nvGrpSpPr>
+      <p:grpSpPr>
+        <a:xfrm>
+          <a:off x="0" y="0"/>
+          <a:ext cx="0" cy="0"/>
+          <a:chOff x="0" y="0"/>
+          <a:chExt cx="0" cy="0"/>
+        </a:xfrm>
+      </p:grpSpPr>
+    </p:spTree>
+    <p:extLst>
+      <p:ext uri="{BB962C8B-B14F-4D97-AF65-F5344CB8AC3E}">
+        <p14:creationId xmlns:p14="http://schemas.microsoft.com/office/powerpoint/2010/main" val="3691723581"/>
+      </p:ext>
+    </p:extLst>
+  </p:cSld>
+  <p:clrMapOvr>
+    <a:masterClrMapping/>
+  </p:clrMapOvr>
+</p:sld>
+</file>
+
+<file path=ppt/slides/slide33.xml><?xml version="1.0" encoding="utf-8"?>
+<p:sld xmlns:a="http://schemas.openxmlformats.org/drawingml/2006/main" xmlns:r="http://schemas.openxmlformats.org/officeDocument/2006/relationships" xmlns:p="http://schemas.openxmlformats.org/presentationml/2006/main">
+  <p:cSld>
+    <p:spTree>
+      <p:nvGrpSpPr>
+        <p:cNvPr id="1" name=""/>
+        <p:cNvGrpSpPr/>
+        <p:nvPr/>
+      </p:nvGrpSpPr>
+      <p:grpSpPr>
+        <a:xfrm>
+          <a:off x="0" y="0"/>
+          <a:ext cx="0" cy="0"/>
+          <a:chOff x="0" y="0"/>
+          <a:chExt cx="0" cy="0"/>
+        </a:xfrm>
+      </p:grpSpPr>
+    </p:spTree>
+    <p:extLst>
+      <p:ext uri="{BB962C8B-B14F-4D97-AF65-F5344CB8AC3E}">
+        <p14:creationId xmlns:p14="http://schemas.microsoft.com/office/powerpoint/2010/main" val="3744492564"/>
+      </p:ext>
+    </p:extLst>
+  </p:cSld>
+  <p:clrMapOvr>
+    <a:masterClrMapping/>
+  </p:clrMapOvr>
+</p:sld>
+</file>
+
+<file path=ppt/slides/slide34.xml><?xml version="1.0" encoding="utf-8"?>
+<p:sld xmlns:a="http://schemas.openxmlformats.org/drawingml/2006/main" xmlns:r="http://schemas.openxmlformats.org/officeDocument/2006/relationships" xmlns:p="http://schemas.openxmlformats.org/presentationml/2006/main">
+  <p:cSld>
+    <p:spTree>
+      <p:nvGrpSpPr>
+        <p:cNvPr id="1" name=""/>
+        <p:cNvGrpSpPr/>
+        <p:nvPr/>
+      </p:nvGrpSpPr>
+      <p:grpSpPr>
+        <a:xfrm>
+          <a:off x="0" y="0"/>
+          <a:ext cx="0" cy="0"/>
+          <a:chOff x="0" y="0"/>
+          <a:chExt cx="0" cy="0"/>
+        </a:xfrm>
+      </p:grpSpPr>
+    </p:spTree>
+    <p:extLst>
+      <p:ext uri="{BB962C8B-B14F-4D97-AF65-F5344CB8AC3E}">
+        <p14:creationId xmlns:p14="http://schemas.microsoft.com/office/powerpoint/2010/main" val="67380645"/>
       </p:ext>
     </p:extLst>
   </p:cSld>
@@ -4956,6 +7061,77 @@
       </p:grpSpPr>
       <p:sp>
         <p:nvSpPr>
+          <p:cNvPr id="3" name="Marcador de contenido 2">
+            <a:extLst>
+              <a:ext uri="{FF2B5EF4-FFF2-40B4-BE49-F238E27FC236}">
+                <a16:creationId xmlns:a16="http://schemas.microsoft.com/office/drawing/2014/main" id="{CEEAA383-6BB3-448C-9767-03A4026E724E}"/>
+              </a:ext>
+            </a:extLst>
+          </p:cNvPr>
+          <p:cNvSpPr>
+            <a:spLocks noGrp="1"/>
+          </p:cNvSpPr>
+          <p:nvPr>
+            <p:ph idx="1"/>
+          </p:nvPr>
+        </p:nvSpPr>
+        <p:spPr>
+          <a:xfrm>
+            <a:off x="838200" y="1825625"/>
+            <a:ext cx="10515600" cy="4351338"/>
+          </a:xfrm>
+        </p:spPr>
+        <p:txBody>
+          <a:bodyPr/>
+          <a:lstStyle/>
+          <a:p>
+            <a:pPr algn="ctr"/>
+            <a:r>
+              <a:rPr lang="es-ES" sz="8800" dirty="0">
+                <a:solidFill>
+                  <a:srgbClr val="FF0000"/>
+                </a:solidFill>
+              </a:rPr>
+              <a:t>SEGUNDO BUG</a:t>
+            </a:r>
+          </a:p>
+          <a:p>
+            <a:endParaRPr lang="es-MX" dirty="0"/>
+          </a:p>
+        </p:txBody>
+      </p:sp>
+    </p:spTree>
+    <p:extLst>
+      <p:ext uri="{BB962C8B-B14F-4D97-AF65-F5344CB8AC3E}">
+        <p14:creationId xmlns:p14="http://schemas.microsoft.com/office/powerpoint/2010/main" val="2040906961"/>
+      </p:ext>
+    </p:extLst>
+  </p:cSld>
+  <p:clrMapOvr>
+    <a:masterClrMapping/>
+  </p:clrMapOvr>
+</p:sld>
+</file>
+
+<file path=ppt/slides/slide7.xml><?xml version="1.0" encoding="utf-8"?>
+<p:sld xmlns:a="http://schemas.openxmlformats.org/drawingml/2006/main" xmlns:r="http://schemas.openxmlformats.org/officeDocument/2006/relationships" xmlns:p="http://schemas.openxmlformats.org/presentationml/2006/main">
+  <p:cSld>
+    <p:spTree>
+      <p:nvGrpSpPr>
+        <p:cNvPr id="1" name=""/>
+        <p:cNvGrpSpPr/>
+        <p:nvPr/>
+      </p:nvGrpSpPr>
+      <p:grpSpPr>
+        <a:xfrm>
+          <a:off x="0" y="0"/>
+          <a:ext cx="0" cy="0"/>
+          <a:chOff x="0" y="0"/>
+          <a:chExt cx="0" cy="0"/>
+        </a:xfrm>
+      </p:grpSpPr>
+      <p:sp>
+        <p:nvSpPr>
           <p:cNvPr id="4" name="CuadroTexto 3">
             <a:extLst>
               <a:ext uri="{FF2B5EF4-FFF2-40B4-BE49-F238E27FC236}">
@@ -5069,7 +7245,7 @@
 </p:sld>
 </file>
 
-<file path=ppt/slides/slide7.xml><?xml version="1.0" encoding="utf-8"?>
+<file path=ppt/slides/slide8.xml><?xml version="1.0" encoding="utf-8"?>
 <p:sld xmlns:a="http://schemas.openxmlformats.org/drawingml/2006/main" xmlns:r="http://schemas.openxmlformats.org/officeDocument/2006/relationships" xmlns:p="http://schemas.openxmlformats.org/presentationml/2006/main">
   <p:cSld>
     <p:spTree>
@@ -5706,7 +7882,7 @@
 </p:sld>
 </file>
 
-<file path=ppt/slides/slide8.xml><?xml version="1.0" encoding="utf-8"?>
+<file path=ppt/slides/slide9.xml><?xml version="1.0" encoding="utf-8"?>
 <p:sld xmlns:a="http://schemas.openxmlformats.org/drawingml/2006/main" xmlns:r="http://schemas.openxmlformats.org/officeDocument/2006/relationships" xmlns:p="http://schemas.openxmlformats.org/presentationml/2006/main">
   <p:cSld>
     <p:spTree>
@@ -5763,72 +7939,6 @@
     <p:extLst>
       <p:ext uri="{BB962C8B-B14F-4D97-AF65-F5344CB8AC3E}">
         <p14:creationId xmlns:p14="http://schemas.microsoft.com/office/powerpoint/2010/main" val="2900171089"/>
-      </p:ext>
-    </p:extLst>
-  </p:cSld>
-  <p:clrMapOvr>
-    <a:masterClrMapping/>
-  </p:clrMapOvr>
-</p:sld>
-</file>
-
-<file path=ppt/slides/slide9.xml><?xml version="1.0" encoding="utf-8"?>
-<p:sld xmlns:a="http://schemas.openxmlformats.org/drawingml/2006/main" xmlns:r="http://schemas.openxmlformats.org/officeDocument/2006/relationships" xmlns:p="http://schemas.openxmlformats.org/presentationml/2006/main">
-  <p:cSld>
-    <p:spTree>
-      <p:nvGrpSpPr>
-        <p:cNvPr id="1" name=""/>
-        <p:cNvGrpSpPr/>
-        <p:nvPr/>
-      </p:nvGrpSpPr>
-      <p:grpSpPr>
-        <a:xfrm>
-          <a:off x="0" y="0"/>
-          <a:ext cx="0" cy="0"/>
-          <a:chOff x="0" y="0"/>
-          <a:chExt cx="0" cy="0"/>
-        </a:xfrm>
-      </p:grpSpPr>
-      <p:pic>
-        <p:nvPicPr>
-          <p:cNvPr id="9" name="Imagen 8">
-            <a:extLst>
-              <a:ext uri="{FF2B5EF4-FFF2-40B4-BE49-F238E27FC236}">
-                <a16:creationId xmlns:a16="http://schemas.microsoft.com/office/drawing/2014/main" id="{D29C3316-EF32-4977-A755-B876C23C7DD9}"/>
-              </a:ext>
-            </a:extLst>
-          </p:cNvPr>
-          <p:cNvPicPr>
-            <a:picLocks noChangeAspect="1"/>
-          </p:cNvPicPr>
-          <p:nvPr/>
-        </p:nvPicPr>
-        <p:blipFill>
-          <a:blip r:embed="rId2">
-            <a:extLst>
-              <a:ext uri="{28A0092B-C50C-407E-A947-70E740481C1C}">
-                <a14:useLocalDpi xmlns:a14="http://schemas.microsoft.com/office/drawing/2010/main" val="0"/>
-              </a:ext>
-            </a:extLst>
-          </a:blip>
-          <a:stretch>
-            <a:fillRect/>
-          </a:stretch>
-        </p:blipFill>
-        <p:spPr>
-          <a:xfrm>
-            <a:off x="705665" y="0"/>
-            <a:ext cx="10780669" cy="6858000"/>
-          </a:xfrm>
-          <a:prstGeom prst="rect">
-            <a:avLst/>
-          </a:prstGeom>
-        </p:spPr>
-      </p:pic>
-    </p:spTree>
-    <p:extLst>
-      <p:ext uri="{BB962C8B-B14F-4D97-AF65-F5344CB8AC3E}">
-        <p14:creationId xmlns:p14="http://schemas.microsoft.com/office/powerpoint/2010/main" val="1159073202"/>
       </p:ext>
     </p:extLst>
   </p:cSld>

</xml_diff>

<commit_message>
Encontrando bug 6 no hay vuelos disponibles
</commit_message>
<xml_diff>
--- a/alumnos/gabriel_gonzalez/errores_guru.pptx
+++ b/alumnos/gabriel_gonzalez/errores_guru.pptx
@@ -6777,6 +6777,90 @@
           <a:chExt cx="0" cy="0"/>
         </a:xfrm>
       </p:grpSpPr>
+      <p:sp>
+        <p:nvSpPr>
+          <p:cNvPr id="2" name="CuadroTexto 1">
+            <a:extLst>
+              <a:ext uri="{FF2B5EF4-FFF2-40B4-BE49-F238E27FC236}">
+                <a16:creationId xmlns:a16="http://schemas.microsoft.com/office/drawing/2014/main" id="{0593CB2B-E9E2-4B7A-9DE0-E0B7E93768D3}"/>
+              </a:ext>
+            </a:extLst>
+          </p:cNvPr>
+          <p:cNvSpPr txBox="1"/>
+          <p:nvPr/>
+        </p:nvSpPr>
+        <p:spPr>
+          <a:xfrm>
+            <a:off x="1283516" y="302004"/>
+            <a:ext cx="5025005" cy="923330"/>
+          </a:xfrm>
+          <a:prstGeom prst="rect">
+            <a:avLst/>
+          </a:prstGeom>
+          <a:noFill/>
+        </p:spPr>
+        <p:txBody>
+          <a:bodyPr wrap="square" rtlCol="0">
+            <a:spAutoFit/>
+          </a:bodyPr>
+          <a:lstStyle/>
+          <a:p>
+            <a:r>
+              <a:rPr lang="es-ES" dirty="0">
+                <a:solidFill>
+                  <a:srgbClr val="FF0000"/>
+                </a:solidFill>
+              </a:rPr>
+              <a:t>Sexto bug.</a:t>
+            </a:r>
+          </a:p>
+          <a:p>
+            <a:endParaRPr lang="es-ES" dirty="0"/>
+          </a:p>
+          <a:p>
+            <a:r>
+              <a:rPr lang="es-ES" dirty="0"/>
+              <a:t>Abrimos la pagina web Guru99</a:t>
+            </a:r>
+          </a:p>
+        </p:txBody>
+      </p:sp>
+      <p:pic>
+        <p:nvPicPr>
+          <p:cNvPr id="4" name="Imagen 3">
+            <a:extLst>
+              <a:ext uri="{FF2B5EF4-FFF2-40B4-BE49-F238E27FC236}">
+                <a16:creationId xmlns:a16="http://schemas.microsoft.com/office/drawing/2014/main" id="{0A1D913D-D91D-4025-B111-15DBC848A04F}"/>
+              </a:ext>
+            </a:extLst>
+          </p:cNvPr>
+          <p:cNvPicPr>
+            <a:picLocks noChangeAspect="1"/>
+          </p:cNvPicPr>
+          <p:nvPr/>
+        </p:nvPicPr>
+        <p:blipFill>
+          <a:blip r:embed="rId2">
+            <a:extLst>
+              <a:ext uri="{28A0092B-C50C-407E-A947-70E740481C1C}">
+                <a14:useLocalDpi xmlns:a14="http://schemas.microsoft.com/office/drawing/2010/main" val="0"/>
+              </a:ext>
+            </a:extLst>
+          </a:blip>
+          <a:stretch>
+            <a:fillRect/>
+          </a:stretch>
+        </p:blipFill>
+        <p:spPr>
+          <a:xfrm>
+            <a:off x="520116" y="1225334"/>
+            <a:ext cx="10997967" cy="5632666"/>
+          </a:xfrm>
+          <a:prstGeom prst="rect">
+            <a:avLst/>
+          </a:prstGeom>
+        </p:spPr>
+      </p:pic>
     </p:spTree>
     <p:extLst>
       <p:ext uri="{BB962C8B-B14F-4D97-AF65-F5344CB8AC3E}">
@@ -6807,6 +6891,42 @@
           <a:chExt cx="0" cy="0"/>
         </a:xfrm>
       </p:grpSpPr>
+      <p:pic>
+        <p:nvPicPr>
+          <p:cNvPr id="3" name="Imagen 2">
+            <a:extLst>
+              <a:ext uri="{FF2B5EF4-FFF2-40B4-BE49-F238E27FC236}">
+                <a16:creationId xmlns:a16="http://schemas.microsoft.com/office/drawing/2014/main" id="{141B01A6-8131-40FD-B23D-37A43E205A04}"/>
+              </a:ext>
+            </a:extLst>
+          </p:cNvPr>
+          <p:cNvPicPr>
+            <a:picLocks noChangeAspect="1"/>
+          </p:cNvPicPr>
+          <p:nvPr/>
+        </p:nvPicPr>
+        <p:blipFill>
+          <a:blip r:embed="rId2">
+            <a:extLst>
+              <a:ext uri="{28A0092B-C50C-407E-A947-70E740481C1C}">
+                <a14:useLocalDpi xmlns:a14="http://schemas.microsoft.com/office/drawing/2010/main" val="0"/>
+              </a:ext>
+            </a:extLst>
+          </a:blip>
+          <a:stretch>
+            <a:fillRect/>
+          </a:stretch>
+        </p:blipFill>
+        <p:spPr>
+          <a:xfrm>
+            <a:off x="1543354" y="0"/>
+            <a:ext cx="9105292" cy="6858000"/>
+          </a:xfrm>
+          <a:prstGeom prst="rect">
+            <a:avLst/>
+          </a:prstGeom>
+        </p:spPr>
+      </p:pic>
     </p:spTree>
     <p:extLst>
       <p:ext uri="{BB962C8B-B14F-4D97-AF65-F5344CB8AC3E}">
@@ -6837,6 +6957,42 @@
           <a:chExt cx="0" cy="0"/>
         </a:xfrm>
       </p:grpSpPr>
+      <p:pic>
+        <p:nvPicPr>
+          <p:cNvPr id="3" name="Imagen 2">
+            <a:extLst>
+              <a:ext uri="{FF2B5EF4-FFF2-40B4-BE49-F238E27FC236}">
+                <a16:creationId xmlns:a16="http://schemas.microsoft.com/office/drawing/2014/main" id="{FE702627-BCD8-44AF-AFD1-F44C8A81DF74}"/>
+              </a:ext>
+            </a:extLst>
+          </p:cNvPr>
+          <p:cNvPicPr>
+            <a:picLocks noChangeAspect="1"/>
+          </p:cNvPicPr>
+          <p:nvPr/>
+        </p:nvPicPr>
+        <p:blipFill>
+          <a:blip r:embed="rId2">
+            <a:extLst>
+              <a:ext uri="{28A0092B-C50C-407E-A947-70E740481C1C}">
+                <a14:useLocalDpi xmlns:a14="http://schemas.microsoft.com/office/drawing/2010/main" val="0"/>
+              </a:ext>
+            </a:extLst>
+          </a:blip>
+          <a:stretch>
+            <a:fillRect/>
+          </a:stretch>
+        </p:blipFill>
+        <p:spPr>
+          <a:xfrm>
+            <a:off x="1572054" y="0"/>
+            <a:ext cx="9047892" cy="6858000"/>
+          </a:xfrm>
+          <a:prstGeom prst="rect">
+            <a:avLst/>
+          </a:prstGeom>
+        </p:spPr>
+      </p:pic>
     </p:spTree>
     <p:extLst>
       <p:ext uri="{BB962C8B-B14F-4D97-AF65-F5344CB8AC3E}">
@@ -6867,6 +7023,409 @@
           <a:chExt cx="0" cy="0"/>
         </a:xfrm>
       </p:grpSpPr>
+      <p:graphicFrame>
+        <p:nvGraphicFramePr>
+          <p:cNvPr id="2" name="Tabla 1">
+            <a:extLst>
+              <a:ext uri="{FF2B5EF4-FFF2-40B4-BE49-F238E27FC236}">
+                <a16:creationId xmlns:a16="http://schemas.microsoft.com/office/drawing/2014/main" id="{CD96B432-F70C-4243-9A54-D32F3F299BC1}"/>
+              </a:ext>
+            </a:extLst>
+          </p:cNvPr>
+          <p:cNvGraphicFramePr>
+            <a:graphicFrameLocks noGrp="1"/>
+          </p:cNvGraphicFramePr>
+          <p:nvPr>
+            <p:extLst>
+              <p:ext uri="{D42A27DB-BD31-4B8C-83A1-F6EECF244321}">
+                <p14:modId xmlns:p14="http://schemas.microsoft.com/office/powerpoint/2010/main" val="3199403022"/>
+              </p:ext>
+            </p:extLst>
+          </p:nvPr>
+        </p:nvGraphicFramePr>
+        <p:xfrm>
+          <a:off x="1906165" y="702888"/>
+          <a:ext cx="9226027" cy="3581400"/>
+        </p:xfrm>
+        <a:graphic>
+          <a:graphicData uri="http://schemas.openxmlformats.org/drawingml/2006/table">
+            <a:tbl>
+              <a:tblPr firstRow="1" bandRow="1">
+                <a:tableStyleId>{073A0DAA-6AF3-43AB-8588-CEC1D06C72B9}</a:tableStyleId>
+              </a:tblPr>
+              <a:tblGrid>
+                <a:gridCol w="3225936">
+                  <a:extLst>
+                    <a:ext uri="{9D8B030D-6E8A-4147-A177-3AD203B41FA5}">
+                      <a16:colId xmlns:a16="http://schemas.microsoft.com/office/drawing/2014/main" val="3209075916"/>
+                    </a:ext>
+                  </a:extLst>
+                </a:gridCol>
+                <a:gridCol w="6000091">
+                  <a:extLst>
+                    <a:ext uri="{9D8B030D-6E8A-4147-A177-3AD203B41FA5}">
+                      <a16:colId xmlns:a16="http://schemas.microsoft.com/office/drawing/2014/main" val="4058670583"/>
+                    </a:ext>
+                  </a:extLst>
+                </a:gridCol>
+              </a:tblGrid>
+              <a:tr h="370840">
+                <a:tc>
+                  <a:txBody>
+                    <a:bodyPr/>
+                    <a:lstStyle/>
+                    <a:p>
+                      <a:r>
+                        <a:rPr lang="es-MX" b="0" dirty="0"/>
+                        <a:t>Titulo</a:t>
+                      </a:r>
+                    </a:p>
+                  </a:txBody>
+                  <a:tcPr/>
+                </a:tc>
+                <a:tc>
+                  <a:txBody>
+                    <a:bodyPr/>
+                    <a:lstStyle/>
+                    <a:p>
+                      <a:r>
+                        <a:rPr lang="es-MX" dirty="0"/>
+                        <a:t>No hay vuelos disponibles</a:t>
+                      </a:r>
+                    </a:p>
+                  </a:txBody>
+                  <a:tcPr/>
+                </a:tc>
+                <a:extLst>
+                  <a:ext uri="{0D108BD9-81ED-4DB2-BD59-A6C34878D82A}">
+                    <a16:rowId xmlns:a16="http://schemas.microsoft.com/office/drawing/2014/main" val="620287769"/>
+                  </a:ext>
+                </a:extLst>
+              </a:tr>
+              <a:tr h="370840">
+                <a:tc>
+                  <a:txBody>
+                    <a:bodyPr/>
+                    <a:lstStyle/>
+                    <a:p>
+                      <a:r>
+                        <a:rPr lang="es-MX" dirty="0"/>
+                        <a:t>Descripción</a:t>
+                      </a:r>
+                    </a:p>
+                  </a:txBody>
+                  <a:tcPr/>
+                </a:tc>
+                <a:tc>
+                  <a:txBody>
+                    <a:bodyPr/>
+                    <a:lstStyle/>
+                    <a:p>
+                      <a:r>
+                        <a:rPr lang="es-MX" dirty="0"/>
+                        <a:t>Al buscar algún vuelo disponible no hay ninguno</a:t>
+                      </a:r>
+                    </a:p>
+                  </a:txBody>
+                  <a:tcPr/>
+                </a:tc>
+                <a:extLst>
+                  <a:ext uri="{0D108BD9-81ED-4DB2-BD59-A6C34878D82A}">
+                    <a16:rowId xmlns:a16="http://schemas.microsoft.com/office/drawing/2014/main" val="3419308306"/>
+                  </a:ext>
+                </a:extLst>
+              </a:tr>
+              <a:tr h="546358">
+                <a:tc>
+                  <a:txBody>
+                    <a:bodyPr/>
+                    <a:lstStyle/>
+                    <a:p>
+                      <a:r>
+                        <a:rPr lang="es-MX" dirty="0"/>
+                        <a:t>Pasos</a:t>
+                      </a:r>
+                    </a:p>
+                  </a:txBody>
+                  <a:tcPr/>
+                </a:tc>
+                <a:tc>
+                  <a:txBody>
+                    <a:bodyPr/>
+                    <a:lstStyle/>
+                    <a:p>
+                      <a:pPr marL="342900" indent="-342900">
+                        <a:buAutoNum type="arabicPeriod"/>
+                      </a:pPr>
+                      <a:r>
+                        <a:rPr lang="es-MX" dirty="0"/>
+                        <a:t>Ingresar: </a:t>
+                      </a:r>
+                      <a:r>
+                        <a:rPr lang="es-MX" sz="1800" b="0" i="0" kern="1200" dirty="0">
+                          <a:solidFill>
+                            <a:schemeClr val="dk1"/>
+                          </a:solidFill>
+                          <a:effectLst/>
+                          <a:latin typeface="+mn-lt"/>
+                          <a:ea typeface="+mn-ea"/>
+                          <a:cs typeface="+mn-cs"/>
+                          <a:hlinkClick r:id="rId2" tooltip="https://demo.guru99.com/test/newtours/register.php"/>
+                        </a:rPr>
+                        <a:t>https://demo.guru99.com/test/newtours/</a:t>
+                      </a:r>
+                      <a:endParaRPr lang="es-MX" sz="1800" b="0" i="0" kern="1200" dirty="0">
+                        <a:solidFill>
+                          <a:schemeClr val="dk1"/>
+                        </a:solidFill>
+                        <a:effectLst/>
+                        <a:latin typeface="+mn-lt"/>
+                        <a:ea typeface="+mn-ea"/>
+                        <a:cs typeface="+mn-cs"/>
+                      </a:endParaRPr>
+                    </a:p>
+                    <a:p>
+                      <a:pPr marL="342900" indent="-342900">
+                        <a:buAutoNum type="arabicPeriod"/>
+                      </a:pPr>
+                      <a:r>
+                        <a:rPr lang="es-MX" sz="1800" b="0" i="0" kern="1200" dirty="0" err="1">
+                          <a:solidFill>
+                            <a:schemeClr val="dk1"/>
+                          </a:solidFill>
+                          <a:effectLst/>
+                          <a:latin typeface="+mn-lt"/>
+                          <a:ea typeface="+mn-ea"/>
+                          <a:cs typeface="+mn-cs"/>
+                        </a:rPr>
+                        <a:t>Clickear</a:t>
+                      </a:r>
+                      <a:r>
+                        <a:rPr lang="es-MX" sz="1800" b="0" i="0" kern="1200" dirty="0">
+                          <a:solidFill>
+                            <a:schemeClr val="dk1"/>
+                          </a:solidFill>
+                          <a:effectLst/>
+                          <a:latin typeface="+mn-lt"/>
+                          <a:ea typeface="+mn-ea"/>
+                          <a:cs typeface="+mn-cs"/>
+                        </a:rPr>
+                        <a:t> en </a:t>
+                      </a:r>
+                      <a:r>
+                        <a:rPr lang="es-MX" sz="1800" b="0" i="0" u="none" kern="1200" dirty="0" err="1">
+                          <a:solidFill>
+                            <a:schemeClr val="dk1"/>
+                          </a:solidFill>
+                          <a:effectLst/>
+                          <a:latin typeface="+mn-lt"/>
+                          <a:ea typeface="+mn-ea"/>
+                          <a:cs typeface="+mn-cs"/>
+                        </a:rPr>
+                        <a:t>Flights</a:t>
+                      </a:r>
+                      <a:r>
+                        <a:rPr lang="es-MX" sz="1800" b="0" i="0" u="none" kern="1200" dirty="0">
+                          <a:solidFill>
+                            <a:schemeClr val="dk1"/>
+                          </a:solidFill>
+                          <a:effectLst/>
+                          <a:latin typeface="+mn-lt"/>
+                          <a:ea typeface="+mn-ea"/>
+                          <a:cs typeface="+mn-cs"/>
+                        </a:rPr>
+                        <a:t>.</a:t>
+                      </a:r>
+                    </a:p>
+                    <a:p>
+                      <a:pPr marL="342900" indent="-342900">
+                        <a:buAutoNum type="arabicPeriod"/>
+                      </a:pPr>
+                      <a:r>
+                        <a:rPr lang="es-MX" sz="1800" b="0" i="0" u="none" kern="1200" dirty="0">
+                          <a:solidFill>
+                            <a:schemeClr val="dk1"/>
+                          </a:solidFill>
+                          <a:effectLst/>
+                          <a:latin typeface="+mn-lt"/>
+                          <a:ea typeface="+mn-ea"/>
+                          <a:cs typeface="+mn-cs"/>
+                        </a:rPr>
+                        <a:t>Elegir vuelos de distintos destinos y fechas.</a:t>
+                      </a:r>
+                    </a:p>
+                    <a:p>
+                      <a:pPr marL="342900" indent="-342900">
+                        <a:buAutoNum type="arabicPeriod"/>
+                      </a:pPr>
+                      <a:r>
+                        <a:rPr lang="es-MX" sz="1800" b="0" i="0" u="none" kern="1200" dirty="0" err="1">
+                          <a:solidFill>
+                            <a:schemeClr val="dk1"/>
+                          </a:solidFill>
+                          <a:effectLst/>
+                          <a:latin typeface="+mn-lt"/>
+                          <a:ea typeface="+mn-ea"/>
+                          <a:cs typeface="+mn-cs"/>
+                        </a:rPr>
+                        <a:t>Clickear</a:t>
+                      </a:r>
+                      <a:r>
+                        <a:rPr lang="es-MX" sz="1800" b="0" i="0" u="none" kern="1200" dirty="0">
+                          <a:solidFill>
+                            <a:schemeClr val="dk1"/>
+                          </a:solidFill>
+                          <a:effectLst/>
+                          <a:latin typeface="+mn-lt"/>
+                          <a:ea typeface="+mn-ea"/>
+                          <a:cs typeface="+mn-cs"/>
+                        </a:rPr>
+                        <a:t> en el botón “Continue”.</a:t>
+                      </a:r>
+                    </a:p>
+                  </a:txBody>
+                  <a:tcPr/>
+                </a:tc>
+                <a:extLst>
+                  <a:ext uri="{0D108BD9-81ED-4DB2-BD59-A6C34878D82A}">
+                    <a16:rowId xmlns:a16="http://schemas.microsoft.com/office/drawing/2014/main" val="1746594758"/>
+                  </a:ext>
+                </a:extLst>
+              </a:tr>
+              <a:tr h="370840">
+                <a:tc>
+                  <a:txBody>
+                    <a:bodyPr/>
+                    <a:lstStyle/>
+                    <a:p>
+                      <a:r>
+                        <a:rPr lang="es-MX" dirty="0"/>
+                        <a:t>Precondiciones</a:t>
+                      </a:r>
+                    </a:p>
+                  </a:txBody>
+                  <a:tcPr/>
+                </a:tc>
+                <a:tc>
+                  <a:txBody>
+                    <a:bodyPr/>
+                    <a:lstStyle/>
+                    <a:p>
+                      <a:r>
+                        <a:rPr lang="es-MX" dirty="0"/>
+                        <a:t>Un navegador de internet.</a:t>
+                      </a:r>
+                    </a:p>
+                  </a:txBody>
+                  <a:tcPr/>
+                </a:tc>
+                <a:extLst>
+                  <a:ext uri="{0D108BD9-81ED-4DB2-BD59-A6C34878D82A}">
+                    <a16:rowId xmlns:a16="http://schemas.microsoft.com/office/drawing/2014/main" val="2161702613"/>
+                  </a:ext>
+                </a:extLst>
+              </a:tr>
+              <a:tr h="370840">
+                <a:tc>
+                  <a:txBody>
+                    <a:bodyPr/>
+                    <a:lstStyle/>
+                    <a:p>
+                      <a:r>
+                        <a:rPr lang="es-MX" dirty="0"/>
+                        <a:t>Resultado esperado</a:t>
+                      </a:r>
+                    </a:p>
+                  </a:txBody>
+                  <a:tcPr/>
+                </a:tc>
+                <a:tc>
+                  <a:txBody>
+                    <a:bodyPr/>
+                    <a:lstStyle/>
+                    <a:p>
+                      <a:r>
+                        <a:rPr lang="es-MX" dirty="0"/>
+                        <a:t>Encontrar algún vuelo disponible.</a:t>
+                      </a:r>
+                    </a:p>
+                    <a:p>
+                      <a:endParaRPr lang="es-MX" dirty="0"/>
+                    </a:p>
+                  </a:txBody>
+                  <a:tcPr/>
+                </a:tc>
+                <a:extLst>
+                  <a:ext uri="{0D108BD9-81ED-4DB2-BD59-A6C34878D82A}">
+                    <a16:rowId xmlns:a16="http://schemas.microsoft.com/office/drawing/2014/main" val="3394570666"/>
+                  </a:ext>
+                </a:extLst>
+              </a:tr>
+              <a:tr h="370840">
+                <a:tc>
+                  <a:txBody>
+                    <a:bodyPr/>
+                    <a:lstStyle/>
+                    <a:p>
+                      <a:r>
+                        <a:rPr lang="es-MX" dirty="0"/>
+                        <a:t>Resultado obtenido</a:t>
+                      </a:r>
+                    </a:p>
+                  </a:txBody>
+                  <a:tcPr/>
+                </a:tc>
+                <a:tc>
+                  <a:txBody>
+                    <a:bodyPr/>
+                    <a:lstStyle/>
+                    <a:p>
+                      <a:pPr marL="0" marR="0" lvl="0" indent="0" algn="l" defTabSz="914400" rtl="0" eaLnBrk="1" fontAlgn="auto" latinLnBrk="0" hangingPunct="1">
+                        <a:lnSpc>
+                          <a:spcPct val="100000"/>
+                        </a:lnSpc>
+                        <a:spcBef>
+                          <a:spcPts val="0"/>
+                        </a:spcBef>
+                        <a:spcAft>
+                          <a:spcPts val="0"/>
+                        </a:spcAft>
+                        <a:buClrTx/>
+                        <a:buSzTx/>
+                        <a:buFontTx/>
+                        <a:buNone/>
+                        <a:tabLst/>
+                        <a:defRPr/>
+                      </a:pPr>
+                      <a:r>
+                        <a:rPr lang="es-ES" sz="1800" b="0" i="0" kern="1200" dirty="0">
+                          <a:solidFill>
+                            <a:schemeClr val="dk1"/>
+                          </a:solidFill>
+                          <a:effectLst/>
+                          <a:latin typeface="+mn-lt"/>
+                          <a:ea typeface="+mn-ea"/>
+                          <a:cs typeface="+mn-cs"/>
+                        </a:rPr>
+                        <a:t>No hay ningún vuelo disponible.</a:t>
+                      </a:r>
+                    </a:p>
+                    <a:p>
+                      <a:endParaRPr lang="es-MX" dirty="0"/>
+                    </a:p>
+                  </a:txBody>
+                  <a:tcPr/>
+                </a:tc>
+                <a:extLst>
+                  <a:ext uri="{0D108BD9-81ED-4DB2-BD59-A6C34878D82A}">
+                    <a16:rowId xmlns:a16="http://schemas.microsoft.com/office/drawing/2014/main" val="1327796877"/>
+                  </a:ext>
+                </a:extLst>
+              </a:tr>
+            </a:tbl>
+          </a:graphicData>
+        </a:graphic>
+      </p:graphicFrame>
     </p:spTree>
     <p:extLst>
       <p:ext uri="{BB962C8B-B14F-4D97-AF65-F5344CB8AC3E}">

</xml_diff>

<commit_message>
Encontrando bug 7 diseño responsivo no se adapta
</commit_message>
<xml_diff>
--- a/alumnos/gabriel_gonzalez/errores_guru.pptx
+++ b/alumnos/gabriel_gonzalez/errores_guru.pptx
@@ -39,6 +39,9 @@
     <p:sldId id="287" r:id="rId33"/>
     <p:sldId id="288" r:id="rId34"/>
     <p:sldId id="289" r:id="rId35"/>
+    <p:sldId id="290" r:id="rId36"/>
+    <p:sldId id="291" r:id="rId37"/>
+    <p:sldId id="292" r:id="rId38"/>
   </p:sldIdLst>
   <p:sldSz cx="12192000" cy="6858000"/>
   <p:notesSz cx="6858000" cy="9144000"/>
@@ -7456,10 +7459,893 @@
           <a:chExt cx="0" cy="0"/>
         </a:xfrm>
       </p:grpSpPr>
+      <p:sp>
+        <p:nvSpPr>
+          <p:cNvPr id="3" name="Marcador de contenido 2">
+            <a:extLst>
+              <a:ext uri="{FF2B5EF4-FFF2-40B4-BE49-F238E27FC236}">
+                <a16:creationId xmlns:a16="http://schemas.microsoft.com/office/drawing/2014/main" id="{B65EA7D9-C34C-47A0-8D56-AB31F5BCA65B}"/>
+              </a:ext>
+            </a:extLst>
+          </p:cNvPr>
+          <p:cNvSpPr>
+            <a:spLocks noGrp="1"/>
+          </p:cNvSpPr>
+          <p:nvPr>
+            <p:ph idx="1"/>
+          </p:nvPr>
+        </p:nvSpPr>
+        <p:spPr/>
+        <p:txBody>
+          <a:bodyPr>
+            <a:normAutofit/>
+          </a:bodyPr>
+          <a:lstStyle/>
+          <a:p>
+            <a:pPr algn="ctr"/>
+            <a:r>
+              <a:rPr lang="es-ES" sz="8800" dirty="0">
+                <a:solidFill>
+                  <a:srgbClr val="FF0000"/>
+                </a:solidFill>
+              </a:rPr>
+              <a:t>SEPTIMO BUG</a:t>
+            </a:r>
+            <a:endParaRPr lang="es-MX" sz="8800" dirty="0">
+              <a:solidFill>
+                <a:srgbClr val="FF0000"/>
+              </a:solidFill>
+            </a:endParaRPr>
+          </a:p>
+        </p:txBody>
+      </p:sp>
     </p:spTree>
     <p:extLst>
       <p:ext uri="{BB962C8B-B14F-4D97-AF65-F5344CB8AC3E}">
-        <p14:creationId xmlns:p14="http://schemas.microsoft.com/office/powerpoint/2010/main" val="67380645"/>
+        <p14:creationId xmlns:p14="http://schemas.microsoft.com/office/powerpoint/2010/main" val="3282782613"/>
+      </p:ext>
+    </p:extLst>
+  </p:cSld>
+  <p:clrMapOvr>
+    <a:masterClrMapping/>
+  </p:clrMapOvr>
+</p:sld>
+</file>
+
+<file path=ppt/slides/slide35.xml><?xml version="1.0" encoding="utf-8"?>
+<p:sld xmlns:a="http://schemas.openxmlformats.org/drawingml/2006/main" xmlns:r="http://schemas.openxmlformats.org/officeDocument/2006/relationships" xmlns:p="http://schemas.openxmlformats.org/presentationml/2006/main">
+  <p:cSld>
+    <p:spTree>
+      <p:nvGrpSpPr>
+        <p:cNvPr id="1" name=""/>
+        <p:cNvGrpSpPr/>
+        <p:nvPr/>
+      </p:nvGrpSpPr>
+      <p:grpSpPr>
+        <a:xfrm>
+          <a:off x="0" y="0"/>
+          <a:ext cx="0" cy="0"/>
+          <a:chOff x="0" y="0"/>
+          <a:chExt cx="0" cy="0"/>
+        </a:xfrm>
+      </p:grpSpPr>
+      <p:sp>
+        <p:nvSpPr>
+          <p:cNvPr id="2" name="Título 1">
+            <a:extLst>
+              <a:ext uri="{FF2B5EF4-FFF2-40B4-BE49-F238E27FC236}">
+                <a16:creationId xmlns:a16="http://schemas.microsoft.com/office/drawing/2014/main" id="{B2C27199-E52E-4727-9AA6-B8FAD107EF72}"/>
+              </a:ext>
+            </a:extLst>
+          </p:cNvPr>
+          <p:cNvSpPr>
+            <a:spLocks noGrp="1"/>
+          </p:cNvSpPr>
+          <p:nvPr>
+            <p:ph type="title"/>
+          </p:nvPr>
+        </p:nvSpPr>
+        <p:spPr/>
+        <p:txBody>
+          <a:bodyPr>
+            <a:normAutofit/>
+          </a:bodyPr>
+          <a:lstStyle/>
+          <a:p>
+            <a:r>
+              <a:rPr lang="es-ES" sz="1800" b="1" dirty="0" err="1">
+                <a:solidFill>
+                  <a:srgbClr val="FF0000"/>
+                </a:solidFill>
+              </a:rPr>
+              <a:t>Septimo</a:t>
+            </a:r>
+            <a:r>
+              <a:rPr lang="es-ES" sz="1800" b="1" dirty="0">
+                <a:solidFill>
+                  <a:srgbClr val="FF0000"/>
+                </a:solidFill>
+              </a:rPr>
+              <a:t> bug</a:t>
+            </a:r>
+            <a:r>
+              <a:rPr lang="es-ES" sz="1800" b="1" dirty="0"/>
+              <a:t>.</a:t>
+            </a:r>
+            <a:br>
+              <a:rPr lang="es-ES" sz="1800" b="1" dirty="0"/>
+            </a:br>
+            <a:br>
+              <a:rPr lang="es-ES" sz="1800" b="1" dirty="0"/>
+            </a:br>
+            <a:br>
+              <a:rPr lang="es-ES" sz="1800" b="1" dirty="0"/>
+            </a:br>
+            <a:r>
+              <a:rPr lang="es-ES" sz="1800" dirty="0"/>
+              <a:t>Entramos a la pagina web </a:t>
+            </a:r>
+            <a:r>
+              <a:rPr lang="es-ES" sz="1800" dirty="0">
+                <a:solidFill>
+                  <a:schemeClr val="accent1"/>
+                </a:solidFill>
+              </a:rPr>
+              <a:t>Guru99</a:t>
+            </a:r>
+            <a:endParaRPr lang="es-MX" sz="1800" b="1" dirty="0">
+              <a:solidFill>
+                <a:schemeClr val="accent1"/>
+              </a:solidFill>
+            </a:endParaRPr>
+          </a:p>
+        </p:txBody>
+      </p:sp>
+      <p:pic>
+        <p:nvPicPr>
+          <p:cNvPr id="5" name="Marcador de contenido 4">
+            <a:extLst>
+              <a:ext uri="{FF2B5EF4-FFF2-40B4-BE49-F238E27FC236}">
+                <a16:creationId xmlns:a16="http://schemas.microsoft.com/office/drawing/2014/main" id="{24BEF59C-BDDE-40BD-87F2-6FE0E8B505E1}"/>
+              </a:ext>
+            </a:extLst>
+          </p:cNvPr>
+          <p:cNvPicPr>
+            <a:picLocks noGrp="1" noChangeAspect="1"/>
+          </p:cNvPicPr>
+          <p:nvPr>
+            <p:ph idx="1"/>
+          </p:nvPr>
+        </p:nvPicPr>
+        <p:blipFill>
+          <a:blip r:embed="rId2">
+            <a:extLst>
+              <a:ext uri="{28A0092B-C50C-407E-A947-70E740481C1C}">
+                <a14:useLocalDpi xmlns:a14="http://schemas.microsoft.com/office/drawing/2010/main" val="0"/>
+              </a:ext>
+            </a:extLst>
+          </a:blip>
+          <a:stretch>
+            <a:fillRect/>
+          </a:stretch>
+        </p:blipFill>
+        <p:spPr>
+          <a:xfrm>
+            <a:off x="3197266" y="1825625"/>
+            <a:ext cx="5797467" cy="4351338"/>
+          </a:xfrm>
+        </p:spPr>
+      </p:pic>
+    </p:spTree>
+    <p:extLst>
+      <p:ext uri="{BB962C8B-B14F-4D97-AF65-F5344CB8AC3E}">
+        <p14:creationId xmlns:p14="http://schemas.microsoft.com/office/powerpoint/2010/main" val="2820503218"/>
+      </p:ext>
+    </p:extLst>
+  </p:cSld>
+  <p:clrMapOvr>
+    <a:masterClrMapping/>
+  </p:clrMapOvr>
+</p:sld>
+</file>
+
+<file path=ppt/slides/slide36.xml><?xml version="1.0" encoding="utf-8"?>
+<p:sld xmlns:a="http://schemas.openxmlformats.org/drawingml/2006/main" xmlns:r="http://schemas.openxmlformats.org/officeDocument/2006/relationships" xmlns:p="http://schemas.openxmlformats.org/presentationml/2006/main">
+  <p:cSld>
+    <p:spTree>
+      <p:nvGrpSpPr>
+        <p:cNvPr id="1" name=""/>
+        <p:cNvGrpSpPr/>
+        <p:nvPr/>
+      </p:nvGrpSpPr>
+      <p:grpSpPr>
+        <a:xfrm>
+          <a:off x="0" y="0"/>
+          <a:ext cx="0" cy="0"/>
+          <a:chOff x="0" y="0"/>
+          <a:chExt cx="0" cy="0"/>
+        </a:xfrm>
+      </p:grpSpPr>
+      <p:pic>
+        <p:nvPicPr>
+          <p:cNvPr id="5" name="Imagen 4">
+            <a:extLst>
+              <a:ext uri="{FF2B5EF4-FFF2-40B4-BE49-F238E27FC236}">
+                <a16:creationId xmlns:a16="http://schemas.microsoft.com/office/drawing/2014/main" id="{04B815B1-838D-45D0-82DA-9266FAA1E5F2}"/>
+              </a:ext>
+            </a:extLst>
+          </p:cNvPr>
+          <p:cNvPicPr>
+            <a:picLocks noChangeAspect="1"/>
+          </p:cNvPicPr>
+          <p:nvPr/>
+        </p:nvPicPr>
+        <p:blipFill>
+          <a:blip r:embed="rId2">
+            <a:extLst>
+              <a:ext uri="{28A0092B-C50C-407E-A947-70E740481C1C}">
+                <a14:useLocalDpi xmlns:a14="http://schemas.microsoft.com/office/drawing/2010/main" val="0"/>
+              </a:ext>
+            </a:extLst>
+          </a:blip>
+          <a:stretch>
+            <a:fillRect/>
+          </a:stretch>
+        </p:blipFill>
+        <p:spPr>
+          <a:xfrm>
+            <a:off x="1666451" y="0"/>
+            <a:ext cx="8859098" cy="6858000"/>
+          </a:xfrm>
+          <a:prstGeom prst="rect">
+            <a:avLst/>
+          </a:prstGeom>
+        </p:spPr>
+      </p:pic>
+    </p:spTree>
+    <p:extLst>
+      <p:ext uri="{BB962C8B-B14F-4D97-AF65-F5344CB8AC3E}">
+        <p14:creationId xmlns:p14="http://schemas.microsoft.com/office/powerpoint/2010/main" val="2387224596"/>
+      </p:ext>
+    </p:extLst>
+  </p:cSld>
+  <p:clrMapOvr>
+    <a:masterClrMapping/>
+  </p:clrMapOvr>
+</p:sld>
+</file>
+
+<file path=ppt/slides/slide37.xml><?xml version="1.0" encoding="utf-8"?>
+<p:sld xmlns:a="http://schemas.openxmlformats.org/drawingml/2006/main" xmlns:r="http://schemas.openxmlformats.org/officeDocument/2006/relationships" xmlns:p="http://schemas.openxmlformats.org/presentationml/2006/main">
+  <p:cSld>
+    <p:spTree>
+      <p:nvGrpSpPr>
+        <p:cNvPr id="1" name=""/>
+        <p:cNvGrpSpPr/>
+        <p:nvPr/>
+      </p:nvGrpSpPr>
+      <p:grpSpPr>
+        <a:xfrm>
+          <a:off x="0" y="0"/>
+          <a:ext cx="0" cy="0"/>
+          <a:chOff x="0" y="0"/>
+          <a:chExt cx="0" cy="0"/>
+        </a:xfrm>
+      </p:grpSpPr>
+      <p:graphicFrame>
+        <p:nvGraphicFramePr>
+          <p:cNvPr id="4" name="Tabla 3">
+            <a:extLst>
+              <a:ext uri="{FF2B5EF4-FFF2-40B4-BE49-F238E27FC236}">
+                <a16:creationId xmlns:a16="http://schemas.microsoft.com/office/drawing/2014/main" id="{C9AA5542-90DE-4BEA-8DA0-E6745CF112C2}"/>
+              </a:ext>
+            </a:extLst>
+          </p:cNvPr>
+          <p:cNvGraphicFramePr>
+            <a:graphicFrameLocks noGrp="1"/>
+          </p:cNvGraphicFramePr>
+          <p:nvPr>
+            <p:extLst>
+              <p:ext uri="{D42A27DB-BD31-4B8C-83A1-F6EECF244321}">
+                <p14:modId xmlns:p14="http://schemas.microsoft.com/office/powerpoint/2010/main" val="3409725594"/>
+              </p:ext>
+            </p:extLst>
+          </p:nvPr>
+        </p:nvGraphicFramePr>
+        <p:xfrm>
+          <a:off x="1906165" y="702888"/>
+          <a:ext cx="9226027" cy="4678680"/>
+        </p:xfrm>
+        <a:graphic>
+          <a:graphicData uri="http://schemas.openxmlformats.org/drawingml/2006/table">
+            <a:tbl>
+              <a:tblPr firstRow="1" bandRow="1">
+                <a:tableStyleId>{073A0DAA-6AF3-43AB-8588-CEC1D06C72B9}</a:tableStyleId>
+              </a:tblPr>
+              <a:tblGrid>
+                <a:gridCol w="3236286">
+                  <a:extLst>
+                    <a:ext uri="{9D8B030D-6E8A-4147-A177-3AD203B41FA5}">
+                      <a16:colId xmlns:a16="http://schemas.microsoft.com/office/drawing/2014/main" val="3209075916"/>
+                    </a:ext>
+                  </a:extLst>
+                </a:gridCol>
+                <a:gridCol w="5989741">
+                  <a:extLst>
+                    <a:ext uri="{9D8B030D-6E8A-4147-A177-3AD203B41FA5}">
+                      <a16:colId xmlns:a16="http://schemas.microsoft.com/office/drawing/2014/main" val="4058670583"/>
+                    </a:ext>
+                  </a:extLst>
+                </a:gridCol>
+              </a:tblGrid>
+              <a:tr h="370840">
+                <a:tc>
+                  <a:txBody>
+                    <a:bodyPr/>
+                    <a:lstStyle/>
+                    <a:p>
+                      <a:r>
+                        <a:rPr lang="es-MX" b="0" dirty="0"/>
+                        <a:t>Titulo</a:t>
+                      </a:r>
+                    </a:p>
+                  </a:txBody>
+                  <a:tcPr/>
+                </a:tc>
+                <a:tc>
+                  <a:txBody>
+                    <a:bodyPr/>
+                    <a:lstStyle/>
+                    <a:p>
+                      <a:r>
+                        <a:rPr lang="es-ES" dirty="0"/>
+                        <a:t>Diseño no responsivo</a:t>
+                      </a:r>
+                      <a:endParaRPr lang="es-MX" dirty="0"/>
+                    </a:p>
+                  </a:txBody>
+                  <a:tcPr/>
+                </a:tc>
+                <a:extLst>
+                  <a:ext uri="{0D108BD9-81ED-4DB2-BD59-A6C34878D82A}">
+                    <a16:rowId xmlns:a16="http://schemas.microsoft.com/office/drawing/2014/main" val="620287769"/>
+                  </a:ext>
+                </a:extLst>
+              </a:tr>
+              <a:tr h="370840">
+                <a:tc>
+                  <a:txBody>
+                    <a:bodyPr/>
+                    <a:lstStyle/>
+                    <a:p>
+                      <a:r>
+                        <a:rPr lang="es-MX" dirty="0"/>
+                        <a:t>Descripción</a:t>
+                      </a:r>
+                    </a:p>
+                  </a:txBody>
+                  <a:tcPr/>
+                </a:tc>
+                <a:tc>
+                  <a:txBody>
+                    <a:bodyPr/>
+                    <a:lstStyle/>
+                    <a:p>
+                      <a:r>
+                        <a:rPr lang="es-MX" dirty="0"/>
+                        <a:t>Diseño no se adapta a distintos dispositivos</a:t>
+                      </a:r>
+                    </a:p>
+                  </a:txBody>
+                  <a:tcPr/>
+                </a:tc>
+                <a:extLst>
+                  <a:ext uri="{0D108BD9-81ED-4DB2-BD59-A6C34878D82A}">
+                    <a16:rowId xmlns:a16="http://schemas.microsoft.com/office/drawing/2014/main" val="3419308306"/>
+                  </a:ext>
+                </a:extLst>
+              </a:tr>
+              <a:tr h="546358">
+                <a:tc>
+                  <a:txBody>
+                    <a:bodyPr/>
+                    <a:lstStyle/>
+                    <a:p>
+                      <a:r>
+                        <a:rPr lang="es-MX" dirty="0"/>
+                        <a:t>Pasos</a:t>
+                      </a:r>
+                    </a:p>
+                  </a:txBody>
+                  <a:tcPr/>
+                </a:tc>
+                <a:tc>
+                  <a:txBody>
+                    <a:bodyPr/>
+                    <a:lstStyle/>
+                    <a:p>
+                      <a:pPr marL="342900" indent="-342900">
+                        <a:buAutoNum type="arabicPeriod"/>
+                      </a:pPr>
+                      <a:r>
+                        <a:rPr lang="es-MX" dirty="0"/>
+                        <a:t>Ingresar: </a:t>
+                      </a:r>
+                      <a:r>
+                        <a:rPr lang="es-MX" sz="1800" b="0" i="0" kern="1200" dirty="0">
+                          <a:solidFill>
+                            <a:schemeClr val="dk1"/>
+                          </a:solidFill>
+                          <a:effectLst/>
+                          <a:latin typeface="+mn-lt"/>
+                          <a:ea typeface="+mn-ea"/>
+                          <a:cs typeface="+mn-cs"/>
+                          <a:hlinkClick r:id="rId2" tooltip="https://demo.guru99.com/test/newtours/register.php"/>
+                        </a:rPr>
+                        <a:t>https://demo.guru99.com/test/newtours/</a:t>
+                      </a:r>
+                      <a:endParaRPr lang="es-MX" sz="1800" b="0" i="0" kern="1200" dirty="0">
+                        <a:solidFill>
+                          <a:schemeClr val="dk1"/>
+                        </a:solidFill>
+                        <a:effectLst/>
+                        <a:latin typeface="+mn-lt"/>
+                        <a:ea typeface="+mn-ea"/>
+                        <a:cs typeface="+mn-cs"/>
+                      </a:endParaRPr>
+                    </a:p>
+                    <a:p>
+                      <a:pPr marL="342900" indent="-342900">
+                        <a:buAutoNum type="arabicPeriod"/>
+                      </a:pPr>
+                      <a:r>
+                        <a:rPr lang="es-MX" sz="1800" b="0" i="0" kern="1200" dirty="0">
+                          <a:solidFill>
+                            <a:schemeClr val="dk1"/>
+                          </a:solidFill>
+                          <a:effectLst/>
+                          <a:latin typeface="+mn-lt"/>
+                          <a:ea typeface="+mn-ea"/>
+                          <a:cs typeface="+mn-cs"/>
+                        </a:rPr>
+                        <a:t>Hacer </a:t>
+                      </a:r>
+                      <a:r>
+                        <a:rPr lang="es-MX" sz="1800" b="0" i="0" kern="1200" dirty="0" err="1">
+                          <a:solidFill>
+                            <a:schemeClr val="dk1"/>
+                          </a:solidFill>
+                          <a:effectLst/>
+                          <a:latin typeface="+mn-lt"/>
+                          <a:ea typeface="+mn-ea"/>
+                          <a:cs typeface="+mn-cs"/>
+                        </a:rPr>
+                        <a:t>click</a:t>
+                      </a:r>
+                      <a:r>
+                        <a:rPr lang="es-MX" sz="1800" b="0" i="0" kern="1200" dirty="0">
+                          <a:solidFill>
+                            <a:schemeClr val="dk1"/>
+                          </a:solidFill>
+                          <a:effectLst/>
+                          <a:latin typeface="+mn-lt"/>
+                          <a:ea typeface="+mn-ea"/>
+                          <a:cs typeface="+mn-cs"/>
+                        </a:rPr>
+                        <a:t> derecho en cualquier parte del sitio y </a:t>
+                      </a:r>
+                      <a:r>
+                        <a:rPr lang="es-MX" sz="1800" b="0" i="0" kern="1200" dirty="0" err="1">
+                          <a:solidFill>
+                            <a:schemeClr val="dk1"/>
+                          </a:solidFill>
+                          <a:effectLst/>
+                          <a:latin typeface="+mn-lt"/>
+                          <a:ea typeface="+mn-ea"/>
+                          <a:cs typeface="+mn-cs"/>
+                        </a:rPr>
+                        <a:t>clickear</a:t>
+                      </a:r>
+                      <a:r>
+                        <a:rPr lang="es-MX" sz="1800" b="0" i="0" kern="1200" dirty="0">
+                          <a:solidFill>
+                            <a:schemeClr val="dk1"/>
+                          </a:solidFill>
+                          <a:effectLst/>
+                          <a:latin typeface="+mn-lt"/>
+                          <a:ea typeface="+mn-ea"/>
+                          <a:cs typeface="+mn-cs"/>
+                        </a:rPr>
+                        <a:t> en la opción inspeccionar.</a:t>
+                      </a:r>
+                    </a:p>
+                    <a:p>
+                      <a:pPr marL="342900" indent="-342900">
+                        <a:buAutoNum type="arabicPeriod"/>
+                      </a:pPr>
+                      <a:r>
+                        <a:rPr lang="es-MX" sz="1800" b="0" i="0" kern="1200" dirty="0">
+                          <a:solidFill>
+                            <a:schemeClr val="dk1"/>
+                          </a:solidFill>
+                          <a:effectLst/>
+                          <a:latin typeface="+mn-lt"/>
+                          <a:ea typeface="+mn-ea"/>
+                          <a:cs typeface="+mn-cs"/>
+                        </a:rPr>
+                        <a:t>Apretar </a:t>
+                      </a:r>
+                      <a:r>
+                        <a:rPr lang="es-MX" sz="1800" b="0" i="0" kern="1200" dirty="0" err="1">
+                          <a:solidFill>
+                            <a:schemeClr val="dk1"/>
+                          </a:solidFill>
+                          <a:effectLst/>
+                          <a:latin typeface="+mn-lt"/>
+                          <a:ea typeface="+mn-ea"/>
+                          <a:cs typeface="+mn-cs"/>
+                        </a:rPr>
+                        <a:t>Ctrl+Shift+M</a:t>
+                      </a:r>
+                      <a:r>
+                        <a:rPr lang="es-MX" sz="1800" b="0" i="0" kern="1200" dirty="0">
+                          <a:solidFill>
+                            <a:schemeClr val="dk1"/>
+                          </a:solidFill>
+                          <a:effectLst/>
+                          <a:latin typeface="+mn-lt"/>
+                          <a:ea typeface="+mn-ea"/>
+                          <a:cs typeface="+mn-cs"/>
+                        </a:rPr>
+                        <a:t> o hacer </a:t>
+                      </a:r>
+                      <a:r>
+                        <a:rPr lang="es-MX" sz="1800" b="0" i="0" kern="1200" dirty="0" err="1">
+                          <a:solidFill>
+                            <a:schemeClr val="dk1"/>
+                          </a:solidFill>
+                          <a:effectLst/>
+                          <a:latin typeface="+mn-lt"/>
+                          <a:ea typeface="+mn-ea"/>
+                          <a:cs typeface="+mn-cs"/>
+                        </a:rPr>
+                        <a:t>click</a:t>
+                      </a:r>
+                      <a:r>
+                        <a:rPr lang="es-MX" sz="1800" b="0" i="0" kern="1200" dirty="0">
+                          <a:solidFill>
+                            <a:schemeClr val="dk1"/>
+                          </a:solidFill>
+                          <a:effectLst/>
+                          <a:latin typeface="+mn-lt"/>
+                          <a:ea typeface="+mn-ea"/>
+                          <a:cs typeface="+mn-cs"/>
+                        </a:rPr>
+                        <a:t> </a:t>
+                      </a:r>
+                      <a:r>
+                        <a:rPr lang="es-MX" sz="1800" b="0" i="0" kern="1200" dirty="0" err="1">
+                          <a:solidFill>
+                            <a:schemeClr val="dk1"/>
+                          </a:solidFill>
+                          <a:effectLst/>
+                          <a:latin typeface="+mn-lt"/>
+                          <a:ea typeface="+mn-ea"/>
+                          <a:cs typeface="+mn-cs"/>
+                        </a:rPr>
+                        <a:t>Toggle</a:t>
+                      </a:r>
+                      <a:r>
+                        <a:rPr lang="es-MX" sz="1800" b="0" i="0" kern="1200" dirty="0">
+                          <a:solidFill>
+                            <a:schemeClr val="dk1"/>
+                          </a:solidFill>
+                          <a:effectLst/>
+                          <a:latin typeface="+mn-lt"/>
+                          <a:ea typeface="+mn-ea"/>
+                          <a:cs typeface="+mn-cs"/>
+                        </a:rPr>
+                        <a:t> </a:t>
+                      </a:r>
+                      <a:r>
+                        <a:rPr lang="es-MX" sz="1800" b="0" i="0" kern="1200" dirty="0" err="1">
+                          <a:solidFill>
+                            <a:schemeClr val="dk1"/>
+                          </a:solidFill>
+                          <a:effectLst/>
+                          <a:latin typeface="+mn-lt"/>
+                          <a:ea typeface="+mn-ea"/>
+                          <a:cs typeface="+mn-cs"/>
+                        </a:rPr>
+                        <a:t>device</a:t>
+                      </a:r>
+                      <a:r>
+                        <a:rPr lang="es-MX" sz="1800" b="0" i="0" kern="1200" dirty="0">
+                          <a:solidFill>
+                            <a:schemeClr val="dk1"/>
+                          </a:solidFill>
+                          <a:effectLst/>
+                          <a:latin typeface="+mn-lt"/>
+                          <a:ea typeface="+mn-ea"/>
+                          <a:cs typeface="+mn-cs"/>
+                        </a:rPr>
+                        <a:t> </a:t>
+                      </a:r>
+                      <a:r>
+                        <a:rPr lang="es-MX" sz="1800" b="0" i="0" kern="1200" dirty="0" err="1">
+                          <a:solidFill>
+                            <a:schemeClr val="dk1"/>
+                          </a:solidFill>
+                          <a:effectLst/>
+                          <a:latin typeface="+mn-lt"/>
+                          <a:ea typeface="+mn-ea"/>
+                          <a:cs typeface="+mn-cs"/>
+                        </a:rPr>
+                        <a:t>Toolbar</a:t>
+                      </a:r>
+                      <a:r>
+                        <a:rPr lang="es-MX" sz="1800" b="0" i="0" kern="1200" dirty="0">
+                          <a:solidFill>
+                            <a:schemeClr val="dk1"/>
+                          </a:solidFill>
+                          <a:effectLst/>
+                          <a:latin typeface="+mn-lt"/>
+                          <a:ea typeface="+mn-ea"/>
+                          <a:cs typeface="+mn-cs"/>
+                        </a:rPr>
+                        <a:t> al </a:t>
+                      </a:r>
+                      <a:r>
+                        <a:rPr lang="es-MX" sz="1800" b="0" i="0" kern="1200" dirty="0" err="1">
+                          <a:solidFill>
+                            <a:schemeClr val="dk1"/>
+                          </a:solidFill>
+                          <a:effectLst/>
+                          <a:latin typeface="+mn-lt"/>
+                          <a:ea typeface="+mn-ea"/>
+                          <a:cs typeface="+mn-cs"/>
+                        </a:rPr>
+                        <a:t>aldo</a:t>
+                      </a:r>
+                      <a:r>
+                        <a:rPr lang="es-MX" sz="1800" b="0" i="0" kern="1200" dirty="0">
+                          <a:solidFill>
+                            <a:schemeClr val="dk1"/>
+                          </a:solidFill>
+                          <a:effectLst/>
+                          <a:latin typeface="+mn-lt"/>
+                          <a:ea typeface="+mn-ea"/>
+                          <a:cs typeface="+mn-cs"/>
+                        </a:rPr>
+                        <a:t> de “</a:t>
+                      </a:r>
+                      <a:r>
+                        <a:rPr lang="es-MX" sz="1800" b="0" i="0" kern="1200" dirty="0" err="1">
+                          <a:solidFill>
+                            <a:schemeClr val="dk1"/>
+                          </a:solidFill>
+                          <a:effectLst/>
+                          <a:latin typeface="+mn-lt"/>
+                          <a:ea typeface="+mn-ea"/>
+                          <a:cs typeface="+mn-cs"/>
+                        </a:rPr>
+                        <a:t>Elements</a:t>
+                      </a:r>
+                      <a:r>
+                        <a:rPr lang="es-MX" sz="1800" b="0" i="0" kern="1200" dirty="0">
+                          <a:solidFill>
+                            <a:schemeClr val="dk1"/>
+                          </a:solidFill>
+                          <a:effectLst/>
+                          <a:latin typeface="+mn-lt"/>
+                          <a:ea typeface="+mn-ea"/>
+                          <a:cs typeface="+mn-cs"/>
+                        </a:rPr>
+                        <a:t>”</a:t>
+                      </a:r>
+                    </a:p>
+                    <a:p>
+                      <a:pPr marL="342900" indent="-342900">
+                        <a:buAutoNum type="arabicPeriod"/>
+                      </a:pPr>
+                      <a:r>
+                        <a:rPr lang="es-MX" sz="1800" b="0" i="0" kern="1200" dirty="0">
+                          <a:solidFill>
+                            <a:schemeClr val="dk1"/>
+                          </a:solidFill>
+                          <a:effectLst/>
+                          <a:latin typeface="+mn-lt"/>
+                          <a:ea typeface="+mn-ea"/>
+                          <a:cs typeface="+mn-cs"/>
+                        </a:rPr>
+                        <a:t>Probar diferentes </a:t>
+                      </a:r>
+                      <a:r>
+                        <a:rPr lang="es-MX" sz="1800" b="0" i="0" kern="1200" dirty="0" err="1">
+                          <a:solidFill>
+                            <a:schemeClr val="dk1"/>
+                          </a:solidFill>
+                          <a:effectLst/>
+                          <a:latin typeface="+mn-lt"/>
+                          <a:ea typeface="+mn-ea"/>
+                          <a:cs typeface="+mn-cs"/>
+                        </a:rPr>
+                        <a:t>Dimensions</a:t>
+                      </a:r>
+                      <a:r>
+                        <a:rPr lang="es-MX" sz="1800" b="0" i="0" kern="1200" dirty="0">
+                          <a:solidFill>
+                            <a:schemeClr val="dk1"/>
+                          </a:solidFill>
+                          <a:effectLst/>
+                          <a:latin typeface="+mn-lt"/>
+                          <a:ea typeface="+mn-ea"/>
+                          <a:cs typeface="+mn-cs"/>
+                        </a:rPr>
+                        <a:t> Responsive.</a:t>
+                      </a:r>
+                    </a:p>
+                    <a:p>
+                      <a:pPr marL="342900" indent="-342900">
+                        <a:buAutoNum type="arabicPeriod"/>
+                      </a:pPr>
+                      <a:endParaRPr lang="es-MX" sz="1800" b="0" i="0" kern="1200" dirty="0">
+                        <a:solidFill>
+                          <a:schemeClr val="dk1"/>
+                        </a:solidFill>
+                        <a:effectLst/>
+                        <a:latin typeface="+mn-lt"/>
+                        <a:ea typeface="+mn-ea"/>
+                        <a:cs typeface="+mn-cs"/>
+                      </a:endParaRPr>
+                    </a:p>
+                  </a:txBody>
+                  <a:tcPr/>
+                </a:tc>
+                <a:extLst>
+                  <a:ext uri="{0D108BD9-81ED-4DB2-BD59-A6C34878D82A}">
+                    <a16:rowId xmlns:a16="http://schemas.microsoft.com/office/drawing/2014/main" val="1746594758"/>
+                  </a:ext>
+                </a:extLst>
+              </a:tr>
+              <a:tr h="370840">
+                <a:tc>
+                  <a:txBody>
+                    <a:bodyPr/>
+                    <a:lstStyle/>
+                    <a:p>
+                      <a:r>
+                        <a:rPr lang="es-MX" dirty="0"/>
+                        <a:t>Precondiciones</a:t>
+                      </a:r>
+                    </a:p>
+                  </a:txBody>
+                  <a:tcPr/>
+                </a:tc>
+                <a:tc>
+                  <a:txBody>
+                    <a:bodyPr/>
+                    <a:lstStyle/>
+                    <a:p>
+                      <a:r>
+                        <a:rPr lang="es-MX" dirty="0"/>
+                        <a:t>Un navegador de internet.</a:t>
+                      </a:r>
+                    </a:p>
+                  </a:txBody>
+                  <a:tcPr/>
+                </a:tc>
+                <a:extLst>
+                  <a:ext uri="{0D108BD9-81ED-4DB2-BD59-A6C34878D82A}">
+                    <a16:rowId xmlns:a16="http://schemas.microsoft.com/office/drawing/2014/main" val="2161702613"/>
+                  </a:ext>
+                </a:extLst>
+              </a:tr>
+              <a:tr h="370840">
+                <a:tc>
+                  <a:txBody>
+                    <a:bodyPr/>
+                    <a:lstStyle/>
+                    <a:p>
+                      <a:r>
+                        <a:rPr lang="es-MX" dirty="0"/>
+                        <a:t>Resultado esperado</a:t>
+                      </a:r>
+                    </a:p>
+                  </a:txBody>
+                  <a:tcPr/>
+                </a:tc>
+                <a:tc>
+                  <a:txBody>
+                    <a:bodyPr/>
+                    <a:lstStyle/>
+                    <a:p>
+                      <a:r>
+                        <a:rPr lang="es-MX" dirty="0"/>
+                        <a:t>Adaptar el diseño a diferentes dispositivos.</a:t>
+                      </a:r>
+                    </a:p>
+                    <a:p>
+                      <a:endParaRPr lang="es-MX" dirty="0"/>
+                    </a:p>
+                  </a:txBody>
+                  <a:tcPr/>
+                </a:tc>
+                <a:extLst>
+                  <a:ext uri="{0D108BD9-81ED-4DB2-BD59-A6C34878D82A}">
+                    <a16:rowId xmlns:a16="http://schemas.microsoft.com/office/drawing/2014/main" val="3394570666"/>
+                  </a:ext>
+                </a:extLst>
+              </a:tr>
+              <a:tr h="370840">
+                <a:tc>
+                  <a:txBody>
+                    <a:bodyPr/>
+                    <a:lstStyle/>
+                    <a:p>
+                      <a:r>
+                        <a:rPr lang="es-MX" dirty="0"/>
+                        <a:t>Resultado obtenido</a:t>
+                      </a:r>
+                    </a:p>
+                  </a:txBody>
+                  <a:tcPr/>
+                </a:tc>
+                <a:tc>
+                  <a:txBody>
+                    <a:bodyPr/>
+                    <a:lstStyle/>
+                    <a:p>
+                      <a:pPr marL="0" marR="0" lvl="0" indent="0" algn="l" defTabSz="914400" rtl="0" eaLnBrk="1" fontAlgn="auto" latinLnBrk="0" hangingPunct="1">
+                        <a:lnSpc>
+                          <a:spcPct val="100000"/>
+                        </a:lnSpc>
+                        <a:spcBef>
+                          <a:spcPts val="0"/>
+                        </a:spcBef>
+                        <a:spcAft>
+                          <a:spcPts val="0"/>
+                        </a:spcAft>
+                        <a:buClrTx/>
+                        <a:buSzTx/>
+                        <a:buFontTx/>
+                        <a:buNone/>
+                        <a:tabLst/>
+                        <a:defRPr/>
+                      </a:pPr>
+                      <a:r>
+                        <a:rPr lang="es-ES" sz="1800" b="0" i="0" kern="1200" dirty="0">
+                          <a:solidFill>
+                            <a:schemeClr val="dk1"/>
+                          </a:solidFill>
+                          <a:effectLst/>
+                          <a:latin typeface="+mn-lt"/>
+                          <a:ea typeface="+mn-ea"/>
+                          <a:cs typeface="+mn-cs"/>
+                        </a:rPr>
+                        <a:t>Mantiene siempre el mismo diseño, lo cual hace que sea muy incomodo de ver en dispositivos mas pequeños.</a:t>
+                      </a:r>
+                    </a:p>
+                    <a:p>
+                      <a:endParaRPr lang="es-MX" dirty="0"/>
+                    </a:p>
+                  </a:txBody>
+                  <a:tcPr/>
+                </a:tc>
+                <a:extLst>
+                  <a:ext uri="{0D108BD9-81ED-4DB2-BD59-A6C34878D82A}">
+                    <a16:rowId xmlns:a16="http://schemas.microsoft.com/office/drawing/2014/main" val="1327796877"/>
+                  </a:ext>
+                </a:extLst>
+              </a:tr>
+            </a:tbl>
+          </a:graphicData>
+        </a:graphic>
+      </p:graphicFrame>
+    </p:spTree>
+    <p:extLst>
+      <p:ext uri="{BB962C8B-B14F-4D97-AF65-F5344CB8AC3E}">
+        <p14:creationId xmlns:p14="http://schemas.microsoft.com/office/powerpoint/2010/main" val="1287152096"/>
       </p:ext>
     </p:extLst>
   </p:cSld>

</xml_diff>